<commit_message>
before making new branch to handle join problems
</commit_message>
<xml_diff>
--- a/companyxyz_presentation.pptx
+++ b/companyxyz_presentation.pptx
@@ -6,8 +6,21 @@
   </p:sldMasterIdLst>
   <p:sldIdLst>
     <p:sldId id="256" r:id="rId2"/>
-    <p:sldId id="257" r:id="rId3"/>
-    <p:sldId id="258" r:id="rId4"/>
+    <p:sldId id="269" r:id="rId3"/>
+    <p:sldId id="267" r:id="rId4"/>
+    <p:sldId id="268" r:id="rId5"/>
+    <p:sldId id="270" r:id="rId6"/>
+    <p:sldId id="271" r:id="rId7"/>
+    <p:sldId id="258" r:id="rId8"/>
+    <p:sldId id="261" r:id="rId9"/>
+    <p:sldId id="262" r:id="rId10"/>
+    <p:sldId id="263" r:id="rId11"/>
+    <p:sldId id="264" r:id="rId12"/>
+    <p:sldId id="265" r:id="rId13"/>
+    <p:sldId id="259" r:id="rId14"/>
+    <p:sldId id="266" r:id="rId15"/>
+    <p:sldId id="260" r:id="rId16"/>
+    <p:sldId id="257" r:id="rId17"/>
   </p:sldIdLst>
   <p:sldSz cx="12192000" cy="6858000"/>
   <p:notesSz cx="6858000" cy="9144000"/>
@@ -3341,8 +3354,8 @@
         </p:nvSpPr>
         <p:spPr>
           <a:xfrm>
-            <a:off x="1524000" y="362225"/>
-            <a:ext cx="9144000" cy="804424"/>
+            <a:off x="930200" y="256495"/>
+            <a:ext cx="9856076" cy="1418897"/>
           </a:xfrm>
         </p:spPr>
         <p:txBody>
@@ -3353,8 +3366,13 @@
           <a:p>
             <a:r>
               <a:rPr lang="en-US" sz="4500" b="1" u="sng" dirty="0"/>
-              <a:t>Company XYZ - TV Campaign Report</a:t>
-            </a:r>
+              <a:t>Company XYZ - TV Campaign Report </a:t>
+            </a:r>
+            <a:r>
+              <a:rPr lang="en-US" sz="4800" dirty="0"/>
+              <a:t>Establishing a baseline: Overall Metrics</a:t>
+            </a:r>
+            <a:endParaRPr lang="en-US" sz="4500" b="1" u="sng" dirty="0"/>
           </a:p>
         </p:txBody>
       </p:sp>
@@ -3376,37 +3394,128 @@
         </p:nvSpPr>
         <p:spPr>
           <a:xfrm>
-            <a:off x="882869" y="1718059"/>
-            <a:ext cx="5213131" cy="1710941"/>
+            <a:off x="2427891" y="1718059"/>
+            <a:ext cx="6470430" cy="1710941"/>
           </a:xfrm>
         </p:spPr>
         <p:txBody>
           <a:bodyPr>
-            <a:normAutofit lnSpcReduction="10000"/>
+            <a:normAutofit fontScale="85000" lnSpcReduction="10000"/>
           </a:bodyPr>
           <a:lstStyle/>
           <a:p>
             <a:r>
               <a:rPr lang="en-US" dirty="0"/>
-              <a:t>Establishing a baseline: Overall Metrics</a:t>
-            </a:r>
-          </a:p>
-          <a:p>
-            <a:r>
-              <a:rPr lang="en-US" dirty="0"/>
-              <a:t>Total Purchases: 236</a:t>
-            </a:r>
-          </a:p>
-          <a:p>
-            <a:r>
-              <a:rPr lang="en-US" dirty="0"/>
-              <a:t>Total Spend: $221,436.84</a:t>
-            </a:r>
-          </a:p>
-          <a:p>
-            <a:r>
-              <a:rPr lang="en-US" dirty="0"/>
-              <a:t>Total Lift: 20,487 visitors</a:t>
+              <a:t>Total Purchases: 236 / Mean # of Purchases: 8 per network</a:t>
+            </a:r>
+          </a:p>
+          <a:p>
+            <a:r>
+              <a:rPr lang="en-US" dirty="0"/>
+              <a:t>Total Spend: $221,436.84 / Mean Spend: $11,654.57 per network</a:t>
+            </a:r>
+          </a:p>
+          <a:p>
+            <a:r>
+              <a:rPr lang="en-US" dirty="0"/>
+              <a:t>Total Lift: 20,487 visitors / Mean Lift: 1078 visitors per network</a:t>
+            </a:r>
+          </a:p>
+        </p:txBody>
+      </p:sp>
+      <p:sp>
+        <p:nvSpPr>
+          <p:cNvPr id="6" name="TextBox 5">
+            <a:extLst>
+              <a:ext uri="{FF2B5EF4-FFF2-40B4-BE49-F238E27FC236}">
+                <a16:creationId xmlns:a16="http://schemas.microsoft.com/office/drawing/2014/main" id="{601141DD-16F3-864B-894B-10E3B2EBA4E8}"/>
+              </a:ext>
+            </a:extLst>
+          </p:cNvPr>
+          <p:cNvSpPr txBox="1"/>
+          <p:nvPr/>
+        </p:nvSpPr>
+        <p:spPr>
+          <a:xfrm>
+            <a:off x="3099273" y="3827672"/>
+            <a:ext cx="5517929" cy="692497"/>
+          </a:xfrm>
+          <a:prstGeom prst="rect">
+            <a:avLst/>
+          </a:prstGeom>
+          <a:noFill/>
+        </p:spPr>
+        <p:txBody>
+          <a:bodyPr wrap="square" rtlCol="0">
+            <a:spAutoFit/>
+          </a:bodyPr>
+          <a:lstStyle/>
+          <a:p>
+            <a:pPr algn="ctr"/>
+            <a:r>
+              <a:rPr lang="en-US" sz="1300" dirty="0"/>
+              <a:t>Overall Cost Per Visitor: $10.81 / Average Cost Per Visitor: $23</a:t>
+            </a:r>
+          </a:p>
+          <a:p>
+            <a:pPr algn="ctr"/>
+            <a:r>
+              <a:rPr lang="en-US" sz="1300" dirty="0"/>
+              <a:t>Overall Conversion Rate: 1.15% / Average Conversion Rate: 1.4%</a:t>
+            </a:r>
+          </a:p>
+          <a:p>
+            <a:pPr algn="ctr"/>
+            <a:r>
+              <a:rPr lang="en-US" sz="1300" dirty="0"/>
+              <a:t>Overall Cost Per Acquisition: $938.29 / Average Cost Per Acquisition: $1841.35</a:t>
+            </a:r>
+          </a:p>
+        </p:txBody>
+      </p:sp>
+      <p:sp>
+        <p:nvSpPr>
+          <p:cNvPr id="7" name="TextBox 6">
+            <a:extLst>
+              <a:ext uri="{FF2B5EF4-FFF2-40B4-BE49-F238E27FC236}">
+                <a16:creationId xmlns:a16="http://schemas.microsoft.com/office/drawing/2014/main" id="{331394A8-ED2F-A24B-B409-519281F4C603}"/>
+              </a:ext>
+            </a:extLst>
+          </p:cNvPr>
+          <p:cNvSpPr txBox="1"/>
+          <p:nvPr/>
+        </p:nvSpPr>
+        <p:spPr>
+          <a:xfrm>
+            <a:off x="930200" y="4918841"/>
+            <a:ext cx="9222794" cy="1200329"/>
+          </a:xfrm>
+          <a:prstGeom prst="rect">
+            <a:avLst/>
+          </a:prstGeom>
+          <a:noFill/>
+        </p:spPr>
+        <p:txBody>
+          <a:bodyPr wrap="square" rtlCol="0">
+            <a:spAutoFit/>
+          </a:bodyPr>
+          <a:lstStyle/>
+          <a:p>
+            <a:pPr algn="ctr"/>
+            <a:r>
+              <a:rPr lang="en-US" dirty="0"/>
+              <a:t>236 Purchases were attributed to 28 distinct channels.</a:t>
+            </a:r>
+          </a:p>
+          <a:p>
+            <a:pPr algn="ctr"/>
+            <a:endParaRPr lang="en-US" dirty="0"/>
+          </a:p>
+          <a:p>
+            <a:pPr algn="ctr"/>
+            <a:r>
+              <a:rPr lang="en-US" dirty="0"/>
+              <a:t>Out of 236 purchases, 61 of them came from channels where there was no spend, spread across 13 distinct channels. Three of these purchases coming from (blank) and 13 purchases from other.</a:t>
             </a:r>
           </a:p>
         </p:txBody>
@@ -3415,6 +3524,1475 @@
     <p:extLst>
       <p:ext uri="{BB962C8B-B14F-4D97-AF65-F5344CB8AC3E}">
         <p14:creationId xmlns:p14="http://schemas.microsoft.com/office/powerpoint/2010/main" val="1061801238"/>
+      </p:ext>
+    </p:extLst>
+  </p:cSld>
+  <p:clrMapOvr>
+    <a:masterClrMapping/>
+  </p:clrMapOvr>
+</p:sld>
+</file>
+
+<file path=ppt/slides/slide10.xml><?xml version="1.0" encoding="utf-8"?>
+<p:sld xmlns:a="http://schemas.openxmlformats.org/drawingml/2006/main" xmlns:r="http://schemas.openxmlformats.org/officeDocument/2006/relationships" xmlns:p="http://schemas.openxmlformats.org/presentationml/2006/main">
+  <p:cSld>
+    <p:spTree>
+      <p:nvGrpSpPr>
+        <p:cNvPr id="1" name=""/>
+        <p:cNvGrpSpPr/>
+        <p:nvPr/>
+      </p:nvGrpSpPr>
+      <p:grpSpPr>
+        <a:xfrm>
+          <a:off x="0" y="0"/>
+          <a:ext cx="0" cy="0"/>
+          <a:chOff x="0" y="0"/>
+          <a:chExt cx="0" cy="0"/>
+        </a:xfrm>
+      </p:grpSpPr>
+      <p:sp>
+        <p:nvSpPr>
+          <p:cNvPr id="2" name="Title 1">
+            <a:extLst>
+              <a:ext uri="{FF2B5EF4-FFF2-40B4-BE49-F238E27FC236}">
+                <a16:creationId xmlns:a16="http://schemas.microsoft.com/office/drawing/2014/main" id="{48D1D4FE-F9A8-6F42-8C0D-FD45565FDB84}"/>
+              </a:ext>
+            </a:extLst>
+          </p:cNvPr>
+          <p:cNvSpPr>
+            <a:spLocks noGrp="1"/>
+          </p:cNvSpPr>
+          <p:nvPr>
+            <p:ph type="title"/>
+          </p:nvPr>
+        </p:nvSpPr>
+        <p:spPr/>
+        <p:txBody>
+          <a:bodyPr/>
+          <a:lstStyle/>
+          <a:p>
+            <a:r>
+              <a:rPr lang="en-US" dirty="0"/>
+              <a:t>Conversion Rate vs. Spend</a:t>
+            </a:r>
+          </a:p>
+        </p:txBody>
+      </p:sp>
+      <p:sp>
+        <p:nvSpPr>
+          <p:cNvPr id="3" name="Content Placeholder 2">
+            <a:extLst>
+              <a:ext uri="{FF2B5EF4-FFF2-40B4-BE49-F238E27FC236}">
+                <a16:creationId xmlns:a16="http://schemas.microsoft.com/office/drawing/2014/main" id="{A14739CF-776D-B945-A19E-8527A09C592F}"/>
+              </a:ext>
+            </a:extLst>
+          </p:cNvPr>
+          <p:cNvSpPr>
+            <a:spLocks noGrp="1"/>
+          </p:cNvSpPr>
+          <p:nvPr>
+            <p:ph idx="1"/>
+          </p:nvPr>
+        </p:nvSpPr>
+        <p:spPr>
+          <a:xfrm>
+            <a:off x="8103476" y="1825625"/>
+            <a:ext cx="3250324" cy="4667250"/>
+          </a:xfrm>
+        </p:spPr>
+        <p:txBody>
+          <a:bodyPr>
+            <a:normAutofit fontScale="62500" lnSpcReduction="20000"/>
+          </a:bodyPr>
+          <a:lstStyle/>
+          <a:p>
+            <a:pPr marL="0" indent="0">
+              <a:buNone/>
+            </a:pPr>
+            <a:r>
+              <a:rPr lang="en-US" dirty="0">
+                <a:solidFill>
+                  <a:srgbClr val="00B050"/>
+                </a:solidFill>
+              </a:rPr>
+              <a:t>High Conversion Rate, Low Spend: Good!</a:t>
+            </a:r>
+          </a:p>
+          <a:p>
+            <a:r>
+              <a:rPr lang="en-US" dirty="0">
+                <a:solidFill>
+                  <a:srgbClr val="00B050"/>
+                </a:solidFill>
+              </a:rPr>
+              <a:t>CNBC</a:t>
+            </a:r>
+          </a:p>
+          <a:p>
+            <a:r>
+              <a:rPr lang="en-US" dirty="0">
+                <a:solidFill>
+                  <a:srgbClr val="00B050"/>
+                </a:solidFill>
+              </a:rPr>
+              <a:t>Science</a:t>
+            </a:r>
+          </a:p>
+          <a:p>
+            <a:r>
+              <a:rPr lang="en-US" dirty="0">
+                <a:solidFill>
+                  <a:srgbClr val="00B050"/>
+                </a:solidFill>
+              </a:rPr>
+              <a:t>Turner Network TV</a:t>
+            </a:r>
+          </a:p>
+          <a:p>
+            <a:r>
+              <a:rPr lang="en-US" dirty="0">
+                <a:solidFill>
+                  <a:srgbClr val="00B050"/>
+                </a:solidFill>
+              </a:rPr>
+              <a:t>Comedy Central</a:t>
+            </a:r>
+          </a:p>
+          <a:p>
+            <a:r>
+              <a:rPr lang="en-US" dirty="0">
+                <a:solidFill>
+                  <a:srgbClr val="00B050"/>
+                </a:solidFill>
+              </a:rPr>
+              <a:t>NFL Network</a:t>
+            </a:r>
+          </a:p>
+          <a:p>
+            <a:r>
+              <a:rPr lang="en-US" dirty="0">
+                <a:solidFill>
+                  <a:srgbClr val="00B050"/>
+                </a:solidFill>
+              </a:rPr>
+              <a:t>The History Channel</a:t>
+            </a:r>
+          </a:p>
+          <a:p>
+            <a:pPr marL="0" indent="0">
+              <a:buNone/>
+            </a:pPr>
+            <a:r>
+              <a:rPr lang="en-US" dirty="0">
+                <a:solidFill>
+                  <a:srgbClr val="FF0000"/>
+                </a:solidFill>
+              </a:rPr>
+              <a:t>Low Conversion Rate, High Spend: Bad!</a:t>
+            </a:r>
+          </a:p>
+          <a:p>
+            <a:r>
+              <a:rPr lang="en-US" dirty="0">
+                <a:solidFill>
+                  <a:srgbClr val="FF0000"/>
+                </a:solidFill>
+              </a:rPr>
+              <a:t>Willow TV</a:t>
+            </a:r>
+          </a:p>
+          <a:p>
+            <a:r>
+              <a:rPr lang="en-US" dirty="0" err="1">
+                <a:solidFill>
+                  <a:srgbClr val="FF0000"/>
+                </a:solidFill>
+              </a:rPr>
+              <a:t>ZeeTV</a:t>
+            </a:r>
+            <a:endParaRPr lang="en-US" dirty="0">
+              <a:solidFill>
+                <a:srgbClr val="FF0000"/>
+              </a:solidFill>
+            </a:endParaRPr>
+          </a:p>
+          <a:p>
+            <a:r>
+              <a:rPr lang="en-US" dirty="0">
+                <a:solidFill>
+                  <a:srgbClr val="FF0000"/>
+                </a:solidFill>
+              </a:rPr>
+              <a:t>One America News Network</a:t>
+            </a:r>
+          </a:p>
+          <a:p>
+            <a:r>
+              <a:rPr lang="en-US" dirty="0">
+                <a:solidFill>
+                  <a:srgbClr val="FF0000"/>
+                </a:solidFill>
+              </a:rPr>
+              <a:t>Dateline</a:t>
+            </a:r>
+          </a:p>
+          <a:p>
+            <a:r>
+              <a:rPr lang="en-US" dirty="0">
+                <a:solidFill>
+                  <a:srgbClr val="FF0000"/>
+                </a:solidFill>
+              </a:rPr>
+              <a:t>Star Plus</a:t>
+            </a:r>
+          </a:p>
+          <a:p>
+            <a:endParaRPr lang="en-US" dirty="0"/>
+          </a:p>
+        </p:txBody>
+      </p:sp>
+      <p:pic>
+        <p:nvPicPr>
+          <p:cNvPr id="4" name="Picture 3">
+            <a:extLst>
+              <a:ext uri="{FF2B5EF4-FFF2-40B4-BE49-F238E27FC236}">
+                <a16:creationId xmlns:a16="http://schemas.microsoft.com/office/drawing/2014/main" id="{5F03A39D-C064-B042-BFD2-7C7AB5DA9FE8}"/>
+              </a:ext>
+            </a:extLst>
+          </p:cNvPr>
+          <p:cNvPicPr>
+            <a:picLocks noChangeAspect="1"/>
+          </p:cNvPicPr>
+          <p:nvPr/>
+        </p:nvPicPr>
+        <p:blipFill>
+          <a:blip r:embed="rId2"/>
+          <a:stretch>
+            <a:fillRect/>
+          </a:stretch>
+        </p:blipFill>
+        <p:spPr>
+          <a:xfrm>
+            <a:off x="0" y="2428875"/>
+            <a:ext cx="7937500" cy="4064000"/>
+          </a:xfrm>
+          <a:prstGeom prst="rect">
+            <a:avLst/>
+          </a:prstGeom>
+        </p:spPr>
+      </p:pic>
+    </p:spTree>
+    <p:extLst>
+      <p:ext uri="{BB962C8B-B14F-4D97-AF65-F5344CB8AC3E}">
+        <p14:creationId xmlns:p14="http://schemas.microsoft.com/office/powerpoint/2010/main" val="1598424556"/>
+      </p:ext>
+    </p:extLst>
+  </p:cSld>
+  <p:clrMapOvr>
+    <a:masterClrMapping/>
+  </p:clrMapOvr>
+</p:sld>
+</file>
+
+<file path=ppt/slides/slide11.xml><?xml version="1.0" encoding="utf-8"?>
+<p:sld xmlns:a="http://schemas.openxmlformats.org/drawingml/2006/main" xmlns:r="http://schemas.openxmlformats.org/officeDocument/2006/relationships" xmlns:p="http://schemas.openxmlformats.org/presentationml/2006/main">
+  <p:cSld>
+    <p:spTree>
+      <p:nvGrpSpPr>
+        <p:cNvPr id="1" name=""/>
+        <p:cNvGrpSpPr/>
+        <p:nvPr/>
+      </p:nvGrpSpPr>
+      <p:grpSpPr>
+        <a:xfrm>
+          <a:off x="0" y="0"/>
+          <a:ext cx="0" cy="0"/>
+          <a:chOff x="0" y="0"/>
+          <a:chExt cx="0" cy="0"/>
+        </a:xfrm>
+      </p:grpSpPr>
+      <p:sp>
+        <p:nvSpPr>
+          <p:cNvPr id="2" name="Title 1">
+            <a:extLst>
+              <a:ext uri="{FF2B5EF4-FFF2-40B4-BE49-F238E27FC236}">
+                <a16:creationId xmlns:a16="http://schemas.microsoft.com/office/drawing/2014/main" id="{6FF9B71D-71FA-E749-ABC2-338EFE55D040}"/>
+              </a:ext>
+            </a:extLst>
+          </p:cNvPr>
+          <p:cNvSpPr>
+            <a:spLocks noGrp="1"/>
+          </p:cNvSpPr>
+          <p:nvPr>
+            <p:ph type="title"/>
+          </p:nvPr>
+        </p:nvSpPr>
+        <p:spPr/>
+        <p:txBody>
+          <a:bodyPr/>
+          <a:lstStyle/>
+          <a:p>
+            <a:r>
+              <a:rPr lang="en-US" dirty="0"/>
+              <a:t>Conversion Rate vs. Cost Per Acquisition</a:t>
+            </a:r>
+          </a:p>
+        </p:txBody>
+      </p:sp>
+      <p:sp>
+        <p:nvSpPr>
+          <p:cNvPr id="3" name="Content Placeholder 2">
+            <a:extLst>
+              <a:ext uri="{FF2B5EF4-FFF2-40B4-BE49-F238E27FC236}">
+                <a16:creationId xmlns:a16="http://schemas.microsoft.com/office/drawing/2014/main" id="{107CB502-5FF7-3946-B48D-B883A1396EDF}"/>
+              </a:ext>
+            </a:extLst>
+          </p:cNvPr>
+          <p:cNvSpPr>
+            <a:spLocks noGrp="1"/>
+          </p:cNvSpPr>
+          <p:nvPr>
+            <p:ph idx="1"/>
+          </p:nvPr>
+        </p:nvSpPr>
+        <p:spPr>
+          <a:xfrm>
+            <a:off x="8111358" y="1825625"/>
+            <a:ext cx="3242441" cy="4667250"/>
+          </a:xfrm>
+        </p:spPr>
+        <p:txBody>
+          <a:bodyPr>
+            <a:normAutofit fontScale="70000" lnSpcReduction="20000"/>
+          </a:bodyPr>
+          <a:lstStyle/>
+          <a:p>
+            <a:pPr marL="0" indent="0">
+              <a:buNone/>
+            </a:pPr>
+            <a:r>
+              <a:rPr lang="en-US" dirty="0">
+                <a:solidFill>
+                  <a:srgbClr val="00B050"/>
+                </a:solidFill>
+              </a:rPr>
+              <a:t>High Conversion Rate, Low Cost Per Acquisition: Good!</a:t>
+            </a:r>
+          </a:p>
+          <a:p>
+            <a:r>
+              <a:rPr lang="en-US" dirty="0">
+                <a:solidFill>
+                  <a:srgbClr val="00B050"/>
+                </a:solidFill>
+              </a:rPr>
+              <a:t>CNBC</a:t>
+            </a:r>
+          </a:p>
+          <a:p>
+            <a:r>
+              <a:rPr lang="en-US" dirty="0">
+                <a:solidFill>
+                  <a:srgbClr val="00B050"/>
+                </a:solidFill>
+              </a:rPr>
+              <a:t>Turner Network TV</a:t>
+            </a:r>
+          </a:p>
+          <a:p>
+            <a:r>
+              <a:rPr lang="en-US" dirty="0">
+                <a:solidFill>
+                  <a:srgbClr val="00B050"/>
+                </a:solidFill>
+              </a:rPr>
+              <a:t>CNN</a:t>
+            </a:r>
+          </a:p>
+          <a:p>
+            <a:r>
+              <a:rPr lang="en-US" dirty="0">
+                <a:solidFill>
+                  <a:srgbClr val="00B050"/>
+                </a:solidFill>
+              </a:rPr>
+              <a:t>The History Channel</a:t>
+            </a:r>
+          </a:p>
+          <a:p>
+            <a:r>
+              <a:rPr lang="en-US" dirty="0">
+                <a:solidFill>
+                  <a:srgbClr val="00B050"/>
+                </a:solidFill>
+              </a:rPr>
+              <a:t>NFL Network</a:t>
+            </a:r>
+          </a:p>
+          <a:p>
+            <a:pPr marL="0" indent="0">
+              <a:buNone/>
+            </a:pPr>
+            <a:r>
+              <a:rPr lang="en-US" dirty="0">
+                <a:solidFill>
+                  <a:srgbClr val="FF0000"/>
+                </a:solidFill>
+              </a:rPr>
+              <a:t>Low Conversion Rate, High Cost Per Acquisition</a:t>
+            </a:r>
+          </a:p>
+          <a:p>
+            <a:r>
+              <a:rPr lang="en-US" dirty="0" err="1">
+                <a:solidFill>
+                  <a:srgbClr val="FF0000"/>
+                </a:solidFill>
+              </a:rPr>
+              <a:t>ZeeTV</a:t>
+            </a:r>
+            <a:endParaRPr lang="en-US" dirty="0">
+              <a:solidFill>
+                <a:srgbClr val="FF0000"/>
+              </a:solidFill>
+            </a:endParaRPr>
+          </a:p>
+          <a:p>
+            <a:r>
+              <a:rPr lang="en-US" dirty="0">
+                <a:solidFill>
+                  <a:srgbClr val="FF0000"/>
+                </a:solidFill>
+              </a:rPr>
+              <a:t>Star Plus</a:t>
+            </a:r>
+          </a:p>
+          <a:p>
+            <a:r>
+              <a:rPr lang="en-US" dirty="0">
+                <a:solidFill>
+                  <a:srgbClr val="FF0000"/>
+                </a:solidFill>
+              </a:rPr>
+              <a:t>Bloomberg</a:t>
+            </a:r>
+          </a:p>
+          <a:p>
+            <a:r>
+              <a:rPr lang="en-US" dirty="0">
+                <a:solidFill>
+                  <a:srgbClr val="FF0000"/>
+                </a:solidFill>
+              </a:rPr>
+              <a:t>Fox Sports</a:t>
+            </a:r>
+          </a:p>
+          <a:p>
+            <a:r>
+              <a:rPr lang="en-US" dirty="0">
+                <a:solidFill>
+                  <a:srgbClr val="FF0000"/>
+                </a:solidFill>
+              </a:rPr>
+              <a:t>Spectrum Sports</a:t>
+            </a:r>
+          </a:p>
+        </p:txBody>
+      </p:sp>
+      <p:pic>
+        <p:nvPicPr>
+          <p:cNvPr id="4" name="Picture 3">
+            <a:extLst>
+              <a:ext uri="{FF2B5EF4-FFF2-40B4-BE49-F238E27FC236}">
+                <a16:creationId xmlns:a16="http://schemas.microsoft.com/office/drawing/2014/main" id="{A08EE62B-DFFE-E54A-A655-CF1D3BD36B04}"/>
+              </a:ext>
+            </a:extLst>
+          </p:cNvPr>
+          <p:cNvPicPr>
+            <a:picLocks noChangeAspect="1"/>
+          </p:cNvPicPr>
+          <p:nvPr/>
+        </p:nvPicPr>
+        <p:blipFill>
+          <a:blip r:embed="rId2"/>
+          <a:stretch>
+            <a:fillRect/>
+          </a:stretch>
+        </p:blipFill>
+        <p:spPr>
+          <a:xfrm>
+            <a:off x="0" y="2466975"/>
+            <a:ext cx="7848600" cy="4025900"/>
+          </a:xfrm>
+          <a:prstGeom prst="rect">
+            <a:avLst/>
+          </a:prstGeom>
+        </p:spPr>
+      </p:pic>
+    </p:spTree>
+    <p:extLst>
+      <p:ext uri="{BB962C8B-B14F-4D97-AF65-F5344CB8AC3E}">
+        <p14:creationId xmlns:p14="http://schemas.microsoft.com/office/powerpoint/2010/main" val="3352382375"/>
+      </p:ext>
+    </p:extLst>
+  </p:cSld>
+  <p:clrMapOvr>
+    <a:masterClrMapping/>
+  </p:clrMapOvr>
+</p:sld>
+</file>
+
+<file path=ppt/slides/slide12.xml><?xml version="1.0" encoding="utf-8"?>
+<p:sld xmlns:a="http://schemas.openxmlformats.org/drawingml/2006/main" xmlns:r="http://schemas.openxmlformats.org/officeDocument/2006/relationships" xmlns:p="http://schemas.openxmlformats.org/presentationml/2006/main">
+  <p:cSld>
+    <p:spTree>
+      <p:nvGrpSpPr>
+        <p:cNvPr id="1" name=""/>
+        <p:cNvGrpSpPr/>
+        <p:nvPr/>
+      </p:nvGrpSpPr>
+      <p:grpSpPr>
+        <a:xfrm>
+          <a:off x="0" y="0"/>
+          <a:ext cx="0" cy="0"/>
+          <a:chOff x="0" y="0"/>
+          <a:chExt cx="0" cy="0"/>
+        </a:xfrm>
+      </p:grpSpPr>
+      <p:sp>
+        <p:nvSpPr>
+          <p:cNvPr id="2" name="Title 1">
+            <a:extLst>
+              <a:ext uri="{FF2B5EF4-FFF2-40B4-BE49-F238E27FC236}">
+                <a16:creationId xmlns:a16="http://schemas.microsoft.com/office/drawing/2014/main" id="{CC5D234B-5F60-F042-8B4B-5A2C00C12986}"/>
+              </a:ext>
+            </a:extLst>
+          </p:cNvPr>
+          <p:cNvSpPr>
+            <a:spLocks noGrp="1"/>
+          </p:cNvSpPr>
+          <p:nvPr>
+            <p:ph type="title"/>
+          </p:nvPr>
+        </p:nvSpPr>
+        <p:spPr/>
+        <p:txBody>
+          <a:bodyPr/>
+          <a:lstStyle/>
+          <a:p>
+            <a:r>
+              <a:rPr lang="en-US" dirty="0"/>
+              <a:t>Conversion Rate vs. Cost Per Visitor</a:t>
+            </a:r>
+          </a:p>
+        </p:txBody>
+      </p:sp>
+      <p:sp>
+        <p:nvSpPr>
+          <p:cNvPr id="3" name="Content Placeholder 2">
+            <a:extLst>
+              <a:ext uri="{FF2B5EF4-FFF2-40B4-BE49-F238E27FC236}">
+                <a16:creationId xmlns:a16="http://schemas.microsoft.com/office/drawing/2014/main" id="{80A20997-BEEB-354F-B437-929C4C757835}"/>
+              </a:ext>
+            </a:extLst>
+          </p:cNvPr>
+          <p:cNvSpPr>
+            <a:spLocks noGrp="1"/>
+          </p:cNvSpPr>
+          <p:nvPr>
+            <p:ph idx="1"/>
+          </p:nvPr>
+        </p:nvSpPr>
+        <p:spPr>
+          <a:xfrm>
+            <a:off x="7914290" y="1825625"/>
+            <a:ext cx="3439510" cy="4667250"/>
+          </a:xfrm>
+        </p:spPr>
+        <p:txBody>
+          <a:bodyPr>
+            <a:normAutofit fontScale="77500" lnSpcReduction="20000"/>
+          </a:bodyPr>
+          <a:lstStyle/>
+          <a:p>
+            <a:pPr marL="0" indent="0">
+              <a:buNone/>
+            </a:pPr>
+            <a:r>
+              <a:rPr lang="en-US" dirty="0">
+                <a:solidFill>
+                  <a:srgbClr val="00B050"/>
+                </a:solidFill>
+              </a:rPr>
+              <a:t>High Conversion Rate, Low Cost Per Visitor: Good!</a:t>
+            </a:r>
+          </a:p>
+          <a:p>
+            <a:r>
+              <a:rPr lang="en-US" dirty="0">
+                <a:solidFill>
+                  <a:srgbClr val="00B050"/>
+                </a:solidFill>
+              </a:rPr>
+              <a:t>CNBC</a:t>
+            </a:r>
+          </a:p>
+          <a:p>
+            <a:r>
+              <a:rPr lang="en-US" dirty="0">
+                <a:solidFill>
+                  <a:srgbClr val="00B050"/>
+                </a:solidFill>
+              </a:rPr>
+              <a:t>CNN</a:t>
+            </a:r>
+          </a:p>
+          <a:p>
+            <a:r>
+              <a:rPr lang="en-US" dirty="0">
+                <a:solidFill>
+                  <a:srgbClr val="00B050"/>
+                </a:solidFill>
+              </a:rPr>
+              <a:t>The History Channel</a:t>
+            </a:r>
+          </a:p>
+          <a:p>
+            <a:pPr marL="0" indent="0">
+              <a:buNone/>
+            </a:pPr>
+            <a:r>
+              <a:rPr lang="en-US" dirty="0">
+                <a:solidFill>
+                  <a:srgbClr val="FF0000"/>
+                </a:solidFill>
+              </a:rPr>
+              <a:t>Low Conversion Rate, High Cost Per Visitor:</a:t>
+            </a:r>
+          </a:p>
+          <a:p>
+            <a:r>
+              <a:rPr lang="en-US" dirty="0">
+                <a:solidFill>
+                  <a:srgbClr val="FF0000"/>
+                </a:solidFill>
+              </a:rPr>
+              <a:t>The Weather Channel</a:t>
+            </a:r>
+          </a:p>
+          <a:p>
+            <a:pPr lvl="1"/>
+            <a:r>
+              <a:rPr lang="en-US" dirty="0">
+                <a:solidFill>
+                  <a:srgbClr val="FF0000"/>
+                </a:solidFill>
+              </a:rPr>
+              <a:t>No Purchases</a:t>
+            </a:r>
+          </a:p>
+          <a:p>
+            <a:r>
+              <a:rPr lang="en-US" dirty="0">
+                <a:solidFill>
+                  <a:srgbClr val="FF0000"/>
+                </a:solidFill>
+              </a:rPr>
+              <a:t>CNBC World</a:t>
+            </a:r>
+          </a:p>
+          <a:p>
+            <a:pPr lvl="1"/>
+            <a:r>
+              <a:rPr lang="en-US" dirty="0">
+                <a:solidFill>
+                  <a:srgbClr val="FF0000"/>
+                </a:solidFill>
+              </a:rPr>
+              <a:t>No Purchases</a:t>
+            </a:r>
+          </a:p>
+          <a:p>
+            <a:r>
+              <a:rPr lang="en-US" dirty="0">
+                <a:solidFill>
+                  <a:srgbClr val="FF0000"/>
+                </a:solidFill>
+              </a:rPr>
+              <a:t>Bloomberg</a:t>
+            </a:r>
+          </a:p>
+          <a:p>
+            <a:r>
+              <a:rPr lang="en-US" dirty="0">
+                <a:solidFill>
+                  <a:srgbClr val="FF0000"/>
+                </a:solidFill>
+              </a:rPr>
+              <a:t>Spectrum Sports</a:t>
+            </a:r>
+          </a:p>
+        </p:txBody>
+      </p:sp>
+      <p:pic>
+        <p:nvPicPr>
+          <p:cNvPr id="4" name="Picture 3">
+            <a:extLst>
+              <a:ext uri="{FF2B5EF4-FFF2-40B4-BE49-F238E27FC236}">
+                <a16:creationId xmlns:a16="http://schemas.microsoft.com/office/drawing/2014/main" id="{D925BAD2-82F4-8046-88AE-CB86B64AB595}"/>
+              </a:ext>
+            </a:extLst>
+          </p:cNvPr>
+          <p:cNvPicPr>
+            <a:picLocks noChangeAspect="1"/>
+          </p:cNvPicPr>
+          <p:nvPr/>
+        </p:nvPicPr>
+        <p:blipFill>
+          <a:blip r:embed="rId2"/>
+          <a:stretch>
+            <a:fillRect/>
+          </a:stretch>
+        </p:blipFill>
+        <p:spPr>
+          <a:xfrm>
+            <a:off x="0" y="2466975"/>
+            <a:ext cx="7696200" cy="4025900"/>
+          </a:xfrm>
+          <a:prstGeom prst="rect">
+            <a:avLst/>
+          </a:prstGeom>
+        </p:spPr>
+      </p:pic>
+    </p:spTree>
+    <p:extLst>
+      <p:ext uri="{BB962C8B-B14F-4D97-AF65-F5344CB8AC3E}">
+        <p14:creationId xmlns:p14="http://schemas.microsoft.com/office/powerpoint/2010/main" val="2340744108"/>
+      </p:ext>
+    </p:extLst>
+  </p:cSld>
+  <p:clrMapOvr>
+    <a:masterClrMapping/>
+  </p:clrMapOvr>
+</p:sld>
+</file>
+
+<file path=ppt/slides/slide13.xml><?xml version="1.0" encoding="utf-8"?>
+<p:sld xmlns:a="http://schemas.openxmlformats.org/drawingml/2006/main" xmlns:r="http://schemas.openxmlformats.org/officeDocument/2006/relationships" xmlns:p="http://schemas.openxmlformats.org/presentationml/2006/main">
+  <p:cSld>
+    <p:spTree>
+      <p:nvGrpSpPr>
+        <p:cNvPr id="1" name=""/>
+        <p:cNvGrpSpPr/>
+        <p:nvPr/>
+      </p:nvGrpSpPr>
+      <p:grpSpPr>
+        <a:xfrm>
+          <a:off x="0" y="0"/>
+          <a:ext cx="0" cy="0"/>
+          <a:chOff x="0" y="0"/>
+          <a:chExt cx="0" cy="0"/>
+        </a:xfrm>
+      </p:grpSpPr>
+      <p:sp>
+        <p:nvSpPr>
+          <p:cNvPr id="2" name="Title 1">
+            <a:extLst>
+              <a:ext uri="{FF2B5EF4-FFF2-40B4-BE49-F238E27FC236}">
+                <a16:creationId xmlns:a16="http://schemas.microsoft.com/office/drawing/2014/main" id="{2F7C8249-31CE-AA49-9438-02A6376574B8}"/>
+              </a:ext>
+            </a:extLst>
+          </p:cNvPr>
+          <p:cNvSpPr>
+            <a:spLocks noGrp="1"/>
+          </p:cNvSpPr>
+          <p:nvPr>
+            <p:ph type="title"/>
+          </p:nvPr>
+        </p:nvSpPr>
+        <p:spPr/>
+        <p:txBody>
+          <a:bodyPr/>
+          <a:lstStyle/>
+          <a:p>
+            <a:r>
+              <a:rPr lang="en-US" dirty="0"/>
+              <a:t>Which networks to spend more money?</a:t>
+            </a:r>
+          </a:p>
+        </p:txBody>
+      </p:sp>
+      <p:sp>
+        <p:nvSpPr>
+          <p:cNvPr id="3" name="Content Placeholder 2">
+            <a:extLst>
+              <a:ext uri="{FF2B5EF4-FFF2-40B4-BE49-F238E27FC236}">
+                <a16:creationId xmlns:a16="http://schemas.microsoft.com/office/drawing/2014/main" id="{1C1C557B-C411-B84E-A91A-3CD9E3005B67}"/>
+              </a:ext>
+            </a:extLst>
+          </p:cNvPr>
+          <p:cNvSpPr>
+            <a:spLocks noGrp="1"/>
+          </p:cNvSpPr>
+          <p:nvPr>
+            <p:ph idx="1"/>
+          </p:nvPr>
+        </p:nvSpPr>
+        <p:spPr/>
+        <p:txBody>
+          <a:bodyPr>
+            <a:normAutofit fontScale="32500" lnSpcReduction="20000"/>
+          </a:bodyPr>
+          <a:lstStyle/>
+          <a:p>
+            <a:r>
+              <a:rPr lang="en-US" dirty="0"/>
+              <a:t>MSNBC (+2)</a:t>
+            </a:r>
+          </a:p>
+          <a:p>
+            <a:r>
+              <a:rPr lang="en-US" dirty="0"/>
+              <a:t>CNBC (+5)</a:t>
+            </a:r>
+          </a:p>
+          <a:p>
+            <a:r>
+              <a:rPr lang="en-US" dirty="0">
+                <a:solidFill>
+                  <a:srgbClr val="00B050"/>
+                </a:solidFill>
+              </a:rPr>
+              <a:t>Science (+1)</a:t>
+            </a:r>
+          </a:p>
+          <a:p>
+            <a:r>
+              <a:rPr lang="en-US" dirty="0">
+                <a:solidFill>
+                  <a:srgbClr val="00B050"/>
+                </a:solidFill>
+              </a:rPr>
+              <a:t>Turner Network TV (+2)</a:t>
+            </a:r>
+          </a:p>
+          <a:p>
+            <a:r>
+              <a:rPr lang="en-US" dirty="0">
+                <a:solidFill>
+                  <a:srgbClr val="00B050"/>
+                </a:solidFill>
+              </a:rPr>
+              <a:t>Comedy Central (+1)</a:t>
+            </a:r>
+          </a:p>
+          <a:p>
+            <a:r>
+              <a:rPr lang="en-US" dirty="0">
+                <a:solidFill>
+                  <a:srgbClr val="00B050"/>
+                </a:solidFill>
+              </a:rPr>
+              <a:t>NFL Network (+2)</a:t>
+            </a:r>
+          </a:p>
+          <a:p>
+            <a:r>
+              <a:rPr lang="en-US" dirty="0">
+                <a:solidFill>
+                  <a:srgbClr val="00B050"/>
+                </a:solidFill>
+              </a:rPr>
+              <a:t>The History Channel (+3)</a:t>
+            </a:r>
+          </a:p>
+          <a:p>
+            <a:r>
+              <a:rPr lang="en-US" dirty="0">
+                <a:solidFill>
+                  <a:srgbClr val="00B050"/>
+                </a:solidFill>
+              </a:rPr>
+              <a:t>CNN (+2)</a:t>
+            </a:r>
+            <a:endParaRPr lang="en-US" dirty="0"/>
+          </a:p>
+          <a:p>
+            <a:pPr marL="0" indent="0">
+              <a:buNone/>
+            </a:pPr>
+            <a:r>
+              <a:rPr lang="en-US" dirty="0"/>
+              <a:t>Maybe?</a:t>
+            </a:r>
+          </a:p>
+          <a:p>
+            <a:r>
+              <a:rPr lang="en-US" dirty="0"/>
+              <a:t>Dish Network (+1 / -1)</a:t>
+            </a:r>
+          </a:p>
+          <a:p>
+            <a:r>
+              <a:rPr lang="en-US" dirty="0"/>
+              <a:t>Dateline (+ 1 / -2)</a:t>
+            </a:r>
+          </a:p>
+          <a:p>
+            <a:pPr marL="0" indent="0">
+              <a:buNone/>
+            </a:pPr>
+            <a:r>
+              <a:rPr lang="en-US" dirty="0"/>
+              <a:t>Honorable Mentions, no spend yet customers attributed their purchase to these channels:</a:t>
+            </a:r>
+          </a:p>
+          <a:p>
+            <a:r>
+              <a:rPr lang="en-US" dirty="0"/>
+              <a:t>Fox News (+2)</a:t>
+            </a:r>
+          </a:p>
+          <a:p>
+            <a:r>
+              <a:rPr lang="en-US" dirty="0" err="1"/>
+              <a:t>Aapka</a:t>
+            </a:r>
+            <a:r>
+              <a:rPr lang="en-US" dirty="0"/>
+              <a:t> Colors</a:t>
+            </a:r>
+          </a:p>
+          <a:p>
+            <a:r>
+              <a:rPr lang="en-US" dirty="0"/>
+              <a:t>HGTV</a:t>
+            </a:r>
+          </a:p>
+          <a:p>
+            <a:r>
+              <a:rPr lang="en-US" dirty="0"/>
+              <a:t>ESPN</a:t>
+            </a:r>
+          </a:p>
+          <a:p>
+            <a:r>
+              <a:rPr lang="en-US" dirty="0"/>
+              <a:t>Sony Entertainment TV</a:t>
+            </a:r>
+          </a:p>
+          <a:p>
+            <a:r>
+              <a:rPr lang="en-US" dirty="0"/>
+              <a:t>Television Food Network</a:t>
+            </a:r>
+          </a:p>
+          <a:p>
+            <a:r>
+              <a:rPr lang="en-US" dirty="0"/>
+              <a:t>Other</a:t>
+            </a:r>
+          </a:p>
+          <a:p>
+            <a:endParaRPr lang="en-US" dirty="0"/>
+          </a:p>
+        </p:txBody>
+      </p:sp>
+    </p:spTree>
+    <p:extLst>
+      <p:ext uri="{BB962C8B-B14F-4D97-AF65-F5344CB8AC3E}">
+        <p14:creationId xmlns:p14="http://schemas.microsoft.com/office/powerpoint/2010/main" val="3321289849"/>
+      </p:ext>
+    </p:extLst>
+  </p:cSld>
+  <p:clrMapOvr>
+    <a:masterClrMapping/>
+  </p:clrMapOvr>
+</p:sld>
+</file>
+
+<file path=ppt/slides/slide14.xml><?xml version="1.0" encoding="utf-8"?>
+<p:sld xmlns:a="http://schemas.openxmlformats.org/drawingml/2006/main" xmlns:r="http://schemas.openxmlformats.org/officeDocument/2006/relationships" xmlns:p="http://schemas.openxmlformats.org/presentationml/2006/main">
+  <p:cSld>
+    <p:spTree>
+      <p:nvGrpSpPr>
+        <p:cNvPr id="1" name=""/>
+        <p:cNvGrpSpPr/>
+        <p:nvPr/>
+      </p:nvGrpSpPr>
+      <p:grpSpPr>
+        <a:xfrm>
+          <a:off x="0" y="0"/>
+          <a:ext cx="0" cy="0"/>
+          <a:chOff x="0" y="0"/>
+          <a:chExt cx="0" cy="0"/>
+        </a:xfrm>
+      </p:grpSpPr>
+      <p:sp>
+        <p:nvSpPr>
+          <p:cNvPr id="2" name="Title 1">
+            <a:extLst>
+              <a:ext uri="{FF2B5EF4-FFF2-40B4-BE49-F238E27FC236}">
+                <a16:creationId xmlns:a16="http://schemas.microsoft.com/office/drawing/2014/main" id="{2F7C8249-31CE-AA49-9438-02A6376574B8}"/>
+              </a:ext>
+            </a:extLst>
+          </p:cNvPr>
+          <p:cNvSpPr>
+            <a:spLocks noGrp="1"/>
+          </p:cNvSpPr>
+          <p:nvPr>
+            <p:ph type="title"/>
+          </p:nvPr>
+        </p:nvSpPr>
+        <p:spPr/>
+        <p:txBody>
+          <a:bodyPr/>
+          <a:lstStyle/>
+          <a:p>
+            <a:r>
+              <a:rPr lang="en-US" dirty="0"/>
+              <a:t>Which networks to stop spending on?</a:t>
+            </a:r>
+          </a:p>
+        </p:txBody>
+      </p:sp>
+      <p:sp>
+        <p:nvSpPr>
+          <p:cNvPr id="3" name="Content Placeholder 2">
+            <a:extLst>
+              <a:ext uri="{FF2B5EF4-FFF2-40B4-BE49-F238E27FC236}">
+                <a16:creationId xmlns:a16="http://schemas.microsoft.com/office/drawing/2014/main" id="{1C1C557B-C411-B84E-A91A-3CD9E3005B67}"/>
+              </a:ext>
+            </a:extLst>
+          </p:cNvPr>
+          <p:cNvSpPr>
+            <a:spLocks noGrp="1"/>
+          </p:cNvSpPr>
+          <p:nvPr>
+            <p:ph idx="1"/>
+          </p:nvPr>
+        </p:nvSpPr>
+        <p:spPr/>
+        <p:txBody>
+          <a:bodyPr>
+            <a:normAutofit lnSpcReduction="10000"/>
+          </a:bodyPr>
+          <a:lstStyle/>
+          <a:p>
+            <a:r>
+              <a:rPr lang="en-US" dirty="0" err="1"/>
+              <a:t>ZeeTV</a:t>
+            </a:r>
+            <a:r>
+              <a:rPr lang="en-US" dirty="0"/>
+              <a:t> (-4)</a:t>
+            </a:r>
+          </a:p>
+          <a:p>
+            <a:r>
+              <a:rPr lang="en-US" dirty="0"/>
+              <a:t>Star Plus (-4)</a:t>
+            </a:r>
+          </a:p>
+          <a:p>
+            <a:r>
+              <a:rPr lang="en-US" dirty="0" err="1"/>
+              <a:t>WillowTV</a:t>
+            </a:r>
+            <a:r>
+              <a:rPr lang="en-US" dirty="0"/>
+              <a:t> (-1)  (Highest number of purchases though…)</a:t>
+            </a:r>
+          </a:p>
+          <a:p>
+            <a:r>
+              <a:rPr lang="en-US" dirty="0"/>
+              <a:t>One America News Network (-1)</a:t>
+            </a:r>
+          </a:p>
+          <a:p>
+            <a:r>
+              <a:rPr lang="en-US" dirty="0"/>
+              <a:t>Bloomberg (-2)</a:t>
+            </a:r>
+          </a:p>
+          <a:p>
+            <a:r>
+              <a:rPr lang="en-US" dirty="0"/>
+              <a:t>Fox Sports (-1)</a:t>
+            </a:r>
+          </a:p>
+          <a:p>
+            <a:r>
+              <a:rPr lang="en-US" dirty="0"/>
+              <a:t>Spectrum Sports (-2)</a:t>
+            </a:r>
+          </a:p>
+          <a:p>
+            <a:r>
+              <a:rPr lang="en-US" dirty="0"/>
+              <a:t>Weather Channel (-1) (no purchases)</a:t>
+            </a:r>
+          </a:p>
+          <a:p>
+            <a:r>
+              <a:rPr lang="en-US" dirty="0"/>
+              <a:t>CNBC World (-1) (no purchases)</a:t>
+            </a:r>
+          </a:p>
+        </p:txBody>
+      </p:sp>
+    </p:spTree>
+    <p:extLst>
+      <p:ext uri="{BB962C8B-B14F-4D97-AF65-F5344CB8AC3E}">
+        <p14:creationId xmlns:p14="http://schemas.microsoft.com/office/powerpoint/2010/main" val="1730546313"/>
+      </p:ext>
+    </p:extLst>
+  </p:cSld>
+  <p:clrMapOvr>
+    <a:masterClrMapping/>
+  </p:clrMapOvr>
+</p:sld>
+</file>
+
+<file path=ppt/slides/slide15.xml><?xml version="1.0" encoding="utf-8"?>
+<p:sld xmlns:a="http://schemas.openxmlformats.org/drawingml/2006/main" xmlns:r="http://schemas.openxmlformats.org/officeDocument/2006/relationships" xmlns:p="http://schemas.openxmlformats.org/presentationml/2006/main">
+  <p:cSld>
+    <p:spTree>
+      <p:nvGrpSpPr>
+        <p:cNvPr id="1" name=""/>
+        <p:cNvGrpSpPr/>
+        <p:nvPr/>
+      </p:nvGrpSpPr>
+      <p:grpSpPr>
+        <a:xfrm>
+          <a:off x="0" y="0"/>
+          <a:ext cx="0" cy="0"/>
+          <a:chOff x="0" y="0"/>
+          <a:chExt cx="0" cy="0"/>
+        </a:xfrm>
+      </p:grpSpPr>
+      <p:sp>
+        <p:nvSpPr>
+          <p:cNvPr id="2" name="Title 1">
+            <a:extLst>
+              <a:ext uri="{FF2B5EF4-FFF2-40B4-BE49-F238E27FC236}">
+                <a16:creationId xmlns:a16="http://schemas.microsoft.com/office/drawing/2014/main" id="{ADCCBD9C-B189-DB4D-804E-F5212D8F5292}"/>
+              </a:ext>
+            </a:extLst>
+          </p:cNvPr>
+          <p:cNvSpPr>
+            <a:spLocks noGrp="1"/>
+          </p:cNvSpPr>
+          <p:nvPr>
+            <p:ph type="title"/>
+          </p:nvPr>
+        </p:nvSpPr>
+        <p:spPr/>
+        <p:txBody>
+          <a:bodyPr/>
+          <a:lstStyle/>
+          <a:p>
+            <a:r>
+              <a:rPr lang="en-US" dirty="0"/>
+              <a:t>How can the exit survey be improved?</a:t>
+            </a:r>
+          </a:p>
+        </p:txBody>
+      </p:sp>
+      <p:sp>
+        <p:nvSpPr>
+          <p:cNvPr id="3" name="Content Placeholder 2">
+            <a:extLst>
+              <a:ext uri="{FF2B5EF4-FFF2-40B4-BE49-F238E27FC236}">
+                <a16:creationId xmlns:a16="http://schemas.microsoft.com/office/drawing/2014/main" id="{448AAE7E-E421-C044-9F25-718A2B3FF13A}"/>
+              </a:ext>
+            </a:extLst>
+          </p:cNvPr>
+          <p:cNvSpPr>
+            <a:spLocks noGrp="1"/>
+          </p:cNvSpPr>
+          <p:nvPr>
+            <p:ph idx="1"/>
+          </p:nvPr>
+        </p:nvSpPr>
+        <p:spPr/>
+        <p:txBody>
+          <a:bodyPr/>
+          <a:lstStyle/>
+          <a:p>
+            <a:endParaRPr lang="en-US"/>
+          </a:p>
+        </p:txBody>
+      </p:sp>
+    </p:spTree>
+    <p:extLst>
+      <p:ext uri="{BB962C8B-B14F-4D97-AF65-F5344CB8AC3E}">
+        <p14:creationId xmlns:p14="http://schemas.microsoft.com/office/powerpoint/2010/main" val="434633413"/>
+      </p:ext>
+    </p:extLst>
+  </p:cSld>
+  <p:clrMapOvr>
+    <a:masterClrMapping/>
+  </p:clrMapOvr>
+</p:sld>
+</file>
+
+<file path=ppt/slides/slide16.xml><?xml version="1.0" encoding="utf-8"?>
+<p:sld xmlns:a="http://schemas.openxmlformats.org/drawingml/2006/main" xmlns:r="http://schemas.openxmlformats.org/officeDocument/2006/relationships" xmlns:p="http://schemas.openxmlformats.org/presentationml/2006/main">
+  <p:cSld>
+    <p:spTree>
+      <p:nvGrpSpPr>
+        <p:cNvPr id="1" name=""/>
+        <p:cNvGrpSpPr/>
+        <p:nvPr/>
+      </p:nvGrpSpPr>
+      <p:grpSpPr>
+        <a:xfrm>
+          <a:off x="0" y="0"/>
+          <a:ext cx="0" cy="0"/>
+          <a:chOff x="0" y="0"/>
+          <a:chExt cx="0" cy="0"/>
+        </a:xfrm>
+      </p:grpSpPr>
+      <p:sp>
+        <p:nvSpPr>
+          <p:cNvPr id="2" name="Title 1">
+            <a:extLst>
+              <a:ext uri="{FF2B5EF4-FFF2-40B4-BE49-F238E27FC236}">
+                <a16:creationId xmlns:a16="http://schemas.microsoft.com/office/drawing/2014/main" id="{F6852974-C78D-6746-8FCE-6EAAABFA335B}"/>
+              </a:ext>
+            </a:extLst>
+          </p:cNvPr>
+          <p:cNvSpPr>
+            <a:spLocks noGrp="1"/>
+          </p:cNvSpPr>
+          <p:nvPr>
+            <p:ph type="title"/>
+          </p:nvPr>
+        </p:nvSpPr>
+        <p:spPr>
+          <a:xfrm>
+            <a:off x="838200" y="365125"/>
+            <a:ext cx="10515600" cy="801523"/>
+          </a:xfrm>
+        </p:spPr>
+        <p:txBody>
+          <a:bodyPr>
+            <a:normAutofit/>
+          </a:bodyPr>
+          <a:lstStyle/>
+          <a:p>
+            <a:pPr algn="ctr"/>
+            <a:r>
+              <a:rPr lang="en-US" sz="4800" b="1" u="sng" dirty="0"/>
+              <a:t>Purchases by Network</a:t>
+            </a:r>
+          </a:p>
+        </p:txBody>
+      </p:sp>
+      <p:sp>
+        <p:nvSpPr>
+          <p:cNvPr id="6" name="TextBox 5">
+            <a:extLst>
+              <a:ext uri="{FF2B5EF4-FFF2-40B4-BE49-F238E27FC236}">
+                <a16:creationId xmlns:a16="http://schemas.microsoft.com/office/drawing/2014/main" id="{F5AA0B09-2283-4C46-BE06-EA9FFF19D7CD}"/>
+              </a:ext>
+            </a:extLst>
+          </p:cNvPr>
+          <p:cNvSpPr txBox="1"/>
+          <p:nvPr/>
+        </p:nvSpPr>
+        <p:spPr>
+          <a:xfrm>
+            <a:off x="694531" y="1560788"/>
+            <a:ext cx="5395836" cy="646331"/>
+          </a:xfrm>
+          <a:prstGeom prst="rect">
+            <a:avLst/>
+          </a:prstGeom>
+          <a:noFill/>
+        </p:spPr>
+        <p:txBody>
+          <a:bodyPr wrap="none" rtlCol="0">
+            <a:spAutoFit/>
+          </a:bodyPr>
+          <a:lstStyle/>
+          <a:p>
+            <a:r>
+              <a:rPr lang="en-US" dirty="0"/>
+              <a:t>Which Networks had the highest number of purchases?</a:t>
+            </a:r>
+          </a:p>
+          <a:p>
+            <a:pPr marL="342900" indent="-342900">
+              <a:buFont typeface="+mj-lt"/>
+              <a:buAutoNum type="arabicPeriod"/>
+            </a:pPr>
+            <a:endParaRPr lang="en-US" dirty="0"/>
+          </a:p>
+        </p:txBody>
+      </p:sp>
+      <p:pic>
+        <p:nvPicPr>
+          <p:cNvPr id="11" name="Picture 10">
+            <a:extLst>
+              <a:ext uri="{FF2B5EF4-FFF2-40B4-BE49-F238E27FC236}">
+                <a16:creationId xmlns:a16="http://schemas.microsoft.com/office/drawing/2014/main" id="{757A2D71-6BC8-8D40-BE71-BC9D20DE3B57}"/>
+              </a:ext>
+            </a:extLst>
+          </p:cNvPr>
+          <p:cNvPicPr>
+            <a:picLocks noChangeAspect="1"/>
+          </p:cNvPicPr>
+          <p:nvPr/>
+        </p:nvPicPr>
+        <p:blipFill>
+          <a:blip r:embed="rId2"/>
+          <a:stretch>
+            <a:fillRect/>
+          </a:stretch>
+        </p:blipFill>
+        <p:spPr>
+          <a:xfrm>
+            <a:off x="167947" y="2128291"/>
+            <a:ext cx="5928053" cy="3237719"/>
+          </a:xfrm>
+          <a:prstGeom prst="rect">
+            <a:avLst/>
+          </a:prstGeom>
+        </p:spPr>
+      </p:pic>
+      <p:pic>
+        <p:nvPicPr>
+          <p:cNvPr id="12" name="Picture 11">
+            <a:extLst>
+              <a:ext uri="{FF2B5EF4-FFF2-40B4-BE49-F238E27FC236}">
+                <a16:creationId xmlns:a16="http://schemas.microsoft.com/office/drawing/2014/main" id="{F7086285-F5A6-9345-AEE9-D4D8E8C1AF4E}"/>
+              </a:ext>
+            </a:extLst>
+          </p:cNvPr>
+          <p:cNvPicPr>
+            <a:picLocks noChangeAspect="1"/>
+          </p:cNvPicPr>
+          <p:nvPr/>
+        </p:nvPicPr>
+        <p:blipFill>
+          <a:blip r:embed="rId3"/>
+          <a:stretch>
+            <a:fillRect/>
+          </a:stretch>
+        </p:blipFill>
+        <p:spPr>
+          <a:xfrm>
+            <a:off x="6095999" y="2285947"/>
+            <a:ext cx="5384571" cy="3080063"/>
+          </a:xfrm>
+          <a:prstGeom prst="rect">
+            <a:avLst/>
+          </a:prstGeom>
+        </p:spPr>
+      </p:pic>
+      <p:sp>
+        <p:nvSpPr>
+          <p:cNvPr id="13" name="Rectangle 12">
+            <a:extLst>
+              <a:ext uri="{FF2B5EF4-FFF2-40B4-BE49-F238E27FC236}">
+                <a16:creationId xmlns:a16="http://schemas.microsoft.com/office/drawing/2014/main" id="{1A53E844-7C62-D64A-88E6-B607BDB684F0}"/>
+              </a:ext>
+            </a:extLst>
+          </p:cNvPr>
+          <p:cNvSpPr/>
+          <p:nvPr/>
+        </p:nvSpPr>
+        <p:spPr>
+          <a:xfrm>
+            <a:off x="6090367" y="1568564"/>
+            <a:ext cx="6096000" cy="646331"/>
+          </a:xfrm>
+          <a:prstGeom prst="rect">
+            <a:avLst/>
+          </a:prstGeom>
+        </p:spPr>
+        <p:txBody>
+          <a:bodyPr>
+            <a:spAutoFit/>
+          </a:bodyPr>
+          <a:lstStyle/>
+          <a:p>
+            <a:r>
+              <a:rPr lang="en-US" dirty="0"/>
+              <a:t>Which Networks had the lowest number of purchases?</a:t>
+            </a:r>
+          </a:p>
+          <a:p>
+            <a:pPr marL="342900" indent="-342900">
+              <a:buFont typeface="+mj-lt"/>
+              <a:buAutoNum type="arabicPeriod"/>
+            </a:pPr>
+            <a:endParaRPr lang="en-US" dirty="0"/>
+          </a:p>
+        </p:txBody>
+      </p:sp>
+      <p:sp>
+        <p:nvSpPr>
+          <p:cNvPr id="14" name="TextBox 13">
+            <a:extLst>
+              <a:ext uri="{FF2B5EF4-FFF2-40B4-BE49-F238E27FC236}">
+                <a16:creationId xmlns:a16="http://schemas.microsoft.com/office/drawing/2014/main" id="{7396449F-1EC0-B348-B651-E6FAB6EF8C1F}"/>
+              </a:ext>
+            </a:extLst>
+          </p:cNvPr>
+          <p:cNvSpPr txBox="1"/>
+          <p:nvPr/>
+        </p:nvSpPr>
+        <p:spPr>
+          <a:xfrm>
+            <a:off x="3626069" y="5778062"/>
+            <a:ext cx="5290615" cy="923330"/>
+          </a:xfrm>
+          <a:prstGeom prst="rect">
+            <a:avLst/>
+          </a:prstGeom>
+          <a:noFill/>
+        </p:spPr>
+        <p:txBody>
+          <a:bodyPr wrap="none" rtlCol="0">
+            <a:spAutoFit/>
+          </a:bodyPr>
+          <a:lstStyle/>
+          <a:p>
+            <a:r>
+              <a:rPr lang="en-US" b="1" u="sng" dirty="0"/>
+              <a:t>Summary: </a:t>
+            </a:r>
+          </a:p>
+          <a:p>
+            <a:pPr marL="285750" indent="-285750">
+              <a:buFont typeface="Arial" panose="020B0604020202020204" pitchFamily="34" charset="0"/>
+              <a:buChar char="•"/>
+            </a:pPr>
+            <a:r>
+              <a:rPr lang="en-US" dirty="0"/>
+              <a:t>Willow TV was by far the best performer</a:t>
+            </a:r>
+          </a:p>
+          <a:p>
+            <a:pPr marL="285750" indent="-285750">
+              <a:buFont typeface="Arial" panose="020B0604020202020204" pitchFamily="34" charset="0"/>
+              <a:buChar char="•"/>
+            </a:pPr>
+            <a:r>
+              <a:rPr lang="en-US" dirty="0"/>
+              <a:t>CNBC World and Weather Channel had 0 purchases</a:t>
+            </a:r>
+          </a:p>
+        </p:txBody>
+      </p:sp>
+    </p:spTree>
+    <p:extLst>
+      <p:ext uri="{BB962C8B-B14F-4D97-AF65-F5344CB8AC3E}">
+        <p14:creationId xmlns:p14="http://schemas.microsoft.com/office/powerpoint/2010/main" val="2242541250"/>
       </p:ext>
     </p:extLst>
   </p:cSld>
@@ -3446,7 +5024,7 @@
           <p:cNvPr id="2" name="Title 1">
             <a:extLst>
               <a:ext uri="{FF2B5EF4-FFF2-40B4-BE49-F238E27FC236}">
-                <a16:creationId xmlns:a16="http://schemas.microsoft.com/office/drawing/2014/main" id="{F6852974-C78D-6746-8FCE-6EAAABFA335B}"/>
+                <a16:creationId xmlns:a16="http://schemas.microsoft.com/office/drawing/2014/main" id="{F0BC2E7C-0600-674B-B12E-0BBCF2353AE3}"/>
               </a:ext>
             </a:extLst>
           </p:cNvPr>
@@ -3457,228 +5035,47 @@
             <p:ph type="title"/>
           </p:nvPr>
         </p:nvSpPr>
-        <p:spPr>
-          <a:xfrm>
-            <a:off x="838200" y="365125"/>
-            <a:ext cx="10515600" cy="801523"/>
-          </a:xfrm>
-        </p:spPr>
-        <p:txBody>
-          <a:bodyPr>
-            <a:normAutofit/>
-          </a:bodyPr>
-          <a:lstStyle/>
-          <a:p>
-            <a:pPr algn="ctr"/>
-            <a:r>
-              <a:rPr lang="en-US" sz="4800" b="1" u="sng" dirty="0"/>
-              <a:t>Purchases by Network</a:t>
-            </a:r>
-          </a:p>
-        </p:txBody>
-      </p:sp>
-      <p:sp>
-        <p:nvSpPr>
-          <p:cNvPr id="6" name="TextBox 5">
-            <a:extLst>
-              <a:ext uri="{FF2B5EF4-FFF2-40B4-BE49-F238E27FC236}">
-                <a16:creationId xmlns:a16="http://schemas.microsoft.com/office/drawing/2014/main" id="{F5AA0B09-2283-4C46-BE06-EA9FFF19D7CD}"/>
-              </a:ext>
-            </a:extLst>
-          </p:cNvPr>
-          <p:cNvSpPr txBox="1"/>
-          <p:nvPr/>
-        </p:nvSpPr>
-        <p:spPr>
-          <a:xfrm>
-            <a:off x="694531" y="1560788"/>
-            <a:ext cx="5395836" cy="646331"/>
-          </a:xfrm>
-          <a:prstGeom prst="rect">
-            <a:avLst/>
-          </a:prstGeom>
-          <a:noFill/>
-        </p:spPr>
-        <p:txBody>
-          <a:bodyPr wrap="none" rtlCol="0">
-            <a:spAutoFit/>
-          </a:bodyPr>
-          <a:lstStyle/>
-          <a:p>
-            <a:r>
-              <a:rPr lang="en-US" dirty="0"/>
-              <a:t>Which Networks had the highest number of purchases?</a:t>
-            </a:r>
-          </a:p>
-          <a:p>
-            <a:pPr marL="342900" indent="-342900">
-              <a:buFont typeface="+mj-lt"/>
-              <a:buAutoNum type="arabicPeriod"/>
-            </a:pPr>
-            <a:endParaRPr lang="en-US" dirty="0"/>
-          </a:p>
-        </p:txBody>
-      </p:sp>
-      <p:pic>
-        <p:nvPicPr>
-          <p:cNvPr id="11" name="Picture 10">
-            <a:extLst>
-              <a:ext uri="{FF2B5EF4-FFF2-40B4-BE49-F238E27FC236}">
-                <a16:creationId xmlns:a16="http://schemas.microsoft.com/office/drawing/2014/main" id="{757A2D71-6BC8-8D40-BE71-BC9D20DE3B57}"/>
-              </a:ext>
-            </a:extLst>
-          </p:cNvPr>
-          <p:cNvPicPr>
-            <a:picLocks noChangeAspect="1"/>
-          </p:cNvPicPr>
-          <p:nvPr/>
-        </p:nvPicPr>
-        <p:blipFill>
-          <a:blip r:embed="rId2"/>
-          <a:stretch>
-            <a:fillRect/>
-          </a:stretch>
-        </p:blipFill>
-        <p:spPr>
-          <a:xfrm>
-            <a:off x="167947" y="2128291"/>
-            <a:ext cx="5928053" cy="3237719"/>
-          </a:xfrm>
-          <a:prstGeom prst="rect">
-            <a:avLst/>
-          </a:prstGeom>
-        </p:spPr>
-      </p:pic>
-      <p:pic>
-        <p:nvPicPr>
-          <p:cNvPr id="12" name="Picture 11">
-            <a:extLst>
-              <a:ext uri="{FF2B5EF4-FFF2-40B4-BE49-F238E27FC236}">
-                <a16:creationId xmlns:a16="http://schemas.microsoft.com/office/drawing/2014/main" id="{F7086285-F5A6-9345-AEE9-D4D8E8C1AF4E}"/>
-              </a:ext>
-            </a:extLst>
-          </p:cNvPr>
-          <p:cNvPicPr>
-            <a:picLocks noChangeAspect="1"/>
-          </p:cNvPicPr>
-          <p:nvPr/>
-        </p:nvPicPr>
-        <p:blipFill>
-          <a:blip r:embed="rId3"/>
-          <a:stretch>
-            <a:fillRect/>
-          </a:stretch>
-        </p:blipFill>
-        <p:spPr>
-          <a:xfrm>
-            <a:off x="6095999" y="2285947"/>
-            <a:ext cx="5384571" cy="3080063"/>
-          </a:xfrm>
-          <a:prstGeom prst="rect">
-            <a:avLst/>
-          </a:prstGeom>
-        </p:spPr>
-      </p:pic>
-      <p:sp>
-        <p:nvSpPr>
-          <p:cNvPr id="13" name="Rectangle 12">
-            <a:extLst>
-              <a:ext uri="{FF2B5EF4-FFF2-40B4-BE49-F238E27FC236}">
-                <a16:creationId xmlns:a16="http://schemas.microsoft.com/office/drawing/2014/main" id="{1A53E844-7C62-D64A-88E6-B607BDB684F0}"/>
-              </a:ext>
-            </a:extLst>
-          </p:cNvPr>
-          <p:cNvSpPr/>
-          <p:nvPr/>
-        </p:nvSpPr>
-        <p:spPr>
-          <a:xfrm>
-            <a:off x="6090367" y="1568564"/>
-            <a:ext cx="6096000" cy="646331"/>
-          </a:xfrm>
-          <a:prstGeom prst="rect">
-            <a:avLst/>
-          </a:prstGeom>
-        </p:spPr>
-        <p:txBody>
-          <a:bodyPr>
-            <a:spAutoFit/>
-          </a:bodyPr>
-          <a:lstStyle/>
-          <a:p>
-            <a:r>
-              <a:rPr lang="en-US" dirty="0"/>
-              <a:t>Which Networks had the lowest number of purchases?</a:t>
-            </a:r>
-          </a:p>
-          <a:p>
-            <a:pPr marL="342900" indent="-342900">
-              <a:buFont typeface="+mj-lt"/>
-              <a:buAutoNum type="arabicPeriod"/>
-            </a:pPr>
-            <a:endParaRPr lang="en-US" dirty="0"/>
-          </a:p>
-        </p:txBody>
-      </p:sp>
-      <p:sp>
-        <p:nvSpPr>
-          <p:cNvPr id="14" name="TextBox 13">
-            <a:extLst>
-              <a:ext uri="{FF2B5EF4-FFF2-40B4-BE49-F238E27FC236}">
-                <a16:creationId xmlns:a16="http://schemas.microsoft.com/office/drawing/2014/main" id="{7396449F-1EC0-B348-B651-E6FAB6EF8C1F}"/>
-              </a:ext>
-            </a:extLst>
-          </p:cNvPr>
-          <p:cNvSpPr txBox="1"/>
-          <p:nvPr/>
-        </p:nvSpPr>
-        <p:spPr>
-          <a:xfrm>
-            <a:off x="3626069" y="5778062"/>
-            <a:ext cx="5290615" cy="923330"/>
-          </a:xfrm>
-          <a:prstGeom prst="rect">
-            <a:avLst/>
-          </a:prstGeom>
-          <a:noFill/>
-        </p:spPr>
-        <p:txBody>
-          <a:bodyPr wrap="none" rtlCol="0">
-            <a:spAutoFit/>
-          </a:bodyPr>
-          <a:lstStyle/>
-          <a:p>
-            <a:r>
-              <a:rPr lang="en-US" b="1" u="sng" dirty="0"/>
-              <a:t>Summary: </a:t>
-            </a:r>
-          </a:p>
-          <a:p>
-            <a:pPr marL="285750" indent="-285750">
-              <a:buFont typeface="Arial" panose="020B0604020202020204" pitchFamily="34" charset="0"/>
-              <a:buChar char="•"/>
-            </a:pPr>
-            <a:r>
-              <a:rPr lang="en-US" dirty="0"/>
-              <a:t>Willow TV was by far the best performer</a:t>
-            </a:r>
-          </a:p>
-          <a:p>
-            <a:pPr marL="285750" indent="-285750">
-              <a:buFont typeface="Arial" panose="020B0604020202020204" pitchFamily="34" charset="0"/>
-              <a:buChar char="•"/>
-            </a:pPr>
-            <a:r>
-              <a:rPr lang="en-US" dirty="0"/>
-              <a:t>CNBC World and Weather Channel had 0 purchases</a:t>
-            </a:r>
+        <p:spPr/>
+        <p:txBody>
+          <a:bodyPr/>
+          <a:lstStyle/>
+          <a:p>
+            <a:r>
+              <a:rPr lang="en-US" dirty="0"/>
+              <a:t>How Much does it cost to acquire a customer through TV?</a:t>
+            </a:r>
+          </a:p>
+        </p:txBody>
+      </p:sp>
+      <p:sp>
+        <p:nvSpPr>
+          <p:cNvPr id="3" name="Content Placeholder 2">
+            <a:extLst>
+              <a:ext uri="{FF2B5EF4-FFF2-40B4-BE49-F238E27FC236}">
+                <a16:creationId xmlns:a16="http://schemas.microsoft.com/office/drawing/2014/main" id="{374F79D5-E7B5-1948-A619-5FF7532735E1}"/>
+              </a:ext>
+            </a:extLst>
+          </p:cNvPr>
+          <p:cNvSpPr>
+            <a:spLocks noGrp="1"/>
+          </p:cNvSpPr>
+          <p:nvPr>
+            <p:ph idx="1"/>
+          </p:nvPr>
+        </p:nvSpPr>
+        <p:spPr/>
+        <p:txBody>
+          <a:bodyPr/>
+          <a:lstStyle/>
+          <a:p>
+            <a:endParaRPr lang="en-US"/>
           </a:p>
         </p:txBody>
       </p:sp>
     </p:spTree>
     <p:extLst>
       <p:ext uri="{BB962C8B-B14F-4D97-AF65-F5344CB8AC3E}">
-        <p14:creationId xmlns:p14="http://schemas.microsoft.com/office/powerpoint/2010/main" val="2242541250"/>
+        <p14:creationId xmlns:p14="http://schemas.microsoft.com/office/powerpoint/2010/main" val="258733784"/>
       </p:ext>
     </p:extLst>
   </p:cSld>
@@ -3710,6 +5107,902 @@
           <p:cNvPr id="2" name="Title 1">
             <a:extLst>
               <a:ext uri="{FF2B5EF4-FFF2-40B4-BE49-F238E27FC236}">
+                <a16:creationId xmlns:a16="http://schemas.microsoft.com/office/drawing/2014/main" id="{BFBD3564-4406-9348-8420-CC0C384942AB}"/>
+              </a:ext>
+            </a:extLst>
+          </p:cNvPr>
+          <p:cNvSpPr>
+            <a:spLocks noGrp="1"/>
+          </p:cNvSpPr>
+          <p:nvPr>
+            <p:ph type="title"/>
+          </p:nvPr>
+        </p:nvSpPr>
+        <p:spPr>
+          <a:xfrm>
+            <a:off x="838200" y="365125"/>
+            <a:ext cx="10515600" cy="721109"/>
+          </a:xfrm>
+        </p:spPr>
+        <p:txBody>
+          <a:bodyPr/>
+          <a:lstStyle/>
+          <a:p>
+            <a:r>
+              <a:rPr lang="en-US" dirty="0"/>
+              <a:t>Cost efficiency – Cost Per Visitor (Spend / Lift)</a:t>
+            </a:r>
+          </a:p>
+        </p:txBody>
+      </p:sp>
+      <p:sp>
+        <p:nvSpPr>
+          <p:cNvPr id="4" name="TextBox 3">
+            <a:extLst>
+              <a:ext uri="{FF2B5EF4-FFF2-40B4-BE49-F238E27FC236}">
+                <a16:creationId xmlns:a16="http://schemas.microsoft.com/office/drawing/2014/main" id="{383DEC32-9657-BB44-B537-0B83B701CB1A}"/>
+              </a:ext>
+            </a:extLst>
+          </p:cNvPr>
+          <p:cNvSpPr txBox="1"/>
+          <p:nvPr/>
+        </p:nvSpPr>
+        <p:spPr>
+          <a:xfrm>
+            <a:off x="7276004" y="1825626"/>
+            <a:ext cx="4077796" cy="1754326"/>
+          </a:xfrm>
+          <a:prstGeom prst="rect">
+            <a:avLst/>
+          </a:prstGeom>
+          <a:noFill/>
+        </p:spPr>
+        <p:txBody>
+          <a:bodyPr wrap="square" rtlCol="0">
+            <a:spAutoFit/>
+          </a:bodyPr>
+          <a:lstStyle/>
+          <a:p>
+            <a:pPr algn="ctr"/>
+            <a:r>
+              <a:rPr lang="en-US" u="sng" dirty="0"/>
+              <a:t>Least Cost Efficient</a:t>
+            </a:r>
+          </a:p>
+          <a:p>
+            <a:pPr marL="342900" indent="-342900">
+              <a:buFont typeface="+mj-lt"/>
+              <a:buAutoNum type="arabicPeriod"/>
+            </a:pPr>
+            <a:r>
+              <a:rPr lang="en-US" dirty="0"/>
+              <a:t>Comedy Central</a:t>
+            </a:r>
+          </a:p>
+          <a:p>
+            <a:pPr marL="342900" indent="-342900">
+              <a:buFont typeface="+mj-lt"/>
+              <a:buAutoNum type="arabicPeriod"/>
+            </a:pPr>
+            <a:r>
+              <a:rPr lang="en-US" dirty="0"/>
+              <a:t>Science</a:t>
+            </a:r>
+          </a:p>
+          <a:p>
+            <a:pPr marL="342900" indent="-342900">
+              <a:buFont typeface="+mj-lt"/>
+              <a:buAutoNum type="arabicPeriod"/>
+            </a:pPr>
+            <a:r>
+              <a:rPr lang="en-US" dirty="0"/>
+              <a:t>The Weather Channel</a:t>
+            </a:r>
+          </a:p>
+          <a:p>
+            <a:pPr marL="342900" indent="-342900">
+              <a:buFont typeface="+mj-lt"/>
+              <a:buAutoNum type="arabicPeriod"/>
+            </a:pPr>
+            <a:r>
+              <a:rPr lang="en-US" dirty="0"/>
+              <a:t>Turner Network TV</a:t>
+            </a:r>
+          </a:p>
+          <a:p>
+            <a:pPr marL="342900" indent="-342900">
+              <a:buFont typeface="+mj-lt"/>
+              <a:buAutoNum type="arabicPeriod"/>
+            </a:pPr>
+            <a:r>
+              <a:rPr lang="en-US" dirty="0"/>
+              <a:t>NFL Network</a:t>
+            </a:r>
+          </a:p>
+        </p:txBody>
+      </p:sp>
+      <p:pic>
+        <p:nvPicPr>
+          <p:cNvPr id="5" name="Picture 4">
+            <a:extLst>
+              <a:ext uri="{FF2B5EF4-FFF2-40B4-BE49-F238E27FC236}">
+                <a16:creationId xmlns:a16="http://schemas.microsoft.com/office/drawing/2014/main" id="{EB58D7E7-F63B-D142-9B20-BB0557DBE1A0}"/>
+              </a:ext>
+            </a:extLst>
+          </p:cNvPr>
+          <p:cNvPicPr>
+            <a:picLocks noChangeAspect="1"/>
+          </p:cNvPicPr>
+          <p:nvPr/>
+        </p:nvPicPr>
+        <p:blipFill>
+          <a:blip r:embed="rId2"/>
+          <a:stretch>
+            <a:fillRect/>
+          </a:stretch>
+        </p:blipFill>
+        <p:spPr>
+          <a:xfrm>
+            <a:off x="838199" y="4078227"/>
+            <a:ext cx="4673600" cy="2413000"/>
+          </a:xfrm>
+          <a:prstGeom prst="rect">
+            <a:avLst/>
+          </a:prstGeom>
+        </p:spPr>
+      </p:pic>
+      <p:pic>
+        <p:nvPicPr>
+          <p:cNvPr id="6" name="Picture 5">
+            <a:extLst>
+              <a:ext uri="{FF2B5EF4-FFF2-40B4-BE49-F238E27FC236}">
+                <a16:creationId xmlns:a16="http://schemas.microsoft.com/office/drawing/2014/main" id="{B1DB4E45-19EC-FC4F-95DB-9AE8E9204240}"/>
+              </a:ext>
+            </a:extLst>
+          </p:cNvPr>
+          <p:cNvPicPr>
+            <a:picLocks noChangeAspect="1"/>
+          </p:cNvPicPr>
+          <p:nvPr/>
+        </p:nvPicPr>
+        <p:blipFill>
+          <a:blip r:embed="rId3"/>
+          <a:stretch>
+            <a:fillRect/>
+          </a:stretch>
+        </p:blipFill>
+        <p:spPr>
+          <a:xfrm>
+            <a:off x="7276004" y="4076580"/>
+            <a:ext cx="4077796" cy="2414647"/>
+          </a:xfrm>
+          <a:prstGeom prst="rect">
+            <a:avLst/>
+          </a:prstGeom>
+        </p:spPr>
+      </p:pic>
+      <p:sp>
+        <p:nvSpPr>
+          <p:cNvPr id="7" name="TextBox 6">
+            <a:extLst>
+              <a:ext uri="{FF2B5EF4-FFF2-40B4-BE49-F238E27FC236}">
+                <a16:creationId xmlns:a16="http://schemas.microsoft.com/office/drawing/2014/main" id="{792F16FA-B850-E64E-AEE1-4B87F8D8E58E}"/>
+              </a:ext>
+            </a:extLst>
+          </p:cNvPr>
+          <p:cNvSpPr txBox="1"/>
+          <p:nvPr/>
+        </p:nvSpPr>
+        <p:spPr>
+          <a:xfrm>
+            <a:off x="838199" y="1832962"/>
+            <a:ext cx="4673600" cy="1754326"/>
+          </a:xfrm>
+          <a:prstGeom prst="rect">
+            <a:avLst/>
+          </a:prstGeom>
+          <a:noFill/>
+        </p:spPr>
+        <p:txBody>
+          <a:bodyPr wrap="square" rtlCol="0">
+            <a:spAutoFit/>
+          </a:bodyPr>
+          <a:lstStyle/>
+          <a:p>
+            <a:pPr algn="ctr"/>
+            <a:r>
+              <a:rPr lang="en-US" u="sng" dirty="0"/>
+              <a:t>Most Cost Efficient</a:t>
+            </a:r>
+          </a:p>
+          <a:p>
+            <a:pPr marL="342900" indent="-342900">
+              <a:buFont typeface="+mj-lt"/>
+              <a:buAutoNum type="arabicPeriod"/>
+            </a:pPr>
+            <a:r>
+              <a:rPr lang="en-US" dirty="0"/>
+              <a:t>Dish Network</a:t>
+            </a:r>
+          </a:p>
+          <a:p>
+            <a:pPr marL="342900" indent="-342900">
+              <a:buFont typeface="+mj-lt"/>
+              <a:buAutoNum type="arabicPeriod"/>
+            </a:pPr>
+            <a:r>
+              <a:rPr lang="en-US" dirty="0"/>
+              <a:t>Willow TV</a:t>
+            </a:r>
+          </a:p>
+          <a:p>
+            <a:pPr marL="342900" indent="-342900">
+              <a:buFont typeface="+mj-lt"/>
+              <a:buAutoNum type="arabicPeriod"/>
+            </a:pPr>
+            <a:r>
+              <a:rPr lang="en-US" dirty="0"/>
+              <a:t>Star Plus</a:t>
+            </a:r>
+          </a:p>
+          <a:p>
+            <a:pPr marL="342900" indent="-342900">
+              <a:buFont typeface="+mj-lt"/>
+              <a:buAutoNum type="arabicPeriod"/>
+            </a:pPr>
+            <a:r>
+              <a:rPr lang="en-US" dirty="0"/>
+              <a:t>MSNBC</a:t>
+            </a:r>
+          </a:p>
+          <a:p>
+            <a:pPr marL="342900" indent="-342900">
+              <a:buFont typeface="+mj-lt"/>
+              <a:buAutoNum type="arabicPeriod"/>
+            </a:pPr>
+            <a:r>
+              <a:rPr lang="en-US" dirty="0"/>
+              <a:t>One America News Network</a:t>
+            </a:r>
+          </a:p>
+        </p:txBody>
+      </p:sp>
+    </p:spTree>
+    <p:extLst>
+      <p:ext uri="{BB962C8B-B14F-4D97-AF65-F5344CB8AC3E}">
+        <p14:creationId xmlns:p14="http://schemas.microsoft.com/office/powerpoint/2010/main" val="543254064"/>
+      </p:ext>
+    </p:extLst>
+  </p:cSld>
+  <p:clrMapOvr>
+    <a:masterClrMapping/>
+  </p:clrMapOvr>
+</p:sld>
+</file>
+
+<file path=ppt/slides/slide4.xml><?xml version="1.0" encoding="utf-8"?>
+<p:sld xmlns:a="http://schemas.openxmlformats.org/drawingml/2006/main" xmlns:r="http://schemas.openxmlformats.org/officeDocument/2006/relationships" xmlns:p="http://schemas.openxmlformats.org/presentationml/2006/main">
+  <p:cSld>
+    <p:spTree>
+      <p:nvGrpSpPr>
+        <p:cNvPr id="1" name=""/>
+        <p:cNvGrpSpPr/>
+        <p:nvPr/>
+      </p:nvGrpSpPr>
+      <p:grpSpPr>
+        <a:xfrm>
+          <a:off x="0" y="0"/>
+          <a:ext cx="0" cy="0"/>
+          <a:chOff x="0" y="0"/>
+          <a:chExt cx="0" cy="0"/>
+        </a:xfrm>
+      </p:grpSpPr>
+      <p:sp>
+        <p:nvSpPr>
+          <p:cNvPr id="2" name="Title 1">
+            <a:extLst>
+              <a:ext uri="{FF2B5EF4-FFF2-40B4-BE49-F238E27FC236}">
+                <a16:creationId xmlns:a16="http://schemas.microsoft.com/office/drawing/2014/main" id="{BFBD3564-4406-9348-8420-CC0C384942AB}"/>
+              </a:ext>
+            </a:extLst>
+          </p:cNvPr>
+          <p:cNvSpPr>
+            <a:spLocks noGrp="1"/>
+          </p:cNvSpPr>
+          <p:nvPr>
+            <p:ph type="title"/>
+          </p:nvPr>
+        </p:nvSpPr>
+        <p:spPr/>
+        <p:txBody>
+          <a:bodyPr/>
+          <a:lstStyle/>
+          <a:p>
+            <a:r>
+              <a:rPr lang="en-US" dirty="0"/>
+              <a:t>Cost efficiency – Cost Per Acquisition (Spend / Purchases)</a:t>
+            </a:r>
+          </a:p>
+        </p:txBody>
+      </p:sp>
+      <p:sp>
+        <p:nvSpPr>
+          <p:cNvPr id="3" name="Content Placeholder 2">
+            <a:extLst>
+              <a:ext uri="{FF2B5EF4-FFF2-40B4-BE49-F238E27FC236}">
+                <a16:creationId xmlns:a16="http://schemas.microsoft.com/office/drawing/2014/main" id="{DCFA7F9A-9DB0-724D-8344-7F1A7DA6339E}"/>
+              </a:ext>
+            </a:extLst>
+          </p:cNvPr>
+          <p:cNvSpPr>
+            <a:spLocks noGrp="1"/>
+          </p:cNvSpPr>
+          <p:nvPr>
+            <p:ph idx="1"/>
+          </p:nvPr>
+        </p:nvSpPr>
+        <p:spPr>
+          <a:xfrm>
+            <a:off x="838200" y="1825625"/>
+            <a:ext cx="2803634" cy="4078561"/>
+          </a:xfrm>
+        </p:spPr>
+        <p:txBody>
+          <a:bodyPr/>
+          <a:lstStyle/>
+          <a:p>
+            <a:pPr marL="0" indent="0">
+              <a:buNone/>
+            </a:pPr>
+            <a:r>
+              <a:rPr lang="en-US" dirty="0"/>
+              <a:t>Best</a:t>
+            </a:r>
+          </a:p>
+          <a:p>
+            <a:pPr marL="514350" indent="-514350">
+              <a:buFont typeface="+mj-lt"/>
+              <a:buAutoNum type="arabicPeriod"/>
+            </a:pPr>
+            <a:r>
+              <a:rPr lang="en-US" dirty="0"/>
+              <a:t>CNBC</a:t>
+            </a:r>
+          </a:p>
+          <a:p>
+            <a:pPr marL="514350" indent="-514350">
+              <a:buFont typeface="+mj-lt"/>
+              <a:buAutoNum type="arabicPeriod"/>
+            </a:pPr>
+            <a:r>
+              <a:rPr lang="en-US" dirty="0"/>
+              <a:t>Dish Network</a:t>
+            </a:r>
+          </a:p>
+          <a:p>
+            <a:pPr marL="514350" indent="-514350">
+              <a:buFont typeface="+mj-lt"/>
+              <a:buAutoNum type="arabicPeriod"/>
+            </a:pPr>
+            <a:r>
+              <a:rPr lang="en-US" dirty="0"/>
+              <a:t>MSNBC</a:t>
+            </a:r>
+          </a:p>
+          <a:p>
+            <a:pPr marL="514350" indent="-514350">
+              <a:buFont typeface="+mj-lt"/>
+              <a:buAutoNum type="arabicPeriod"/>
+            </a:pPr>
+            <a:r>
+              <a:rPr lang="en-US" dirty="0"/>
+              <a:t>CNN</a:t>
+            </a:r>
+          </a:p>
+          <a:p>
+            <a:pPr marL="514350" indent="-514350">
+              <a:buFont typeface="+mj-lt"/>
+              <a:buAutoNum type="arabicPeriod"/>
+            </a:pPr>
+            <a:r>
+              <a:rPr lang="en-US" dirty="0" err="1"/>
+              <a:t>WillowTV</a:t>
+            </a:r>
+            <a:endParaRPr lang="en-US" dirty="0"/>
+          </a:p>
+          <a:p>
+            <a:pPr marL="514350" indent="-514350">
+              <a:buFont typeface="+mj-lt"/>
+              <a:buAutoNum type="arabicPeriod"/>
+            </a:pPr>
+            <a:endParaRPr lang="en-US" dirty="0"/>
+          </a:p>
+        </p:txBody>
+      </p:sp>
+      <p:sp>
+        <p:nvSpPr>
+          <p:cNvPr id="4" name="TextBox 3">
+            <a:extLst>
+              <a:ext uri="{FF2B5EF4-FFF2-40B4-BE49-F238E27FC236}">
+                <a16:creationId xmlns:a16="http://schemas.microsoft.com/office/drawing/2014/main" id="{383DEC32-9657-BB44-B537-0B83B701CB1A}"/>
+              </a:ext>
+            </a:extLst>
+          </p:cNvPr>
+          <p:cNvSpPr txBox="1"/>
+          <p:nvPr/>
+        </p:nvSpPr>
+        <p:spPr>
+          <a:xfrm>
+            <a:off x="6096000" y="1883978"/>
+            <a:ext cx="2325413" cy="2308324"/>
+          </a:xfrm>
+          <a:prstGeom prst="rect">
+            <a:avLst/>
+          </a:prstGeom>
+          <a:noFill/>
+        </p:spPr>
+        <p:txBody>
+          <a:bodyPr wrap="square" rtlCol="0">
+            <a:spAutoFit/>
+          </a:bodyPr>
+          <a:lstStyle/>
+          <a:p>
+            <a:r>
+              <a:rPr lang="en-US" dirty="0"/>
+              <a:t>Worst</a:t>
+            </a:r>
+          </a:p>
+          <a:p>
+            <a:pPr marL="342900" indent="-342900">
+              <a:buFont typeface="+mj-lt"/>
+              <a:buAutoNum type="arabicPeriod"/>
+            </a:pPr>
+            <a:r>
+              <a:rPr lang="en-US" dirty="0"/>
+              <a:t>Weather Channel</a:t>
+            </a:r>
+          </a:p>
+          <a:p>
+            <a:pPr marL="800100" lvl="1" indent="-342900">
+              <a:buFont typeface="Arial" panose="020B0604020202020204" pitchFamily="34" charset="0"/>
+              <a:buChar char="•"/>
+            </a:pPr>
+            <a:r>
+              <a:rPr lang="en-US" dirty="0"/>
+              <a:t>No Purchases</a:t>
+            </a:r>
+          </a:p>
+          <a:p>
+            <a:pPr marL="342900" indent="-342900">
+              <a:buFont typeface="+mj-lt"/>
+              <a:buAutoNum type="arabicPeriod"/>
+            </a:pPr>
+            <a:r>
+              <a:rPr lang="en-US" dirty="0"/>
+              <a:t>CNBC World</a:t>
+            </a:r>
+          </a:p>
+          <a:p>
+            <a:pPr marL="800100" lvl="1" indent="-342900">
+              <a:buFont typeface="Arial" panose="020B0604020202020204" pitchFamily="34" charset="0"/>
+              <a:buChar char="•"/>
+            </a:pPr>
+            <a:r>
+              <a:rPr lang="en-US" dirty="0"/>
+              <a:t>No Purchases</a:t>
+            </a:r>
+          </a:p>
+          <a:p>
+            <a:pPr marL="342900" indent="-342900">
+              <a:buFont typeface="+mj-lt"/>
+              <a:buAutoNum type="arabicPeriod"/>
+            </a:pPr>
+            <a:r>
+              <a:rPr lang="en-US" dirty="0" err="1"/>
+              <a:t>ZeeTV</a:t>
+            </a:r>
+            <a:endParaRPr lang="en-US" dirty="0"/>
+          </a:p>
+          <a:p>
+            <a:pPr marL="342900" indent="-342900">
+              <a:buFont typeface="+mj-lt"/>
+              <a:buAutoNum type="arabicPeriod"/>
+            </a:pPr>
+            <a:r>
+              <a:rPr lang="en-US" dirty="0"/>
+              <a:t>Comedy Central</a:t>
+            </a:r>
+          </a:p>
+          <a:p>
+            <a:pPr marL="342900" indent="-342900">
+              <a:buFont typeface="+mj-lt"/>
+              <a:buAutoNum type="arabicPeriod"/>
+            </a:pPr>
+            <a:r>
+              <a:rPr lang="en-US" dirty="0"/>
+              <a:t>Star Plus</a:t>
+            </a:r>
+          </a:p>
+        </p:txBody>
+      </p:sp>
+    </p:spTree>
+    <p:extLst>
+      <p:ext uri="{BB962C8B-B14F-4D97-AF65-F5344CB8AC3E}">
+        <p14:creationId xmlns:p14="http://schemas.microsoft.com/office/powerpoint/2010/main" val="1418554515"/>
+      </p:ext>
+    </p:extLst>
+  </p:cSld>
+  <p:clrMapOvr>
+    <a:masterClrMapping/>
+  </p:clrMapOvr>
+</p:sld>
+</file>
+
+<file path=ppt/slides/slide5.xml><?xml version="1.0" encoding="utf-8"?>
+<p:sld xmlns:a="http://schemas.openxmlformats.org/drawingml/2006/main" xmlns:r="http://schemas.openxmlformats.org/officeDocument/2006/relationships" xmlns:p="http://schemas.openxmlformats.org/presentationml/2006/main">
+  <p:cSld>
+    <p:spTree>
+      <p:nvGrpSpPr>
+        <p:cNvPr id="1" name=""/>
+        <p:cNvGrpSpPr/>
+        <p:nvPr/>
+      </p:nvGrpSpPr>
+      <p:grpSpPr>
+        <a:xfrm>
+          <a:off x="0" y="0"/>
+          <a:ext cx="0" cy="0"/>
+          <a:chOff x="0" y="0"/>
+          <a:chExt cx="0" cy="0"/>
+        </a:xfrm>
+      </p:grpSpPr>
+      <p:sp>
+        <p:nvSpPr>
+          <p:cNvPr id="2" name="Title 1">
+            <a:extLst>
+              <a:ext uri="{FF2B5EF4-FFF2-40B4-BE49-F238E27FC236}">
+                <a16:creationId xmlns:a16="http://schemas.microsoft.com/office/drawing/2014/main" id="{BFBD3564-4406-9348-8420-CC0C384942AB}"/>
+              </a:ext>
+            </a:extLst>
+          </p:cNvPr>
+          <p:cNvSpPr>
+            <a:spLocks noGrp="1"/>
+          </p:cNvSpPr>
+          <p:nvPr>
+            <p:ph type="title"/>
+          </p:nvPr>
+        </p:nvSpPr>
+        <p:spPr/>
+        <p:txBody>
+          <a:bodyPr/>
+          <a:lstStyle/>
+          <a:p>
+            <a:r>
+              <a:rPr lang="en-US" dirty="0"/>
+              <a:t>Conversion rate (Purchases/Lift)</a:t>
+            </a:r>
+          </a:p>
+        </p:txBody>
+      </p:sp>
+      <p:sp>
+        <p:nvSpPr>
+          <p:cNvPr id="3" name="Content Placeholder 2">
+            <a:extLst>
+              <a:ext uri="{FF2B5EF4-FFF2-40B4-BE49-F238E27FC236}">
+                <a16:creationId xmlns:a16="http://schemas.microsoft.com/office/drawing/2014/main" id="{DCFA7F9A-9DB0-724D-8344-7F1A7DA6339E}"/>
+              </a:ext>
+            </a:extLst>
+          </p:cNvPr>
+          <p:cNvSpPr>
+            <a:spLocks noGrp="1"/>
+          </p:cNvSpPr>
+          <p:nvPr>
+            <p:ph idx="1"/>
+          </p:nvPr>
+        </p:nvSpPr>
+        <p:spPr>
+          <a:xfrm>
+            <a:off x="838200" y="1825625"/>
+            <a:ext cx="2803634" cy="4078561"/>
+          </a:xfrm>
+        </p:spPr>
+        <p:txBody>
+          <a:bodyPr/>
+          <a:lstStyle/>
+          <a:p>
+            <a:pPr marL="0" indent="0">
+              <a:buNone/>
+            </a:pPr>
+            <a:r>
+              <a:rPr lang="en-US" dirty="0"/>
+              <a:t>Best</a:t>
+            </a:r>
+          </a:p>
+          <a:p>
+            <a:pPr marL="514350" indent="-514350">
+              <a:buFont typeface="+mj-lt"/>
+              <a:buAutoNum type="arabicPeriod"/>
+            </a:pPr>
+            <a:r>
+              <a:rPr lang="en-US" dirty="0"/>
+              <a:t>CNBC</a:t>
+            </a:r>
+          </a:p>
+          <a:p>
+            <a:pPr marL="514350" indent="-514350">
+              <a:buFont typeface="+mj-lt"/>
+              <a:buAutoNum type="arabicPeriod"/>
+            </a:pPr>
+            <a:r>
+              <a:rPr lang="en-US" dirty="0"/>
+              <a:t>Science</a:t>
+            </a:r>
+          </a:p>
+          <a:p>
+            <a:pPr marL="514350" indent="-514350">
+              <a:buFont typeface="+mj-lt"/>
+              <a:buAutoNum type="arabicPeriod"/>
+            </a:pPr>
+            <a:r>
+              <a:rPr lang="en-US" dirty="0"/>
+              <a:t>Turner Network TV</a:t>
+            </a:r>
+          </a:p>
+          <a:p>
+            <a:pPr marL="514350" indent="-514350">
+              <a:buFont typeface="+mj-lt"/>
+              <a:buAutoNum type="arabicPeriod"/>
+            </a:pPr>
+            <a:r>
+              <a:rPr lang="en-US" dirty="0"/>
+              <a:t>CNN</a:t>
+            </a:r>
+          </a:p>
+          <a:p>
+            <a:pPr marL="514350" indent="-514350">
+              <a:buFont typeface="+mj-lt"/>
+              <a:buAutoNum type="arabicPeriod"/>
+            </a:pPr>
+            <a:r>
+              <a:rPr lang="en-US" dirty="0"/>
+              <a:t>Comedy Central</a:t>
+            </a:r>
+          </a:p>
+          <a:p>
+            <a:pPr marL="514350" indent="-514350">
+              <a:buFont typeface="+mj-lt"/>
+              <a:buAutoNum type="arabicPeriod"/>
+            </a:pPr>
+            <a:endParaRPr lang="en-US" dirty="0"/>
+          </a:p>
+        </p:txBody>
+      </p:sp>
+      <p:sp>
+        <p:nvSpPr>
+          <p:cNvPr id="4" name="TextBox 3">
+            <a:extLst>
+              <a:ext uri="{FF2B5EF4-FFF2-40B4-BE49-F238E27FC236}">
+                <a16:creationId xmlns:a16="http://schemas.microsoft.com/office/drawing/2014/main" id="{383DEC32-9657-BB44-B537-0B83B701CB1A}"/>
+              </a:ext>
+            </a:extLst>
+          </p:cNvPr>
+          <p:cNvSpPr txBox="1"/>
+          <p:nvPr/>
+        </p:nvSpPr>
+        <p:spPr>
+          <a:xfrm>
+            <a:off x="6096000" y="1883978"/>
+            <a:ext cx="2325413" cy="2308324"/>
+          </a:xfrm>
+          <a:prstGeom prst="rect">
+            <a:avLst/>
+          </a:prstGeom>
+          <a:noFill/>
+        </p:spPr>
+        <p:txBody>
+          <a:bodyPr wrap="square" rtlCol="0">
+            <a:spAutoFit/>
+          </a:bodyPr>
+          <a:lstStyle/>
+          <a:p>
+            <a:r>
+              <a:rPr lang="en-US" dirty="0"/>
+              <a:t>Worst</a:t>
+            </a:r>
+          </a:p>
+          <a:p>
+            <a:pPr marL="342900" indent="-342900">
+              <a:buFont typeface="+mj-lt"/>
+              <a:buAutoNum type="arabicPeriod"/>
+            </a:pPr>
+            <a:r>
+              <a:rPr lang="en-US" dirty="0"/>
+              <a:t>Weather Channel</a:t>
+            </a:r>
+          </a:p>
+          <a:p>
+            <a:pPr marL="800100" lvl="1" indent="-342900">
+              <a:buFont typeface="Arial" panose="020B0604020202020204" pitchFamily="34" charset="0"/>
+              <a:buChar char="•"/>
+            </a:pPr>
+            <a:r>
+              <a:rPr lang="en-US" dirty="0"/>
+              <a:t>No Purchases</a:t>
+            </a:r>
+          </a:p>
+          <a:p>
+            <a:pPr marL="342900" indent="-342900">
+              <a:buFont typeface="+mj-lt"/>
+              <a:buAutoNum type="arabicPeriod"/>
+            </a:pPr>
+            <a:r>
+              <a:rPr lang="en-US" dirty="0"/>
+              <a:t>CNBC World</a:t>
+            </a:r>
+          </a:p>
+          <a:p>
+            <a:pPr marL="800100" lvl="1" indent="-342900">
+              <a:buFont typeface="Arial" panose="020B0604020202020204" pitchFamily="34" charset="0"/>
+              <a:buChar char="•"/>
+            </a:pPr>
+            <a:r>
+              <a:rPr lang="en-US" dirty="0"/>
+              <a:t>No Purchases</a:t>
+            </a:r>
+          </a:p>
+          <a:p>
+            <a:pPr marL="342900" indent="-342900">
+              <a:buFont typeface="+mj-lt"/>
+              <a:buAutoNum type="arabicPeriod"/>
+            </a:pPr>
+            <a:r>
+              <a:rPr lang="en-US" dirty="0"/>
+              <a:t>Star Plus</a:t>
+            </a:r>
+          </a:p>
+          <a:p>
+            <a:pPr marL="342900" indent="-342900">
+              <a:buFont typeface="+mj-lt"/>
+              <a:buAutoNum type="arabicPeriod"/>
+            </a:pPr>
+            <a:r>
+              <a:rPr lang="en-US" dirty="0" err="1"/>
+              <a:t>ZeeTV</a:t>
+            </a:r>
+            <a:endParaRPr lang="en-US" dirty="0"/>
+          </a:p>
+          <a:p>
+            <a:pPr marL="342900" indent="-342900">
+              <a:buFont typeface="+mj-lt"/>
+              <a:buAutoNum type="arabicPeriod"/>
+            </a:pPr>
+            <a:r>
+              <a:rPr lang="en-US" dirty="0"/>
+              <a:t>Dish Network</a:t>
+            </a:r>
+          </a:p>
+        </p:txBody>
+      </p:sp>
+    </p:spTree>
+    <p:extLst>
+      <p:ext uri="{BB962C8B-B14F-4D97-AF65-F5344CB8AC3E}">
+        <p14:creationId xmlns:p14="http://schemas.microsoft.com/office/powerpoint/2010/main" val="3902424537"/>
+      </p:ext>
+    </p:extLst>
+  </p:cSld>
+  <p:clrMapOvr>
+    <a:masterClrMapping/>
+  </p:clrMapOvr>
+</p:sld>
+</file>
+
+<file path=ppt/slides/slide6.xml><?xml version="1.0" encoding="utf-8"?>
+<p:sld xmlns:a="http://schemas.openxmlformats.org/drawingml/2006/main" xmlns:r="http://schemas.openxmlformats.org/officeDocument/2006/relationships" xmlns:p="http://schemas.openxmlformats.org/presentationml/2006/main">
+  <p:cSld>
+    <p:spTree>
+      <p:nvGrpSpPr>
+        <p:cNvPr id="1" name=""/>
+        <p:cNvGrpSpPr/>
+        <p:nvPr/>
+      </p:nvGrpSpPr>
+      <p:grpSpPr>
+        <a:xfrm>
+          <a:off x="0" y="0"/>
+          <a:ext cx="0" cy="0"/>
+          <a:chOff x="0" y="0"/>
+          <a:chExt cx="0" cy="0"/>
+        </a:xfrm>
+      </p:grpSpPr>
+      <p:sp>
+        <p:nvSpPr>
+          <p:cNvPr id="2" name="Title 1">
+            <a:extLst>
+              <a:ext uri="{FF2B5EF4-FFF2-40B4-BE49-F238E27FC236}">
+                <a16:creationId xmlns:a16="http://schemas.microsoft.com/office/drawing/2014/main" id="{682BFAF5-CD60-8946-B298-2AF2941FB3F6}"/>
+              </a:ext>
+            </a:extLst>
+          </p:cNvPr>
+          <p:cNvSpPr>
+            <a:spLocks noGrp="1"/>
+          </p:cNvSpPr>
+          <p:nvPr>
+            <p:ph type="title"/>
+          </p:nvPr>
+        </p:nvSpPr>
+        <p:spPr/>
+        <p:txBody>
+          <a:bodyPr/>
+          <a:lstStyle/>
+          <a:p>
+            <a:r>
+              <a:rPr lang="en-US" dirty="0"/>
+              <a:t>Some Channels have no spend, but high purchases</a:t>
+            </a:r>
+          </a:p>
+        </p:txBody>
+      </p:sp>
+      <p:sp>
+        <p:nvSpPr>
+          <p:cNvPr id="3" name="Content Placeholder 2">
+            <a:extLst>
+              <a:ext uri="{FF2B5EF4-FFF2-40B4-BE49-F238E27FC236}">
+                <a16:creationId xmlns:a16="http://schemas.microsoft.com/office/drawing/2014/main" id="{32D612D6-1C4D-2E40-B190-2FC690302DB4}"/>
+              </a:ext>
+            </a:extLst>
+          </p:cNvPr>
+          <p:cNvSpPr>
+            <a:spLocks noGrp="1"/>
+          </p:cNvSpPr>
+          <p:nvPr>
+            <p:ph idx="1"/>
+          </p:nvPr>
+        </p:nvSpPr>
+        <p:spPr/>
+        <p:txBody>
+          <a:bodyPr/>
+          <a:lstStyle/>
+          <a:p>
+            <a:r>
+              <a:rPr lang="en-US" dirty="0"/>
+              <a:t>Fox news accounts for 23.0% of the </a:t>
+            </a:r>
+          </a:p>
+        </p:txBody>
+      </p:sp>
+    </p:spTree>
+    <p:extLst>
+      <p:ext uri="{BB962C8B-B14F-4D97-AF65-F5344CB8AC3E}">
+        <p14:creationId xmlns:p14="http://schemas.microsoft.com/office/powerpoint/2010/main" val="162346539"/>
+      </p:ext>
+    </p:extLst>
+  </p:cSld>
+  <p:clrMapOvr>
+    <a:masterClrMapping/>
+  </p:clrMapOvr>
+</p:sld>
+</file>
+
+<file path=ppt/slides/slide7.xml><?xml version="1.0" encoding="utf-8"?>
+<p:sld xmlns:a="http://schemas.openxmlformats.org/drawingml/2006/main" xmlns:r="http://schemas.openxmlformats.org/officeDocument/2006/relationships" xmlns:p="http://schemas.openxmlformats.org/presentationml/2006/main">
+  <p:cSld>
+    <p:spTree>
+      <p:nvGrpSpPr>
+        <p:cNvPr id="1" name=""/>
+        <p:cNvGrpSpPr/>
+        <p:nvPr/>
+      </p:nvGrpSpPr>
+      <p:grpSpPr>
+        <a:xfrm>
+          <a:off x="0" y="0"/>
+          <a:ext cx="0" cy="0"/>
+          <a:chOff x="0" y="0"/>
+          <a:chExt cx="0" cy="0"/>
+        </a:xfrm>
+      </p:grpSpPr>
+      <p:sp>
+        <p:nvSpPr>
+          <p:cNvPr id="2" name="Title 1">
+            <a:extLst>
+              <a:ext uri="{FF2B5EF4-FFF2-40B4-BE49-F238E27FC236}">
                 <a16:creationId xmlns:a16="http://schemas.microsoft.com/office/drawing/2014/main" id="{823BCC4F-FCD6-F045-9BDD-2A770061C8A7}"/>
               </a:ext>
             </a:extLst>
@@ -3726,7 +6019,10 @@
           <a:bodyPr/>
           <a:lstStyle/>
           <a:p>
-            <a:endParaRPr lang="en-US" dirty="0"/>
+            <a:r>
+              <a:rPr lang="en-US" dirty="0"/>
+              <a:t>Purchases vs. Spend</a:t>
+            </a:r>
           </a:p>
         </p:txBody>
       </p:sp>
@@ -3746,19 +6042,591 @@
             <p:ph idx="1"/>
           </p:nvPr>
         </p:nvSpPr>
-        <p:spPr/>
-        <p:txBody>
-          <a:bodyPr/>
-          <a:lstStyle/>
-          <a:p>
-            <a:endParaRPr lang="en-US"/>
-          </a:p>
-        </p:txBody>
-      </p:sp>
+        <p:spPr>
+          <a:xfrm>
+            <a:off x="8544909" y="1825625"/>
+            <a:ext cx="3294993" cy="4149506"/>
+          </a:xfrm>
+        </p:spPr>
+        <p:txBody>
+          <a:bodyPr>
+            <a:normAutofit/>
+          </a:bodyPr>
+          <a:lstStyle/>
+          <a:p>
+            <a:pPr marL="0" indent="0">
+              <a:buNone/>
+            </a:pPr>
+            <a:r>
+              <a:rPr lang="en-US" sz="1800" u="sng" dirty="0">
+                <a:solidFill>
+                  <a:srgbClr val="00B050"/>
+                </a:solidFill>
+              </a:rPr>
+              <a:t>High Purchases, Low Spend: Good!</a:t>
+            </a:r>
+          </a:p>
+          <a:p>
+            <a:r>
+              <a:rPr lang="en-US" sz="1800" dirty="0">
+                <a:solidFill>
+                  <a:srgbClr val="00B050"/>
+                </a:solidFill>
+              </a:rPr>
+              <a:t>MSNBC</a:t>
+            </a:r>
+          </a:p>
+          <a:p>
+            <a:r>
+              <a:rPr lang="en-US" sz="1800" dirty="0">
+                <a:solidFill>
+                  <a:srgbClr val="00B050"/>
+                </a:solidFill>
+              </a:rPr>
+              <a:t>CNBC</a:t>
+            </a:r>
+          </a:p>
+          <a:p>
+            <a:r>
+              <a:rPr lang="en-US" sz="1800" dirty="0">
+                <a:solidFill>
+                  <a:srgbClr val="00B050"/>
+                </a:solidFill>
+              </a:rPr>
+              <a:t>Fox News </a:t>
+            </a:r>
+          </a:p>
+          <a:p>
+            <a:pPr lvl="1"/>
+            <a:r>
+              <a:rPr lang="en-US" sz="1400" dirty="0">
+                <a:solidFill>
+                  <a:srgbClr val="00B050"/>
+                </a:solidFill>
+              </a:rPr>
+              <a:t>Zero Spend but 5.9% of total purchases</a:t>
+            </a:r>
+          </a:p>
+          <a:p>
+            <a:r>
+              <a:rPr lang="en-US" sz="1800" dirty="0">
+                <a:solidFill>
+                  <a:srgbClr val="00B050"/>
+                </a:solidFill>
+              </a:rPr>
+              <a:t>Other</a:t>
+            </a:r>
+          </a:p>
+          <a:p>
+            <a:pPr lvl="1"/>
+            <a:r>
+              <a:rPr lang="en-US" sz="1400" dirty="0">
+                <a:solidFill>
+                  <a:srgbClr val="00B050"/>
+                </a:solidFill>
+              </a:rPr>
+              <a:t>Zero Spend but 5.5% of total purchases</a:t>
+            </a:r>
+            <a:endParaRPr lang="en-US" sz="1800" dirty="0">
+              <a:solidFill>
+                <a:srgbClr val="00B050"/>
+              </a:solidFill>
+            </a:endParaRPr>
+          </a:p>
+          <a:p>
+            <a:pPr marL="0" indent="0">
+              <a:buNone/>
+            </a:pPr>
+            <a:r>
+              <a:rPr lang="en-US" sz="1800" u="sng" dirty="0">
+                <a:solidFill>
+                  <a:srgbClr val="FF0000"/>
+                </a:solidFill>
+              </a:rPr>
+              <a:t>Low Purchases, High Spend: Bad!</a:t>
+            </a:r>
+          </a:p>
+          <a:p>
+            <a:r>
+              <a:rPr lang="en-US" sz="1800" dirty="0" err="1">
+                <a:solidFill>
+                  <a:srgbClr val="FF0000"/>
+                </a:solidFill>
+              </a:rPr>
+              <a:t>ZeeTV</a:t>
+            </a:r>
+            <a:endParaRPr lang="en-US" sz="1800" dirty="0">
+              <a:solidFill>
+                <a:srgbClr val="FF0000"/>
+              </a:solidFill>
+            </a:endParaRPr>
+          </a:p>
+          <a:p>
+            <a:r>
+              <a:rPr lang="en-US" sz="1800" dirty="0">
+                <a:solidFill>
+                  <a:srgbClr val="FF0000"/>
+                </a:solidFill>
+              </a:rPr>
+              <a:t>Star Plus</a:t>
+            </a:r>
+          </a:p>
+        </p:txBody>
+      </p:sp>
+      <p:pic>
+        <p:nvPicPr>
+          <p:cNvPr id="4" name="Picture 3">
+            <a:extLst>
+              <a:ext uri="{FF2B5EF4-FFF2-40B4-BE49-F238E27FC236}">
+                <a16:creationId xmlns:a16="http://schemas.microsoft.com/office/drawing/2014/main" id="{4190DF81-30DB-6646-98A0-D9B70A8A9549}"/>
+              </a:ext>
+            </a:extLst>
+          </p:cNvPr>
+          <p:cNvPicPr>
+            <a:picLocks noChangeAspect="1"/>
+          </p:cNvPicPr>
+          <p:nvPr/>
+        </p:nvPicPr>
+        <p:blipFill>
+          <a:blip r:embed="rId2"/>
+          <a:stretch>
+            <a:fillRect/>
+          </a:stretch>
+        </p:blipFill>
+        <p:spPr>
+          <a:xfrm>
+            <a:off x="0" y="2428875"/>
+            <a:ext cx="7937500" cy="4064000"/>
+          </a:xfrm>
+          <a:prstGeom prst="rect">
+            <a:avLst/>
+          </a:prstGeom>
+        </p:spPr>
+      </p:pic>
     </p:spTree>
     <p:extLst>
       <p:ext uri="{BB962C8B-B14F-4D97-AF65-F5344CB8AC3E}">
         <p14:creationId xmlns:p14="http://schemas.microsoft.com/office/powerpoint/2010/main" val="1137366432"/>
+      </p:ext>
+    </p:extLst>
+  </p:cSld>
+  <p:clrMapOvr>
+    <a:masterClrMapping/>
+  </p:clrMapOvr>
+</p:sld>
+</file>
+
+<file path=ppt/slides/slide8.xml><?xml version="1.0" encoding="utf-8"?>
+<p:sld xmlns:a="http://schemas.openxmlformats.org/drawingml/2006/main" xmlns:r="http://schemas.openxmlformats.org/officeDocument/2006/relationships" xmlns:p="http://schemas.openxmlformats.org/presentationml/2006/main">
+  <p:cSld>
+    <p:spTree>
+      <p:nvGrpSpPr>
+        <p:cNvPr id="1" name=""/>
+        <p:cNvGrpSpPr/>
+        <p:nvPr/>
+      </p:nvGrpSpPr>
+      <p:grpSpPr>
+        <a:xfrm>
+          <a:off x="0" y="0"/>
+          <a:ext cx="0" cy="0"/>
+          <a:chOff x="0" y="0"/>
+          <a:chExt cx="0" cy="0"/>
+        </a:xfrm>
+      </p:grpSpPr>
+      <p:sp>
+        <p:nvSpPr>
+          <p:cNvPr id="2" name="Title 1">
+            <a:extLst>
+              <a:ext uri="{FF2B5EF4-FFF2-40B4-BE49-F238E27FC236}">
+                <a16:creationId xmlns:a16="http://schemas.microsoft.com/office/drawing/2014/main" id="{78C47F35-7B4E-F44F-8191-10ED879876E7}"/>
+              </a:ext>
+            </a:extLst>
+          </p:cNvPr>
+          <p:cNvSpPr>
+            <a:spLocks noGrp="1"/>
+          </p:cNvSpPr>
+          <p:nvPr>
+            <p:ph type="title"/>
+          </p:nvPr>
+        </p:nvSpPr>
+        <p:spPr/>
+        <p:txBody>
+          <a:bodyPr/>
+          <a:lstStyle/>
+          <a:p>
+            <a:r>
+              <a:rPr lang="en-US" dirty="0"/>
+              <a:t>Lift vs. Spend</a:t>
+            </a:r>
+          </a:p>
+        </p:txBody>
+      </p:sp>
+      <p:sp>
+        <p:nvSpPr>
+          <p:cNvPr id="3" name="Content Placeholder 2">
+            <a:extLst>
+              <a:ext uri="{FF2B5EF4-FFF2-40B4-BE49-F238E27FC236}">
+                <a16:creationId xmlns:a16="http://schemas.microsoft.com/office/drawing/2014/main" id="{143BA1D6-8B63-3B4E-B487-40A8BC3418C9}"/>
+              </a:ext>
+            </a:extLst>
+          </p:cNvPr>
+          <p:cNvSpPr>
+            <a:spLocks noGrp="1"/>
+          </p:cNvSpPr>
+          <p:nvPr>
+            <p:ph idx="1"/>
+          </p:nvPr>
+        </p:nvSpPr>
+        <p:spPr>
+          <a:xfrm>
+            <a:off x="8678916" y="1825625"/>
+            <a:ext cx="2674883" cy="4064000"/>
+          </a:xfrm>
+        </p:spPr>
+        <p:txBody>
+          <a:bodyPr/>
+          <a:lstStyle/>
+          <a:p>
+            <a:pPr marL="0" indent="0">
+              <a:buNone/>
+            </a:pPr>
+            <a:r>
+              <a:rPr lang="en-US" dirty="0">
+                <a:solidFill>
+                  <a:srgbClr val="00B050"/>
+                </a:solidFill>
+              </a:rPr>
+              <a:t>High Lift, Low Spend: Good!</a:t>
+            </a:r>
+          </a:p>
+          <a:p>
+            <a:r>
+              <a:rPr lang="en-US" dirty="0">
+                <a:solidFill>
+                  <a:srgbClr val="00B050"/>
+                </a:solidFill>
+              </a:rPr>
+              <a:t>MSNBC</a:t>
+            </a:r>
+          </a:p>
+          <a:p>
+            <a:r>
+              <a:rPr lang="en-US" dirty="0">
+                <a:solidFill>
+                  <a:srgbClr val="00B050"/>
+                </a:solidFill>
+              </a:rPr>
+              <a:t>Dish Network</a:t>
+            </a:r>
+          </a:p>
+          <a:p>
+            <a:endParaRPr lang="en-US" dirty="0"/>
+          </a:p>
+          <a:p>
+            <a:pPr marL="0" indent="0">
+              <a:buNone/>
+            </a:pPr>
+            <a:r>
+              <a:rPr lang="en-US" dirty="0">
+                <a:solidFill>
+                  <a:srgbClr val="FF0000"/>
+                </a:solidFill>
+              </a:rPr>
+              <a:t>Low Lift, High Spend: Bad!</a:t>
+            </a:r>
+          </a:p>
+          <a:p>
+            <a:r>
+              <a:rPr lang="en-US" dirty="0">
+                <a:solidFill>
+                  <a:srgbClr val="FF0000"/>
+                </a:solidFill>
+              </a:rPr>
+              <a:t>Dateline</a:t>
+            </a:r>
+          </a:p>
+        </p:txBody>
+      </p:sp>
+      <p:pic>
+        <p:nvPicPr>
+          <p:cNvPr id="4" name="Picture 3">
+            <a:extLst>
+              <a:ext uri="{FF2B5EF4-FFF2-40B4-BE49-F238E27FC236}">
+                <a16:creationId xmlns:a16="http://schemas.microsoft.com/office/drawing/2014/main" id="{332667FB-497A-B245-A326-EA8762E26F44}"/>
+              </a:ext>
+            </a:extLst>
+          </p:cNvPr>
+          <p:cNvPicPr>
+            <a:picLocks noChangeAspect="1"/>
+          </p:cNvPicPr>
+          <p:nvPr/>
+        </p:nvPicPr>
+        <p:blipFill>
+          <a:blip r:embed="rId2"/>
+          <a:stretch>
+            <a:fillRect/>
+          </a:stretch>
+        </p:blipFill>
+        <p:spPr>
+          <a:xfrm>
+            <a:off x="0" y="2428875"/>
+            <a:ext cx="7937500" cy="4064000"/>
+          </a:xfrm>
+          <a:prstGeom prst="rect">
+            <a:avLst/>
+          </a:prstGeom>
+        </p:spPr>
+      </p:pic>
+    </p:spTree>
+    <p:extLst>
+      <p:ext uri="{BB962C8B-B14F-4D97-AF65-F5344CB8AC3E}">
+        <p14:creationId xmlns:p14="http://schemas.microsoft.com/office/powerpoint/2010/main" val="1212188149"/>
+      </p:ext>
+    </p:extLst>
+  </p:cSld>
+  <p:clrMapOvr>
+    <a:masterClrMapping/>
+  </p:clrMapOvr>
+</p:sld>
+</file>
+
+<file path=ppt/slides/slide9.xml><?xml version="1.0" encoding="utf-8"?>
+<p:sld xmlns:a="http://schemas.openxmlformats.org/drawingml/2006/main" xmlns:r="http://schemas.openxmlformats.org/officeDocument/2006/relationships" xmlns:p="http://schemas.openxmlformats.org/presentationml/2006/main">
+  <p:cSld>
+    <p:spTree>
+      <p:nvGrpSpPr>
+        <p:cNvPr id="1" name=""/>
+        <p:cNvGrpSpPr/>
+        <p:nvPr/>
+      </p:nvGrpSpPr>
+      <p:grpSpPr>
+        <a:xfrm>
+          <a:off x="0" y="0"/>
+          <a:ext cx="0" cy="0"/>
+          <a:chOff x="0" y="0"/>
+          <a:chExt cx="0" cy="0"/>
+        </a:xfrm>
+      </p:grpSpPr>
+      <p:sp>
+        <p:nvSpPr>
+          <p:cNvPr id="2" name="Title 1">
+            <a:extLst>
+              <a:ext uri="{FF2B5EF4-FFF2-40B4-BE49-F238E27FC236}">
+                <a16:creationId xmlns:a16="http://schemas.microsoft.com/office/drawing/2014/main" id="{756035B6-3D83-594C-9C53-BA63DA32DA86}"/>
+              </a:ext>
+            </a:extLst>
+          </p:cNvPr>
+          <p:cNvSpPr>
+            <a:spLocks noGrp="1"/>
+          </p:cNvSpPr>
+          <p:nvPr>
+            <p:ph type="title"/>
+          </p:nvPr>
+        </p:nvSpPr>
+        <p:spPr/>
+        <p:txBody>
+          <a:bodyPr/>
+          <a:lstStyle/>
+          <a:p>
+            <a:r>
+              <a:rPr lang="en-US" dirty="0"/>
+              <a:t>Lift vs. Purchases</a:t>
+            </a:r>
+          </a:p>
+        </p:txBody>
+      </p:sp>
+      <p:sp>
+        <p:nvSpPr>
+          <p:cNvPr id="3" name="Content Placeholder 2">
+            <a:extLst>
+              <a:ext uri="{FF2B5EF4-FFF2-40B4-BE49-F238E27FC236}">
+                <a16:creationId xmlns:a16="http://schemas.microsoft.com/office/drawing/2014/main" id="{5DF13C31-02E1-BE47-AC19-96ADF908B315}"/>
+              </a:ext>
+            </a:extLst>
+          </p:cNvPr>
+          <p:cNvSpPr>
+            <a:spLocks noGrp="1"/>
+          </p:cNvSpPr>
+          <p:nvPr>
+            <p:ph idx="1"/>
+          </p:nvPr>
+        </p:nvSpPr>
+        <p:spPr>
+          <a:xfrm>
+            <a:off x="7930054" y="1825625"/>
+            <a:ext cx="3423745" cy="4667250"/>
+          </a:xfrm>
+        </p:spPr>
+        <p:txBody>
+          <a:bodyPr>
+            <a:normAutofit fontScale="92500" lnSpcReduction="10000"/>
+          </a:bodyPr>
+          <a:lstStyle/>
+          <a:p>
+            <a:pPr marL="0" indent="0">
+              <a:buNone/>
+            </a:pPr>
+            <a:r>
+              <a:rPr lang="en-US" sz="1800" dirty="0">
+                <a:solidFill>
+                  <a:srgbClr val="00B050"/>
+                </a:solidFill>
+              </a:rPr>
+              <a:t>Low Lift, High Purchases: Good!</a:t>
+            </a:r>
+          </a:p>
+          <a:p>
+            <a:r>
+              <a:rPr lang="en-US" sz="1800" dirty="0">
+                <a:solidFill>
+                  <a:srgbClr val="00B050"/>
+                </a:solidFill>
+              </a:rPr>
+              <a:t>CNBC</a:t>
+            </a:r>
+          </a:p>
+          <a:p>
+            <a:r>
+              <a:rPr lang="en-US" sz="1800" dirty="0">
+                <a:solidFill>
+                  <a:srgbClr val="00B050"/>
+                </a:solidFill>
+              </a:rPr>
+              <a:t>Dateline</a:t>
+            </a:r>
+          </a:p>
+          <a:p>
+            <a:r>
+              <a:rPr lang="en-US" sz="1800" dirty="0">
+                <a:solidFill>
+                  <a:srgbClr val="00B050"/>
+                </a:solidFill>
+              </a:rPr>
+              <a:t>Fox News </a:t>
+            </a:r>
+          </a:p>
+          <a:p>
+            <a:pPr lvl="1"/>
+            <a:r>
+              <a:rPr lang="en-US" sz="1400" dirty="0">
+                <a:solidFill>
+                  <a:srgbClr val="00B050"/>
+                </a:solidFill>
+              </a:rPr>
+              <a:t>No Lift, but 5.9% of total purchases</a:t>
+            </a:r>
+          </a:p>
+          <a:p>
+            <a:r>
+              <a:rPr lang="en-US" sz="1800" dirty="0">
+                <a:solidFill>
+                  <a:srgbClr val="00B050"/>
+                </a:solidFill>
+              </a:rPr>
+              <a:t>Other</a:t>
+            </a:r>
+          </a:p>
+          <a:p>
+            <a:pPr lvl="1"/>
+            <a:r>
+              <a:rPr lang="en-US" sz="1400" dirty="0">
+                <a:solidFill>
+                  <a:srgbClr val="00B050"/>
+                </a:solidFill>
+              </a:rPr>
+              <a:t>No Lift, but 5.5% of total purchases</a:t>
+            </a:r>
+          </a:p>
+          <a:p>
+            <a:pPr marL="0" indent="0">
+              <a:buNone/>
+            </a:pPr>
+            <a:endParaRPr lang="en-US" sz="1800" dirty="0"/>
+          </a:p>
+          <a:p>
+            <a:pPr marL="0" indent="0">
+              <a:buNone/>
+            </a:pPr>
+            <a:r>
+              <a:rPr lang="en-US" sz="1800" dirty="0">
+                <a:solidFill>
+                  <a:srgbClr val="FF0000"/>
+                </a:solidFill>
+              </a:rPr>
+              <a:t>High Lift, Low Purchases: Bad!  These customers don’t seem to want your product despite visiting the website</a:t>
+            </a:r>
+          </a:p>
+          <a:p>
+            <a:r>
+              <a:rPr lang="en-US" sz="1800" dirty="0" err="1">
+                <a:solidFill>
+                  <a:srgbClr val="FF0000"/>
+                </a:solidFill>
+              </a:rPr>
+              <a:t>ZeeTV</a:t>
+            </a:r>
+            <a:endParaRPr lang="en-US" sz="1800" dirty="0">
+              <a:solidFill>
+                <a:srgbClr val="FF0000"/>
+              </a:solidFill>
+            </a:endParaRPr>
+          </a:p>
+          <a:p>
+            <a:r>
+              <a:rPr lang="en-US" sz="1800" dirty="0">
+                <a:solidFill>
+                  <a:srgbClr val="FF0000"/>
+                </a:solidFill>
+              </a:rPr>
+              <a:t>Star Plus</a:t>
+            </a:r>
+          </a:p>
+          <a:p>
+            <a:r>
+              <a:rPr lang="en-US" sz="1800" dirty="0">
+                <a:solidFill>
+                  <a:srgbClr val="FF0000"/>
+                </a:solidFill>
+              </a:rPr>
+              <a:t>Dish Network</a:t>
+            </a:r>
+          </a:p>
+        </p:txBody>
+      </p:sp>
+      <p:pic>
+        <p:nvPicPr>
+          <p:cNvPr id="4" name="Picture 3">
+            <a:extLst>
+              <a:ext uri="{FF2B5EF4-FFF2-40B4-BE49-F238E27FC236}">
+                <a16:creationId xmlns:a16="http://schemas.microsoft.com/office/drawing/2014/main" id="{C874BD0E-D9A1-364F-B29A-C11F54185ECF}"/>
+              </a:ext>
+            </a:extLst>
+          </p:cNvPr>
+          <p:cNvPicPr>
+            <a:picLocks noChangeAspect="1"/>
+          </p:cNvPicPr>
+          <p:nvPr/>
+        </p:nvPicPr>
+        <p:blipFill>
+          <a:blip r:embed="rId2"/>
+          <a:stretch>
+            <a:fillRect/>
+          </a:stretch>
+        </p:blipFill>
+        <p:spPr>
+          <a:xfrm>
+            <a:off x="0" y="2466975"/>
+            <a:ext cx="7696200" cy="4025900"/>
+          </a:xfrm>
+          <a:prstGeom prst="rect">
+            <a:avLst/>
+          </a:prstGeom>
+        </p:spPr>
+      </p:pic>
+    </p:spTree>
+    <p:extLst>
+      <p:ext uri="{BB962C8B-B14F-4D97-AF65-F5344CB8AC3E}">
+        <p14:creationId xmlns:p14="http://schemas.microsoft.com/office/powerpoint/2010/main" val="2172144522"/>
       </p:ext>
     </p:extLst>
   </p:cSld>

</xml_diff>

<commit_message>
make_heatmap() function created and all heatmaps completed.  Also attempted to create make_heatmap2() and make_multiple_heatmaps() function but couldn't get it to work
</commit_message>
<xml_diff>
--- a/companyxyz_presentation.pptx
+++ b/companyxyz_presentation.pptx
@@ -15,8 +15,8 @@
     <p:sldId id="272" r:id="rId9"/>
     <p:sldId id="277" r:id="rId10"/>
     <p:sldId id="258" r:id="rId11"/>
-    <p:sldId id="261" r:id="rId12"/>
-    <p:sldId id="262" r:id="rId13"/>
+    <p:sldId id="262" r:id="rId12"/>
+    <p:sldId id="261" r:id="rId13"/>
     <p:sldId id="263" r:id="rId14"/>
     <p:sldId id="264" r:id="rId15"/>
     <p:sldId id="265" r:id="rId16"/>
@@ -123,6 +123,11 @@
       </a:defRPr>
     </a:lvl9pPr>
   </p:defaultTextStyle>
+  <p:extLst>
+    <p:ext uri="{EFAFB233-063F-42B5-8137-9DF3F51BA10A}">
+      <p15:sldGuideLst xmlns:p15="http://schemas.microsoft.com/office/powerpoint/2012/main"/>
+    </p:ext>
+  </p:extLst>
 </p:presentation>
 </file>
 
@@ -273,7 +278,7 @@
           <a:p>
             <a:fld id="{81A2D996-68CB-CC46-8422-8E5E59C29E9C}" type="datetimeFigureOut">
               <a:rPr lang="en-US" smtClean="0"/>
-              <a:t>3/19/22</a:t>
+              <a:t>3/25/22</a:t>
             </a:fld>
             <a:endParaRPr lang="en-US"/>
           </a:p>
@@ -471,7 +476,7 @@
           <a:p>
             <a:fld id="{81A2D996-68CB-CC46-8422-8E5E59C29E9C}" type="datetimeFigureOut">
               <a:rPr lang="en-US" smtClean="0"/>
-              <a:t>3/19/22</a:t>
+              <a:t>3/25/22</a:t>
             </a:fld>
             <a:endParaRPr lang="en-US"/>
           </a:p>
@@ -679,7 +684,7 @@
           <a:p>
             <a:fld id="{81A2D996-68CB-CC46-8422-8E5E59C29E9C}" type="datetimeFigureOut">
               <a:rPr lang="en-US" smtClean="0"/>
-              <a:t>3/19/22</a:t>
+              <a:t>3/25/22</a:t>
             </a:fld>
             <a:endParaRPr lang="en-US"/>
           </a:p>
@@ -877,7 +882,7 @@
           <a:p>
             <a:fld id="{81A2D996-68CB-CC46-8422-8E5E59C29E9C}" type="datetimeFigureOut">
               <a:rPr lang="en-US" smtClean="0"/>
-              <a:t>3/19/22</a:t>
+              <a:t>3/25/22</a:t>
             </a:fld>
             <a:endParaRPr lang="en-US"/>
           </a:p>
@@ -1152,7 +1157,7 @@
           <a:p>
             <a:fld id="{81A2D996-68CB-CC46-8422-8E5E59C29E9C}" type="datetimeFigureOut">
               <a:rPr lang="en-US" smtClean="0"/>
-              <a:t>3/19/22</a:t>
+              <a:t>3/25/22</a:t>
             </a:fld>
             <a:endParaRPr lang="en-US"/>
           </a:p>
@@ -1417,7 +1422,7 @@
           <a:p>
             <a:fld id="{81A2D996-68CB-CC46-8422-8E5E59C29E9C}" type="datetimeFigureOut">
               <a:rPr lang="en-US" smtClean="0"/>
-              <a:t>3/19/22</a:t>
+              <a:t>3/25/22</a:t>
             </a:fld>
             <a:endParaRPr lang="en-US"/>
           </a:p>
@@ -1829,7 +1834,7 @@
           <a:p>
             <a:fld id="{81A2D996-68CB-CC46-8422-8E5E59C29E9C}" type="datetimeFigureOut">
               <a:rPr lang="en-US" smtClean="0"/>
-              <a:t>3/19/22</a:t>
+              <a:t>3/25/22</a:t>
             </a:fld>
             <a:endParaRPr lang="en-US"/>
           </a:p>
@@ -1970,7 +1975,7 @@
           <a:p>
             <a:fld id="{81A2D996-68CB-CC46-8422-8E5E59C29E9C}" type="datetimeFigureOut">
               <a:rPr lang="en-US" smtClean="0"/>
-              <a:t>3/19/22</a:t>
+              <a:t>3/25/22</a:t>
             </a:fld>
             <a:endParaRPr lang="en-US"/>
           </a:p>
@@ -2083,7 +2088,7 @@
           <a:p>
             <a:fld id="{81A2D996-68CB-CC46-8422-8E5E59C29E9C}" type="datetimeFigureOut">
               <a:rPr lang="en-US" smtClean="0"/>
-              <a:t>3/19/22</a:t>
+              <a:t>3/25/22</a:t>
             </a:fld>
             <a:endParaRPr lang="en-US"/>
           </a:p>
@@ -2394,7 +2399,7 @@
           <a:p>
             <a:fld id="{81A2D996-68CB-CC46-8422-8E5E59C29E9C}" type="datetimeFigureOut">
               <a:rPr lang="en-US" smtClean="0"/>
-              <a:t>3/19/22</a:t>
+              <a:t>3/25/22</a:t>
             </a:fld>
             <a:endParaRPr lang="en-US"/>
           </a:p>
@@ -2682,7 +2687,7 @@
           <a:p>
             <a:fld id="{81A2D996-68CB-CC46-8422-8E5E59C29E9C}" type="datetimeFigureOut">
               <a:rPr lang="en-US" smtClean="0"/>
-              <a:t>3/19/22</a:t>
+              <a:t>3/25/22</a:t>
             </a:fld>
             <a:endParaRPr lang="en-US"/>
           </a:p>
@@ -2923,7 +2928,7 @@
           <a:p>
             <a:fld id="{81A2D996-68CB-CC46-8422-8E5E59C29E9C}" type="datetimeFigureOut">
               <a:rPr lang="en-US" smtClean="0"/>
-              <a:t>3/19/22</a:t>
+              <a:t>3/25/22</a:t>
             </a:fld>
             <a:endParaRPr lang="en-US"/>
           </a:p>
@@ -3458,8 +3463,8 @@
         </p:nvSpPr>
         <p:spPr>
           <a:xfrm>
-            <a:off x="8394700" y="823092"/>
-            <a:ext cx="3429438" cy="4682357"/>
+            <a:off x="8394700" y="1620577"/>
+            <a:ext cx="3429438" cy="3620143"/>
           </a:xfrm>
         </p:spPr>
         <p:txBody>
@@ -3477,32 +3482,7 @@
                   <a:srgbClr val="FF0000"/>
                 </a:solidFill>
               </a:rPr>
-              <a:t>Below Average Purchases, Above Average Spend:</a:t>
-            </a:r>
-          </a:p>
-          <a:p>
-            <a:r>
-              <a:rPr lang="en-US" sz="1400" dirty="0" err="1">
-                <a:solidFill>
-                  <a:srgbClr val="FF0000"/>
-                </a:solidFill>
-              </a:rPr>
-              <a:t>ZeeTV</a:t>
-            </a:r>
-            <a:endParaRPr lang="en-US" sz="1400" dirty="0">
-              <a:solidFill>
-                <a:srgbClr val="FF0000"/>
-              </a:solidFill>
-            </a:endParaRPr>
-          </a:p>
-          <a:p>
-            <a:r>
-              <a:rPr lang="en-US" sz="1400" dirty="0">
-                <a:solidFill>
-                  <a:srgbClr val="FF0000"/>
-                </a:solidFill>
-              </a:rPr>
-              <a:t>Star Plus</a:t>
+              <a:t>Below average purchases, above average spend:</a:t>
             </a:r>
           </a:p>
           <a:p>
@@ -3532,33 +3512,23 @@
             <a:pPr marL="0" indent="0">
               <a:buNone/>
             </a:pPr>
+            <a:endParaRPr lang="en-US" sz="1900" dirty="0">
+              <a:solidFill>
+                <a:srgbClr val="FF0000"/>
+              </a:solidFill>
+            </a:endParaRPr>
+          </a:p>
+          <a:p>
+            <a:pPr marL="0" indent="0">
+              <a:buNone/>
+            </a:pPr>
             <a:r>
               <a:rPr lang="en-US" sz="1900" dirty="0">
                 <a:solidFill>
                   <a:srgbClr val="00B050"/>
                 </a:solidFill>
               </a:rPr>
-              <a:t>Above Average Purchases, Below Average Spend: Good!</a:t>
-            </a:r>
-          </a:p>
-          <a:p>
-            <a:r>
-              <a:rPr lang="en-US" sz="1400" dirty="0">
-                <a:solidFill>
-                  <a:srgbClr val="00B050"/>
-                </a:solidFill>
-              </a:rPr>
-              <a:t>MSNBC</a:t>
-            </a:r>
-          </a:p>
-          <a:p>
-            <a:r>
-              <a:rPr lang="en-US" sz="1400" dirty="0">
-                <a:solidFill>
-                  <a:srgbClr val="00B050"/>
-                </a:solidFill>
-              </a:rPr>
-              <a:t>CNBC</a:t>
+              <a:t>Above average purchases, below average spend:</a:t>
             </a:r>
           </a:p>
           <a:p>
@@ -3581,12 +3551,47 @@
           </a:p>
         </p:txBody>
       </p:sp>
+      <p:sp>
+        <p:nvSpPr>
+          <p:cNvPr id="7" name="TextBox 6">
+            <a:extLst>
+              <a:ext uri="{FF2B5EF4-FFF2-40B4-BE49-F238E27FC236}">
+                <a16:creationId xmlns:a16="http://schemas.microsoft.com/office/drawing/2014/main" id="{E663F7EC-50CA-8949-81C9-9FB4F5610FE4}"/>
+              </a:ext>
+            </a:extLst>
+          </p:cNvPr>
+          <p:cNvSpPr txBox="1"/>
+          <p:nvPr/>
+        </p:nvSpPr>
+        <p:spPr>
+          <a:xfrm>
+            <a:off x="0" y="6488668"/>
+            <a:ext cx="11824138" cy="369332"/>
+          </a:xfrm>
+          <a:prstGeom prst="rect">
+            <a:avLst/>
+          </a:prstGeom>
+          <a:noFill/>
+        </p:spPr>
+        <p:txBody>
+          <a:bodyPr wrap="square" rtlCol="0">
+            <a:spAutoFit/>
+          </a:bodyPr>
+          <a:lstStyle/>
+          <a:p>
+            <a:r>
+              <a:rPr lang="en-US" dirty="0"/>
+              <a:t>Note: the graph is divided into four quadrants, sectioned off by Average Purchases (x) and Average Spend (y).</a:t>
+            </a:r>
+          </a:p>
+        </p:txBody>
+      </p:sp>
       <p:pic>
         <p:nvPicPr>
-          <p:cNvPr id="6" name="Picture 5">
-            <a:extLst>
-              <a:ext uri="{FF2B5EF4-FFF2-40B4-BE49-F238E27FC236}">
-                <a16:creationId xmlns:a16="http://schemas.microsoft.com/office/drawing/2014/main" id="{56D74F69-8320-0B4F-BFC4-43765BEB98C4}"/>
+          <p:cNvPr id="5" name="Picture 4">
+            <a:extLst>
+              <a:ext uri="{FF2B5EF4-FFF2-40B4-BE49-F238E27FC236}">
+                <a16:creationId xmlns:a16="http://schemas.microsoft.com/office/drawing/2014/main" id="{7E4AC08E-410A-BD4D-85CB-D666FA54BDCB}"/>
               </a:ext>
             </a:extLst>
           </p:cNvPr>
@@ -3611,41 +3616,6 @@
           </a:prstGeom>
         </p:spPr>
       </p:pic>
-      <p:sp>
-        <p:nvSpPr>
-          <p:cNvPr id="7" name="TextBox 6">
-            <a:extLst>
-              <a:ext uri="{FF2B5EF4-FFF2-40B4-BE49-F238E27FC236}">
-                <a16:creationId xmlns:a16="http://schemas.microsoft.com/office/drawing/2014/main" id="{E663F7EC-50CA-8949-81C9-9FB4F5610FE4}"/>
-              </a:ext>
-            </a:extLst>
-          </p:cNvPr>
-          <p:cNvSpPr txBox="1"/>
-          <p:nvPr/>
-        </p:nvSpPr>
-        <p:spPr>
-          <a:xfrm>
-            <a:off x="0" y="6488668"/>
-            <a:ext cx="10265503" cy="369332"/>
-          </a:xfrm>
-          <a:prstGeom prst="rect">
-            <a:avLst/>
-          </a:prstGeom>
-          <a:noFill/>
-        </p:spPr>
-        <p:txBody>
-          <a:bodyPr wrap="none" rtlCol="0">
-            <a:spAutoFit/>
-          </a:bodyPr>
-          <a:lstStyle/>
-          <a:p>
-            <a:r>
-              <a:rPr lang="en-US" dirty="0"/>
-              <a:t>Note: the graph is divided into four quadrants, sectioned off by Average Purchases (x) and Average Spend (y)</a:t>
-            </a:r>
-          </a:p>
-        </p:txBody>
-      </p:sp>
     </p:spTree>
     <p:extLst>
       <p:ext uri="{BB962C8B-B14F-4D97-AF65-F5344CB8AC3E}">
@@ -3681,7 +3651,7 @@
           <p:cNvPr id="2" name="Title 1">
             <a:extLst>
               <a:ext uri="{FF2B5EF4-FFF2-40B4-BE49-F238E27FC236}">
-                <a16:creationId xmlns:a16="http://schemas.microsoft.com/office/drawing/2014/main" id="{78C47F35-7B4E-F44F-8191-10ED879876E7}"/>
+                <a16:creationId xmlns:a16="http://schemas.microsoft.com/office/drawing/2014/main" id="{756035B6-3D83-594C-9C53-BA63DA32DA86}"/>
               </a:ext>
             </a:extLst>
           </p:cNvPr>
@@ -3694,8 +3664,8 @@
         </p:nvSpPr>
         <p:spPr>
           <a:xfrm>
-            <a:off x="763095" y="365125"/>
-            <a:ext cx="3434255" cy="987425"/>
+            <a:off x="449755" y="502541"/>
+            <a:ext cx="4056555" cy="730250"/>
           </a:xfrm>
         </p:spPr>
         <p:txBody>
@@ -3706,17 +3676,17 @@
           <a:p>
             <a:r>
               <a:rPr lang="en-US" sz="3400" u="sng" dirty="0"/>
-              <a:t>Lift vs. Spend</a:t>
+              <a:t>Lift vs. Purchases</a:t>
             </a:r>
           </a:p>
         </p:txBody>
       </p:sp>
       <p:pic>
         <p:nvPicPr>
-          <p:cNvPr id="5" name="Picture 4">
-            <a:extLst>
-              <a:ext uri="{FF2B5EF4-FFF2-40B4-BE49-F238E27FC236}">
-                <a16:creationId xmlns:a16="http://schemas.microsoft.com/office/drawing/2014/main" id="{BB3965A8-12C3-DB4B-BDEF-5D2E4B2216C4}"/>
+          <p:cNvPr id="7" name="Picture 6">
+            <a:extLst>
+              <a:ext uri="{FF2B5EF4-FFF2-40B4-BE49-F238E27FC236}">
+                <a16:creationId xmlns:a16="http://schemas.microsoft.com/office/drawing/2014/main" id="{200AF6D5-33E1-A54B-97B0-A59877B0A1F6}"/>
               </a:ext>
             </a:extLst>
           </p:cNvPr>
@@ -3734,7 +3704,7 @@
         <p:spPr>
           <a:xfrm>
             <a:off x="0" y="1352550"/>
-            <a:ext cx="8394700" cy="4152900"/>
+            <a:ext cx="8318500" cy="4152900"/>
           </a:xfrm>
           <a:prstGeom prst="rect">
             <a:avLst/>
@@ -3743,10 +3713,10 @@
       </p:pic>
       <p:sp>
         <p:nvSpPr>
-          <p:cNvPr id="6" name="TextBox 5">
-            <a:extLst>
-              <a:ext uri="{FF2B5EF4-FFF2-40B4-BE49-F238E27FC236}">
-                <a16:creationId xmlns:a16="http://schemas.microsoft.com/office/drawing/2014/main" id="{53F78831-0B9E-884A-8048-B2838C936155}"/>
+          <p:cNvPr id="8" name="TextBox 7">
+            <a:extLst>
+              <a:ext uri="{FF2B5EF4-FFF2-40B4-BE49-F238E27FC236}">
+                <a16:creationId xmlns:a16="http://schemas.microsoft.com/office/drawing/2014/main" id="{C007679F-A092-FD40-A2A5-5E16866D5F92}"/>
               </a:ext>
             </a:extLst>
           </p:cNvPr>
@@ -3756,7 +3726,7 @@
         <p:spPr>
           <a:xfrm>
             <a:off x="0" y="6488668"/>
-            <a:ext cx="9614876" cy="369332"/>
+            <a:ext cx="10105202" cy="369332"/>
           </a:xfrm>
           <a:prstGeom prst="rect">
             <a:avLst/>
@@ -3771,17 +3741,17 @@
           <a:p>
             <a:r>
               <a:rPr lang="en-US" dirty="0"/>
-              <a:t>Note: the graph is divided into four quadrants, sectioned off by Average Lift (x) and Average Spend (y)</a:t>
-            </a:r>
-          </a:p>
-        </p:txBody>
-      </p:sp>
-      <p:sp>
-        <p:nvSpPr>
-          <p:cNvPr id="7" name="Content Placeholder 2">
-            <a:extLst>
-              <a:ext uri="{FF2B5EF4-FFF2-40B4-BE49-F238E27FC236}">
-                <a16:creationId xmlns:a16="http://schemas.microsoft.com/office/drawing/2014/main" id="{2E1B6FAF-DC51-234F-935C-E1704FB44E20}"/>
+              <a:t>Note: the graph is divided into four quadrants, sectioned off by Average Lift (x) and Average Purchases (y)</a:t>
+            </a:r>
+          </a:p>
+        </p:txBody>
+      </p:sp>
+      <p:sp>
+        <p:nvSpPr>
+          <p:cNvPr id="9" name="Content Placeholder 2">
+            <a:extLst>
+              <a:ext uri="{FF2B5EF4-FFF2-40B4-BE49-F238E27FC236}">
+                <a16:creationId xmlns:a16="http://schemas.microsoft.com/office/drawing/2014/main" id="{EAC6F2EE-E8AF-4644-B28C-7A46F8948265}"/>
               </a:ext>
             </a:extLst>
           </p:cNvPr>
@@ -3792,8 +3762,8 @@
         </p:nvSpPr>
         <p:spPr>
           <a:xfrm>
-            <a:off x="8394700" y="1087821"/>
-            <a:ext cx="3429438" cy="4682357"/>
+            <a:off x="8318500" y="1562421"/>
+            <a:ext cx="3429438" cy="3733158"/>
           </a:xfrm>
           <a:prstGeom prst="rect">
             <a:avLst/>
@@ -3974,21 +3944,44 @@
             <a:r>
               <a:rPr lang="en-US" sz="1900" dirty="0">
                 <a:solidFill>
-                  <a:srgbClr val="FF0000"/>
+                  <a:srgbClr val="00B050"/>
                 </a:solidFill>
               </a:rPr>
-              <a:t>Below Average Lift, Above Average Spend:</a:t>
-            </a:r>
-          </a:p>
-          <a:p>
-            <a:r>
-              <a:rPr lang="en-US" sz="1400" dirty="0">
+              <a:t>Below average lift, yet above average purchases: </a:t>
+            </a:r>
+          </a:p>
+          <a:p>
+            <a:pPr marL="0" indent="0">
+              <a:buNone/>
+            </a:pPr>
+            <a:r>
+              <a:rPr lang="en-US" sz="1900" dirty="0">
                 <a:solidFill>
-                  <a:srgbClr val="FF0000"/>
+                  <a:srgbClr val="00B050"/>
                 </a:solidFill>
               </a:rPr>
-              <a:t>Dateline</a:t>
-            </a:r>
+              <a:t>You’re getting less lift, but more purchases despite it, that’s good!</a:t>
+            </a:r>
+          </a:p>
+          <a:p>
+            <a:pPr marL="0" indent="0">
+              <a:buNone/>
+            </a:pPr>
+            <a:endParaRPr lang="en-US" sz="1900" dirty="0">
+              <a:solidFill>
+                <a:srgbClr val="FF0000"/>
+              </a:solidFill>
+            </a:endParaRPr>
+          </a:p>
+          <a:p>
+            <a:pPr marL="0" indent="0">
+              <a:buNone/>
+            </a:pPr>
+            <a:endParaRPr lang="en-US" sz="1900" dirty="0">
+              <a:solidFill>
+                <a:srgbClr val="FF0000"/>
+              </a:solidFill>
+            </a:endParaRPr>
           </a:p>
           <a:p>
             <a:pPr marL="0" indent="0">
@@ -4000,28 +3993,8 @@
                   <a:srgbClr val="FF0000"/>
                 </a:solidFill>
               </a:rPr>
-              <a:t>You’re getting less lift for your buck, that’s bad!</a:t>
-            </a:r>
-          </a:p>
-          <a:p>
-            <a:pPr marL="0" indent="0">
-              <a:buNone/>
-            </a:pPr>
-            <a:endParaRPr lang="en-US" sz="1900" dirty="0">
-              <a:solidFill>
-                <a:srgbClr val="00B050"/>
-              </a:solidFill>
-            </a:endParaRPr>
-          </a:p>
-          <a:p>
-            <a:pPr marL="0" indent="0">
-              <a:buNone/>
-            </a:pPr>
-            <a:endParaRPr lang="en-US" sz="1900" dirty="0">
-              <a:solidFill>
-                <a:srgbClr val="00B050"/>
-              </a:solidFill>
-            </a:endParaRPr>
+              <a:t>Above average lift, below average purchases:</a:t>
+            </a:r>
           </a:p>
           <a:p>
             <a:pPr marL="0" indent="0">
@@ -4030,43 +4003,10 @@
             <a:r>
               <a:rPr lang="en-US" sz="1900" dirty="0">
                 <a:solidFill>
-                  <a:srgbClr val="00B050"/>
+                  <a:srgbClr val="FF0000"/>
                 </a:solidFill>
               </a:rPr>
-              <a:t>Above Average Lift, Below Average Spend: Good!</a:t>
-            </a:r>
-          </a:p>
-          <a:p>
-            <a:r>
-              <a:rPr lang="en-US" sz="1400" dirty="0">
-                <a:solidFill>
-                  <a:srgbClr val="00B050"/>
-                </a:solidFill>
-              </a:rPr>
-              <a:t>MSNBC</a:t>
-            </a:r>
-          </a:p>
-          <a:p>
-            <a:r>
-              <a:rPr lang="en-US" sz="1400" dirty="0">
-                <a:solidFill>
-                  <a:srgbClr val="00B050"/>
-                </a:solidFill>
-              </a:rPr>
-              <a:t>Dish Network</a:t>
-            </a:r>
-          </a:p>
-          <a:p>
-            <a:pPr marL="0" indent="0">
-              <a:buNone/>
-            </a:pPr>
-            <a:r>
-              <a:rPr lang="en-US" sz="1900" dirty="0">
-                <a:solidFill>
-                  <a:srgbClr val="00B050"/>
-                </a:solidFill>
-              </a:rPr>
-              <a:t>You’re getting more lift for your buck, that’s good!</a:t>
+              <a:t>Despite increased traffic, these customers don’t seem to want your product, that’s bad!</a:t>
             </a:r>
           </a:p>
         </p:txBody>
@@ -4074,7 +4014,7 @@
     </p:spTree>
     <p:extLst>
       <p:ext uri="{BB962C8B-B14F-4D97-AF65-F5344CB8AC3E}">
-        <p14:creationId xmlns:p14="http://schemas.microsoft.com/office/powerpoint/2010/main" val="1212188149"/>
+        <p14:creationId xmlns:p14="http://schemas.microsoft.com/office/powerpoint/2010/main" val="2172144522"/>
       </p:ext>
     </p:extLst>
   </p:cSld>
@@ -4106,7 +4046,7 @@
           <p:cNvPr id="2" name="Title 1">
             <a:extLst>
               <a:ext uri="{FF2B5EF4-FFF2-40B4-BE49-F238E27FC236}">
-                <a16:creationId xmlns:a16="http://schemas.microsoft.com/office/drawing/2014/main" id="{756035B6-3D83-594C-9C53-BA63DA32DA86}"/>
+                <a16:creationId xmlns:a16="http://schemas.microsoft.com/office/drawing/2014/main" id="{78C47F35-7B4E-F44F-8191-10ED879876E7}"/>
               </a:ext>
             </a:extLst>
           </p:cNvPr>
@@ -4119,8 +4059,8 @@
         </p:nvSpPr>
         <p:spPr>
           <a:xfrm>
-            <a:off x="449755" y="502541"/>
-            <a:ext cx="4056555" cy="730250"/>
+            <a:off x="763095" y="365125"/>
+            <a:ext cx="3434255" cy="987425"/>
           </a:xfrm>
         </p:spPr>
         <p:txBody>
@@ -4131,57 +4071,27 @@
           <a:p>
             <a:r>
               <a:rPr lang="en-US" sz="3400" u="sng" dirty="0"/>
-              <a:t>Lift vs. Purchases</a:t>
-            </a:r>
-          </a:p>
-        </p:txBody>
-      </p:sp>
-      <p:pic>
-        <p:nvPicPr>
-          <p:cNvPr id="7" name="Picture 6">
-            <a:extLst>
-              <a:ext uri="{FF2B5EF4-FFF2-40B4-BE49-F238E27FC236}">
-                <a16:creationId xmlns:a16="http://schemas.microsoft.com/office/drawing/2014/main" id="{200AF6D5-33E1-A54B-97B0-A59877B0A1F6}"/>
-              </a:ext>
-            </a:extLst>
-          </p:cNvPr>
-          <p:cNvPicPr>
-            <a:picLocks noChangeAspect="1"/>
-          </p:cNvPicPr>
+              <a:t>Lift vs. Spend</a:t>
+            </a:r>
+          </a:p>
+        </p:txBody>
+      </p:sp>
+      <p:sp>
+        <p:nvSpPr>
+          <p:cNvPr id="6" name="TextBox 5">
+            <a:extLst>
+              <a:ext uri="{FF2B5EF4-FFF2-40B4-BE49-F238E27FC236}">
+                <a16:creationId xmlns:a16="http://schemas.microsoft.com/office/drawing/2014/main" id="{53F78831-0B9E-884A-8048-B2838C936155}"/>
+              </a:ext>
+            </a:extLst>
+          </p:cNvPr>
+          <p:cNvSpPr txBox="1"/>
           <p:nvPr/>
-        </p:nvPicPr>
-        <p:blipFill>
-          <a:blip r:embed="rId2"/>
-          <a:stretch>
-            <a:fillRect/>
-          </a:stretch>
-        </p:blipFill>
+        </p:nvSpPr>
         <p:spPr>
           <a:xfrm>
-            <a:off x="0" y="1352550"/>
-            <a:ext cx="8318500" cy="4152900"/>
-          </a:xfrm>
-          <a:prstGeom prst="rect">
-            <a:avLst/>
-          </a:prstGeom>
-        </p:spPr>
-      </p:pic>
-      <p:sp>
-        <p:nvSpPr>
-          <p:cNvPr id="8" name="TextBox 7">
-            <a:extLst>
-              <a:ext uri="{FF2B5EF4-FFF2-40B4-BE49-F238E27FC236}">
-                <a16:creationId xmlns:a16="http://schemas.microsoft.com/office/drawing/2014/main" id="{C007679F-A092-FD40-A2A5-5E16866D5F92}"/>
-              </a:ext>
-            </a:extLst>
-          </p:cNvPr>
-          <p:cNvSpPr txBox="1"/>
-          <p:nvPr/>
-        </p:nvSpPr>
-        <p:spPr>
-          <a:xfrm>
-            <a:off x="0" y="6488668"/>
-            <a:ext cx="9957726" cy="369332"/>
+            <a:off x="0" y="6223818"/>
+            <a:ext cx="10849510" cy="646331"/>
           </a:xfrm>
           <a:prstGeom prst="rect">
             <a:avLst/>
@@ -4189,24 +4099,24 @@
           <a:noFill/>
         </p:spPr>
         <p:txBody>
-          <a:bodyPr wrap="none" rtlCol="0">
+          <a:bodyPr wrap="square" rtlCol="0">
             <a:spAutoFit/>
           </a:bodyPr>
           <a:lstStyle/>
           <a:p>
             <a:r>
               <a:rPr lang="en-US" dirty="0"/>
-              <a:t>Note: the graph is divided into four quadrants, sectioned off by Average Lift (x) and Average Purchases (y)</a:t>
-            </a:r>
-          </a:p>
-        </p:txBody>
-      </p:sp>
-      <p:sp>
-        <p:nvSpPr>
-          <p:cNvPr id="9" name="Content Placeholder 2">
-            <a:extLst>
-              <a:ext uri="{FF2B5EF4-FFF2-40B4-BE49-F238E27FC236}">
-                <a16:creationId xmlns:a16="http://schemas.microsoft.com/office/drawing/2014/main" id="{EAC6F2EE-E8AF-4644-B28C-7A46F8948265}"/>
+              <a:t>Note: the graph is divided into four quadrants, sectioned off by Average Lift (x) and Average Spend (y). The size of each colored point corresponds to number of purchases made there.</a:t>
+            </a:r>
+          </a:p>
+        </p:txBody>
+      </p:sp>
+      <p:sp>
+        <p:nvSpPr>
+          <p:cNvPr id="7" name="Content Placeholder 2">
+            <a:extLst>
+              <a:ext uri="{FF2B5EF4-FFF2-40B4-BE49-F238E27FC236}">
+                <a16:creationId xmlns:a16="http://schemas.microsoft.com/office/drawing/2014/main" id="{2E1B6FAF-DC51-234F-935C-E1704FB44E20}"/>
               </a:ext>
             </a:extLst>
           </p:cNvPr>
@@ -4217,8 +4127,8 @@
         </p:nvSpPr>
         <p:spPr>
           <a:xfrm>
-            <a:off x="8318500" y="1087821"/>
-            <a:ext cx="3429438" cy="4682357"/>
+            <a:off x="8394700" y="1484914"/>
+            <a:ext cx="3429438" cy="3888172"/>
           </a:xfrm>
           <a:prstGeom prst="rect">
             <a:avLst/>
@@ -4399,31 +4309,54 @@
             <a:r>
               <a:rPr lang="en-US" sz="1900" dirty="0">
                 <a:solidFill>
-                  <a:srgbClr val="00B050"/>
+                  <a:srgbClr val="FF0000"/>
                 </a:solidFill>
               </a:rPr>
-              <a:t>Below Average Lift, yet Above Average Purchases: Good!</a:t>
-            </a:r>
-          </a:p>
-          <a:p>
-            <a:r>
-              <a:rPr lang="en-US" sz="1400" dirty="0">
+              <a:t>Below average lift, above average spend:</a:t>
+            </a:r>
+          </a:p>
+          <a:p>
+            <a:pPr marL="0" indent="0">
+              <a:buNone/>
+            </a:pPr>
+            <a:r>
+              <a:rPr lang="en-US" sz="1900" dirty="0">
                 <a:solidFill>
-                  <a:srgbClr val="00B050"/>
+                  <a:srgbClr val="FF0000"/>
                 </a:solidFill>
               </a:rPr>
-              <a:t>CNBC</a:t>
-            </a:r>
-          </a:p>
-          <a:p>
-            <a:r>
-              <a:rPr lang="en-US" sz="1400" dirty="0">
-                <a:solidFill>
-                  <a:srgbClr val="00B050"/>
-                </a:solidFill>
-              </a:rPr>
-              <a:t>Dateline</a:t>
-            </a:r>
+              <a:t>You’re getting less lift for your buck, that’s bad!</a:t>
+            </a:r>
+          </a:p>
+          <a:p>
+            <a:pPr marL="0" indent="0">
+              <a:buNone/>
+            </a:pPr>
+            <a:endParaRPr lang="en-US" sz="1900" dirty="0">
+              <a:solidFill>
+                <a:srgbClr val="00B050"/>
+              </a:solidFill>
+            </a:endParaRPr>
+          </a:p>
+          <a:p>
+            <a:pPr marL="0" indent="0">
+              <a:buNone/>
+            </a:pPr>
+            <a:endParaRPr lang="en-US" sz="1900" dirty="0">
+              <a:solidFill>
+                <a:srgbClr val="00B050"/>
+              </a:solidFill>
+            </a:endParaRPr>
+          </a:p>
+          <a:p>
+            <a:pPr marL="0" indent="0">
+              <a:buNone/>
+            </a:pPr>
+            <a:endParaRPr lang="en-US" sz="1900" dirty="0">
+              <a:solidFill>
+                <a:srgbClr val="00B050"/>
+              </a:solidFill>
+            </a:endParaRPr>
           </a:p>
           <a:p>
             <a:pPr marL="0" indent="0">
@@ -4435,7 +4368,7 @@
                   <a:srgbClr val="00B050"/>
                 </a:solidFill>
               </a:rPr>
-              <a:t>You’re getting less lift, but more purchases despite it, that’s good!</a:t>
+              <a:t>Above average lift, below average spend: </a:t>
             </a:r>
           </a:p>
           <a:p>
@@ -4445,76 +4378,48 @@
             <a:r>
               <a:rPr lang="en-US" sz="1900" dirty="0">
                 <a:solidFill>
-                  <a:srgbClr val="FF0000"/>
+                  <a:srgbClr val="00B050"/>
                 </a:solidFill>
               </a:rPr>
-              <a:t>Above Average Lift, Below Average Purchases: Bad!  </a:t>
-            </a:r>
-          </a:p>
-          <a:p>
-            <a:r>
-              <a:rPr lang="en-US" sz="1400" dirty="0" err="1">
-                <a:solidFill>
-                  <a:srgbClr val="FF0000"/>
-                </a:solidFill>
-              </a:rPr>
-              <a:t>ZeeTV</a:t>
-            </a:r>
-            <a:endParaRPr lang="en-US" sz="1400" dirty="0">
-              <a:solidFill>
-                <a:srgbClr val="FF0000"/>
-              </a:solidFill>
-            </a:endParaRPr>
-          </a:p>
-          <a:p>
-            <a:r>
-              <a:rPr lang="en-US" sz="1400" dirty="0">
-                <a:solidFill>
-                  <a:srgbClr val="FF0000"/>
-                </a:solidFill>
-              </a:rPr>
-              <a:t>Star Plus</a:t>
-            </a:r>
-          </a:p>
-          <a:p>
-            <a:r>
-              <a:rPr lang="en-US" sz="1400" dirty="0">
-                <a:solidFill>
-                  <a:srgbClr val="FF0000"/>
-                </a:solidFill>
-              </a:rPr>
-              <a:t>Dish Network</a:t>
-            </a:r>
-          </a:p>
-          <a:p>
-            <a:pPr marL="0" indent="0">
-              <a:buNone/>
-            </a:pPr>
-            <a:r>
-              <a:rPr lang="en-US" sz="1900" dirty="0">
-                <a:solidFill>
-                  <a:srgbClr val="FF0000"/>
-                </a:solidFill>
-              </a:rPr>
-              <a:t>Despite increased traffic, these customers don’t seem to want your product, that’s bad!</a:t>
-            </a:r>
-          </a:p>
-          <a:p>
-            <a:pPr marL="0" indent="0">
-              <a:buNone/>
-            </a:pPr>
-            <a:endParaRPr lang="en-US" sz="1900" dirty="0">
-              <a:solidFill>
-                <a:srgbClr val="FF0000"/>
-              </a:solidFill>
-            </a:endParaRPr>
-          </a:p>
-        </p:txBody>
-      </p:sp>
+              <a:t>You’re getting more lift for your buck, that’s good!</a:t>
+            </a:r>
+          </a:p>
+        </p:txBody>
+      </p:sp>
+      <p:pic>
+        <p:nvPicPr>
+          <p:cNvPr id="3" name="Picture 2">
+            <a:extLst>
+              <a:ext uri="{FF2B5EF4-FFF2-40B4-BE49-F238E27FC236}">
+                <a16:creationId xmlns:a16="http://schemas.microsoft.com/office/drawing/2014/main" id="{5DDD33F5-951E-2240-ACCE-CF2794F6B7D7}"/>
+              </a:ext>
+            </a:extLst>
+          </p:cNvPr>
+          <p:cNvPicPr>
+            <a:picLocks noChangeAspect="1"/>
+          </p:cNvPicPr>
+          <p:nvPr/>
+        </p:nvPicPr>
+        <p:blipFill>
+          <a:blip r:embed="rId2"/>
+          <a:stretch>
+            <a:fillRect/>
+          </a:stretch>
+        </p:blipFill>
+        <p:spPr>
+          <a:xfrm>
+            <a:off x="0" y="1352550"/>
+            <a:ext cx="8394700" cy="4152900"/>
+          </a:xfrm>
+          <a:prstGeom prst="rect">
+            <a:avLst/>
+          </a:prstGeom>
+        </p:spPr>
+      </p:pic>
     </p:spTree>
     <p:extLst>
       <p:ext uri="{BB962C8B-B14F-4D97-AF65-F5344CB8AC3E}">
-        <p14:creationId xmlns:p14="http://schemas.microsoft.com/office/powerpoint/2010/main" val="2172144522"/>
+        <p14:creationId xmlns:p14="http://schemas.microsoft.com/office/powerpoint/2010/main" val="1212188149"/>
       </p:ext>
     </p:extLst>
   </p:cSld>
@@ -4576,52 +4481,22 @@
           </a:p>
         </p:txBody>
       </p:sp>
-      <p:pic>
-        <p:nvPicPr>
-          <p:cNvPr id="5" name="Picture 4">
-            <a:extLst>
-              <a:ext uri="{FF2B5EF4-FFF2-40B4-BE49-F238E27FC236}">
-                <a16:creationId xmlns:a16="http://schemas.microsoft.com/office/drawing/2014/main" id="{A8BAA6F4-0BE7-1A4A-A640-BF68AA6BC74D}"/>
-              </a:ext>
-            </a:extLst>
-          </p:cNvPr>
-          <p:cNvPicPr>
-            <a:picLocks noChangeAspect="1"/>
-          </p:cNvPicPr>
+      <p:sp>
+        <p:nvSpPr>
+          <p:cNvPr id="6" name="TextBox 5">
+            <a:extLst>
+              <a:ext uri="{FF2B5EF4-FFF2-40B4-BE49-F238E27FC236}">
+                <a16:creationId xmlns:a16="http://schemas.microsoft.com/office/drawing/2014/main" id="{B37EFEE9-A1BD-B84E-82E9-73936C9D61F9}"/>
+              </a:ext>
+            </a:extLst>
+          </p:cNvPr>
+          <p:cNvSpPr txBox="1"/>
           <p:nvPr/>
-        </p:nvPicPr>
-        <p:blipFill>
-          <a:blip r:embed="rId2"/>
-          <a:stretch>
-            <a:fillRect/>
-          </a:stretch>
-        </p:blipFill>
+        </p:nvSpPr>
         <p:spPr>
           <a:xfrm>
-            <a:off x="0" y="1352549"/>
-            <a:ext cx="8394700" cy="4152900"/>
-          </a:xfrm>
-          <a:prstGeom prst="rect">
-            <a:avLst/>
-          </a:prstGeom>
-        </p:spPr>
-      </p:pic>
-      <p:sp>
-        <p:nvSpPr>
-          <p:cNvPr id="6" name="TextBox 5">
-            <a:extLst>
-              <a:ext uri="{FF2B5EF4-FFF2-40B4-BE49-F238E27FC236}">
-                <a16:creationId xmlns:a16="http://schemas.microsoft.com/office/drawing/2014/main" id="{B37EFEE9-A1BD-B84E-82E9-73936C9D61F9}"/>
-              </a:ext>
-            </a:extLst>
-          </p:cNvPr>
-          <p:cNvSpPr txBox="1"/>
-          <p:nvPr/>
-        </p:nvSpPr>
-        <p:spPr>
-          <a:xfrm>
-            <a:off x="0" y="6488668"/>
-            <a:ext cx="10913052" cy="369332"/>
+            <a:off x="0" y="6221549"/>
+            <a:ext cx="10970760" cy="646331"/>
           </a:xfrm>
           <a:prstGeom prst="rect">
             <a:avLst/>
@@ -4636,7 +4511,13 @@
           <a:p>
             <a:r>
               <a:rPr lang="en-US" dirty="0"/>
-              <a:t>Note: the graph is divided into four quadrants, sectioned off by Average Conversion Rate (x) and Average Spend (y)</a:t>
+              <a:t>Note: the graph is divided into four quadrants, sectioned off by Average Conversion Rate (x) and Average Spend (y).</a:t>
+            </a:r>
+          </a:p>
+          <a:p>
+            <a:r>
+              <a:rPr lang="en-US" dirty="0"/>
+              <a:t> The size of each colored point corresponds to number of purchases made there.</a:t>
             </a:r>
           </a:p>
         </p:txBody>
@@ -4657,8 +4538,8 @@
         </p:nvSpPr>
         <p:spPr>
           <a:xfrm>
-            <a:off x="8394700" y="365125"/>
-            <a:ext cx="3429438" cy="6123542"/>
+            <a:off x="8394700" y="1651570"/>
+            <a:ext cx="3429438" cy="3554860"/>
           </a:xfrm>
           <a:prstGeom prst="rect">
             <a:avLst/>
@@ -4837,67 +4718,12 @@
               <a:buNone/>
             </a:pPr>
             <a:r>
-              <a:rPr lang="en-US" sz="1400" dirty="0">
+              <a:rPr lang="en-US" sz="1900" dirty="0">
                 <a:solidFill>
                   <a:srgbClr val="FF0000"/>
                 </a:solidFill>
               </a:rPr>
-              <a:t>Low Conversion Rate, High Spend: </a:t>
-            </a:r>
-          </a:p>
-          <a:p>
-            <a:r>
-              <a:rPr lang="en-US" sz="1400" dirty="0">
-                <a:solidFill>
-                  <a:srgbClr val="FF0000"/>
-                </a:solidFill>
-              </a:rPr>
-              <a:t>Willow TV</a:t>
-            </a:r>
-          </a:p>
-          <a:p>
-            <a:r>
-              <a:rPr lang="en-US" sz="1400" dirty="0" err="1">
-                <a:solidFill>
-                  <a:srgbClr val="FF0000"/>
-                </a:solidFill>
-              </a:rPr>
-              <a:t>ZeeTV</a:t>
-            </a:r>
-            <a:endParaRPr lang="en-US" sz="1400" dirty="0">
-              <a:solidFill>
-                <a:srgbClr val="FF0000"/>
-              </a:solidFill>
-            </a:endParaRPr>
-          </a:p>
-          <a:p>
-            <a:r>
-              <a:rPr lang="en-US" sz="1400" dirty="0">
-                <a:solidFill>
-                  <a:srgbClr val="FF0000"/>
-                </a:solidFill>
-              </a:rPr>
-              <a:t>One America News Network</a:t>
-            </a:r>
-          </a:p>
-          <a:p>
-            <a:r>
-              <a:rPr lang="en-US" sz="1400" dirty="0">
-                <a:solidFill>
-                  <a:srgbClr val="FF0000"/>
-                </a:solidFill>
-              </a:rPr>
-              <a:t>Dateline</a:t>
-            </a:r>
-          </a:p>
-          <a:p>
-            <a:r>
-              <a:rPr lang="en-US" sz="1400" dirty="0">
-                <a:solidFill>
-                  <a:srgbClr val="FF0000"/>
-                </a:solidFill>
-              </a:rPr>
-              <a:t>Star Plus</a:t>
+              <a:t>Low conversion rate, high spend: </a:t>
             </a:r>
           </a:p>
           <a:p>
@@ -4905,7 +4731,7 @@
               <a:buNone/>
             </a:pPr>
             <a:r>
-              <a:rPr lang="en-US" sz="1400" dirty="0">
+              <a:rPr lang="en-US" sz="1900" dirty="0">
                 <a:solidFill>
                   <a:srgbClr val="FF0000"/>
                 </a:solidFill>
@@ -4917,93 +4743,23 @@
             <a:pPr marL="0" indent="0">
               <a:buNone/>
             </a:pPr>
-            <a:r>
-              <a:rPr lang="en-US" sz="1400" dirty="0">
+            <a:endParaRPr lang="en-US" sz="1900" dirty="0">
+              <a:solidFill>
+                <a:srgbClr val="00B050"/>
+              </a:solidFill>
+            </a:endParaRPr>
+          </a:p>
+          <a:p>
+            <a:pPr marL="0" indent="0">
+              <a:buNone/>
+            </a:pPr>
+            <a:r>
+              <a:rPr lang="en-US" sz="1900" dirty="0">
                 <a:solidFill>
                   <a:srgbClr val="00B050"/>
                 </a:solidFill>
               </a:rPr>
-              <a:t>High Conversion Rate, Low Spend: </a:t>
-            </a:r>
-          </a:p>
-          <a:p>
-            <a:r>
-              <a:rPr lang="en-US" sz="1400" dirty="0">
-                <a:solidFill>
-                  <a:srgbClr val="00B050"/>
-                </a:solidFill>
-              </a:rPr>
-              <a:t>CNBC</a:t>
-            </a:r>
-          </a:p>
-          <a:p>
-            <a:r>
-              <a:rPr lang="en-US" sz="1400" dirty="0">
-                <a:solidFill>
-                  <a:srgbClr val="00B050"/>
-                </a:solidFill>
-              </a:rPr>
-              <a:t>Science</a:t>
-            </a:r>
-          </a:p>
-          <a:p>
-            <a:r>
-              <a:rPr lang="en-US" sz="1400" dirty="0">
-                <a:solidFill>
-                  <a:srgbClr val="00B050"/>
-                </a:solidFill>
-              </a:rPr>
-              <a:t>Turner Network TV</a:t>
-            </a:r>
-          </a:p>
-          <a:p>
-            <a:r>
-              <a:rPr lang="en-US" sz="1400" dirty="0">
-                <a:solidFill>
-                  <a:srgbClr val="00B050"/>
-                </a:solidFill>
-              </a:rPr>
-              <a:t>Comedy Central</a:t>
-            </a:r>
-          </a:p>
-          <a:p>
-            <a:r>
-              <a:rPr lang="en-US" sz="1400" dirty="0">
-                <a:solidFill>
-                  <a:srgbClr val="00B050"/>
-                </a:solidFill>
-              </a:rPr>
-              <a:t>NFL Network</a:t>
-            </a:r>
-          </a:p>
-          <a:p>
-            <a:r>
-              <a:rPr lang="en-US" sz="1400" dirty="0">
-                <a:solidFill>
-                  <a:srgbClr val="00B050"/>
-                </a:solidFill>
-              </a:rPr>
-              <a:t>The History Channel</a:t>
-            </a:r>
-          </a:p>
-          <a:p>
-            <a:r>
-              <a:rPr lang="en-US" sz="1400" dirty="0">
-                <a:solidFill>
-                  <a:srgbClr val="00B050"/>
-                </a:solidFill>
-              </a:rPr>
-              <a:t>MSNBC</a:t>
-            </a:r>
-          </a:p>
-          <a:p>
-            <a:r>
-              <a:rPr lang="en-US" sz="1400" dirty="0">
-                <a:solidFill>
-                  <a:srgbClr val="00B050"/>
-                </a:solidFill>
-              </a:rPr>
-              <a:t>Spectrum Sports</a:t>
+              <a:t>High conversion rate, low spend: </a:t>
             </a:r>
           </a:p>
           <a:p>
@@ -5011,7 +4767,7 @@
               <a:buNone/>
             </a:pPr>
             <a:r>
-              <a:rPr lang="en-US" sz="1400" dirty="0">
+              <a:rPr lang="en-US" sz="1900" dirty="0">
                 <a:solidFill>
                   <a:srgbClr val="00B050"/>
                 </a:solidFill>
@@ -5020,10 +4776,40 @@
             </a:r>
           </a:p>
           <a:p>
-            <a:endParaRPr lang="en-US" sz="1400" dirty="0"/>
-          </a:p>
-        </p:txBody>
-      </p:sp>
+            <a:endParaRPr lang="en-US" sz="1900" dirty="0"/>
+          </a:p>
+        </p:txBody>
+      </p:sp>
+      <p:pic>
+        <p:nvPicPr>
+          <p:cNvPr id="3" name="Picture 2">
+            <a:extLst>
+              <a:ext uri="{FF2B5EF4-FFF2-40B4-BE49-F238E27FC236}">
+                <a16:creationId xmlns:a16="http://schemas.microsoft.com/office/drawing/2014/main" id="{256FD139-7692-1A4A-AE14-65645D3AF0E4}"/>
+              </a:ext>
+            </a:extLst>
+          </p:cNvPr>
+          <p:cNvPicPr>
+            <a:picLocks noChangeAspect="1"/>
+          </p:cNvPicPr>
+          <p:nvPr/>
+        </p:nvPicPr>
+        <p:blipFill>
+          <a:blip r:embed="rId2"/>
+          <a:stretch>
+            <a:fillRect/>
+          </a:stretch>
+        </p:blipFill>
+        <p:spPr>
+          <a:xfrm>
+            <a:off x="0" y="1352550"/>
+            <a:ext cx="8394700" cy="4152900"/>
+          </a:xfrm>
+          <a:prstGeom prst="rect">
+            <a:avLst/>
+          </a:prstGeom>
+        </p:spPr>
+      </p:pic>
     </p:spTree>
     <p:extLst>
       <p:ext uri="{BB962C8B-B14F-4D97-AF65-F5344CB8AC3E}">
@@ -5089,52 +4875,22 @@
           </a:p>
         </p:txBody>
       </p:sp>
-      <p:pic>
-        <p:nvPicPr>
-          <p:cNvPr id="5" name="Picture 4">
-            <a:extLst>
-              <a:ext uri="{FF2B5EF4-FFF2-40B4-BE49-F238E27FC236}">
-                <a16:creationId xmlns:a16="http://schemas.microsoft.com/office/drawing/2014/main" id="{85D9EAE6-95A4-3849-92CC-6E039E88E54D}"/>
-              </a:ext>
-            </a:extLst>
-          </p:cNvPr>
-          <p:cNvPicPr>
-            <a:picLocks noChangeAspect="1"/>
-          </p:cNvPicPr>
+      <p:sp>
+        <p:nvSpPr>
+          <p:cNvPr id="6" name="TextBox 5">
+            <a:extLst>
+              <a:ext uri="{FF2B5EF4-FFF2-40B4-BE49-F238E27FC236}">
+                <a16:creationId xmlns:a16="http://schemas.microsoft.com/office/drawing/2014/main" id="{C698CBE9-94FC-4E4A-98B5-3EA97F234890}"/>
+              </a:ext>
+            </a:extLst>
+          </p:cNvPr>
+          <p:cNvSpPr txBox="1"/>
           <p:nvPr/>
-        </p:nvPicPr>
-        <p:blipFill>
-          <a:blip r:embed="rId2"/>
-          <a:stretch>
-            <a:fillRect/>
-          </a:stretch>
-        </p:blipFill>
+        </p:nvSpPr>
         <p:spPr>
           <a:xfrm>
-            <a:off x="0" y="1497541"/>
-            <a:ext cx="8540945" cy="3862917"/>
-          </a:xfrm>
-          <a:prstGeom prst="rect">
-            <a:avLst/>
-          </a:prstGeom>
-        </p:spPr>
-      </p:pic>
-      <p:sp>
-        <p:nvSpPr>
-          <p:cNvPr id="6" name="TextBox 5">
-            <a:extLst>
-              <a:ext uri="{FF2B5EF4-FFF2-40B4-BE49-F238E27FC236}">
-                <a16:creationId xmlns:a16="http://schemas.microsoft.com/office/drawing/2014/main" id="{C698CBE9-94FC-4E4A-98B5-3EA97F234890}"/>
-              </a:ext>
-            </a:extLst>
-          </p:cNvPr>
-          <p:cNvSpPr txBox="1"/>
-          <p:nvPr/>
-        </p:nvSpPr>
-        <p:spPr>
-          <a:xfrm>
-            <a:off x="0" y="6488668"/>
-            <a:ext cx="10684463" cy="369332"/>
+            <a:off x="0" y="6211669"/>
+            <a:ext cx="10795071" cy="646331"/>
           </a:xfrm>
           <a:prstGeom prst="rect">
             <a:avLst/>
@@ -5149,7 +4905,13 @@
           <a:p>
             <a:r>
               <a:rPr lang="en-US" dirty="0"/>
-              <a:t>Note: the graph is divided into four quadrants, sectioned off by Average Conversion Rate (x) and Average CPA (y)</a:t>
+              <a:t>Note: the graph is divided into four quadrants, sectioned off by Average Conversion Rate (x) and Average CPA (y). </a:t>
+            </a:r>
+          </a:p>
+          <a:p>
+            <a:r>
+              <a:rPr lang="en-US" dirty="0"/>
+              <a:t>The size of each colored point corresponds to number of purchases made there.</a:t>
             </a:r>
           </a:p>
         </p:txBody>
@@ -5170,8 +4932,8 @@
         </p:nvSpPr>
         <p:spPr>
           <a:xfrm>
-            <a:off x="8539216" y="1088874"/>
-            <a:ext cx="3429438" cy="5399794"/>
+            <a:off x="8861524" y="1497540"/>
+            <a:ext cx="3250968" cy="3862918"/>
           </a:xfrm>
           <a:prstGeom prst="rect">
             <a:avLst/>
@@ -5350,57 +5112,12 @@
               <a:buNone/>
             </a:pPr>
             <a:r>
-              <a:rPr lang="en-US" sz="1400" dirty="0">
+              <a:rPr lang="en-US" sz="1900" dirty="0">
                 <a:solidFill>
                   <a:srgbClr val="FF0000"/>
                 </a:solidFill>
               </a:rPr>
-              <a:t>Low Conversion Rate, High Cost Per Acquisition</a:t>
-            </a:r>
-          </a:p>
-          <a:p>
-            <a:r>
-              <a:rPr lang="en-US" sz="1400" dirty="0" err="1">
-                <a:solidFill>
-                  <a:srgbClr val="FF0000"/>
-                </a:solidFill>
-              </a:rPr>
-              <a:t>ZeeTV</a:t>
-            </a:r>
-            <a:endParaRPr lang="en-US" sz="1400" dirty="0">
-              <a:solidFill>
-                <a:srgbClr val="FF0000"/>
-              </a:solidFill>
-            </a:endParaRPr>
-          </a:p>
-          <a:p>
-            <a:r>
-              <a:rPr lang="en-US" sz="1400" dirty="0">
-                <a:solidFill>
-                  <a:srgbClr val="FF0000"/>
-                </a:solidFill>
-              </a:rPr>
-              <a:t>Star Plus</a:t>
-            </a:r>
-          </a:p>
-          <a:p>
-            <a:r>
-              <a:rPr lang="en-US" sz="1400" dirty="0">
-                <a:solidFill>
-                  <a:srgbClr val="FF0000"/>
-                </a:solidFill>
-              </a:rPr>
-              <a:t>Bloomberg</a:t>
-            </a:r>
-          </a:p>
-          <a:p>
-            <a:r>
-              <a:rPr lang="en-US" sz="1400" dirty="0">
-                <a:solidFill>
-                  <a:srgbClr val="FF0000"/>
-                </a:solidFill>
-              </a:rPr>
-              <a:t>Fox Sports</a:t>
+              <a:t>Low conversion rate, high cost per acquisition</a:t>
             </a:r>
           </a:p>
           <a:p>
@@ -5408,7 +5125,7 @@
               <a:buNone/>
             </a:pPr>
             <a:r>
-              <a:rPr lang="en-US" sz="1400" dirty="0">
+              <a:rPr lang="en-US" sz="1900" dirty="0">
                 <a:solidFill>
                   <a:srgbClr val="FF0000"/>
                 </a:solidFill>
@@ -5420,63 +5137,23 @@
             <a:pPr marL="0" indent="0">
               <a:buNone/>
             </a:pPr>
-            <a:r>
-              <a:rPr lang="en-US" sz="1400" dirty="0">
+            <a:endParaRPr lang="en-US" sz="1900" dirty="0">
+              <a:solidFill>
+                <a:srgbClr val="00B050"/>
+              </a:solidFill>
+            </a:endParaRPr>
+          </a:p>
+          <a:p>
+            <a:pPr marL="0" indent="0">
+              <a:buNone/>
+            </a:pPr>
+            <a:r>
+              <a:rPr lang="en-US" sz="1900" dirty="0">
                 <a:solidFill>
                   <a:srgbClr val="00B050"/>
                 </a:solidFill>
               </a:rPr>
-              <a:t>High Conversion Rate, Low Cost Per Acquisition</a:t>
-            </a:r>
-          </a:p>
-          <a:p>
-            <a:r>
-              <a:rPr lang="en-US" sz="1400" dirty="0">
-                <a:solidFill>
-                  <a:srgbClr val="00B050"/>
-                </a:solidFill>
-              </a:rPr>
-              <a:t>CNBC</a:t>
-            </a:r>
-          </a:p>
-          <a:p>
-            <a:r>
-              <a:rPr lang="en-US" sz="1400" dirty="0">
-                <a:solidFill>
-                  <a:srgbClr val="00B050"/>
-                </a:solidFill>
-              </a:rPr>
-              <a:t>Turner Network TV</a:t>
-            </a:r>
-          </a:p>
-          <a:p>
-            <a:r>
-              <a:rPr lang="en-US" sz="1400" dirty="0">
-                <a:solidFill>
-                  <a:srgbClr val="00B050"/>
-                </a:solidFill>
-              </a:rPr>
-              <a:t>CNN</a:t>
-            </a:r>
-          </a:p>
-          <a:p>
-            <a:r>
-              <a:rPr lang="en-US" sz="1400" dirty="0">
-                <a:solidFill>
-                  <a:srgbClr val="00B050"/>
-                </a:solidFill>
-              </a:rPr>
-              <a:t>The History Channel</a:t>
-            </a:r>
-          </a:p>
-          <a:p>
-            <a:r>
-              <a:rPr lang="en-US" sz="1400" dirty="0">
-                <a:solidFill>
-                  <a:srgbClr val="00B050"/>
-                </a:solidFill>
-              </a:rPr>
-              <a:t>NFL Network</a:t>
+              <a:t>High conversion rate, low cost per acquisition</a:t>
             </a:r>
           </a:p>
           <a:p>
@@ -5484,7 +5161,7 @@
               <a:buNone/>
             </a:pPr>
             <a:r>
-              <a:rPr lang="en-US" sz="1400" dirty="0">
+              <a:rPr lang="en-US" sz="1900" dirty="0">
                 <a:solidFill>
                   <a:srgbClr val="00B050"/>
                 </a:solidFill>
@@ -5496,7 +5173,7 @@
             <a:pPr marL="0" indent="0">
               <a:buNone/>
             </a:pPr>
-            <a:endParaRPr lang="en-US" sz="1400" dirty="0">
+            <a:endParaRPr lang="en-US" sz="1900" dirty="0">
               <a:solidFill>
                 <a:srgbClr val="FF0000"/>
               </a:solidFill>
@@ -5504,6 +5181,36 @@
           </a:p>
         </p:txBody>
       </p:sp>
+      <p:pic>
+        <p:nvPicPr>
+          <p:cNvPr id="3" name="Picture 2">
+            <a:extLst>
+              <a:ext uri="{FF2B5EF4-FFF2-40B4-BE49-F238E27FC236}">
+                <a16:creationId xmlns:a16="http://schemas.microsoft.com/office/drawing/2014/main" id="{1FF0A1C9-7B75-414C-8D60-0E5F4A9E1F78}"/>
+              </a:ext>
+            </a:extLst>
+          </p:cNvPr>
+          <p:cNvPicPr>
+            <a:picLocks noChangeAspect="1"/>
+          </p:cNvPicPr>
+          <p:nvPr/>
+        </p:nvPicPr>
+        <p:blipFill>
+          <a:blip r:embed="rId2"/>
+          <a:stretch>
+            <a:fillRect/>
+          </a:stretch>
+        </p:blipFill>
+        <p:spPr>
+          <a:xfrm>
+            <a:off x="0" y="1425045"/>
+            <a:ext cx="8861524" cy="4007909"/>
+          </a:xfrm>
+          <a:prstGeom prst="rect">
+            <a:avLst/>
+          </a:prstGeom>
+        </p:spPr>
+      </p:pic>
     </p:spTree>
     <p:extLst>
       <p:ext uri="{BB962C8B-B14F-4D97-AF65-F5344CB8AC3E}">
@@ -5569,52 +5276,22 @@
           </a:p>
         </p:txBody>
       </p:sp>
-      <p:pic>
-        <p:nvPicPr>
-          <p:cNvPr id="5" name="Picture 4">
-            <a:extLst>
-              <a:ext uri="{FF2B5EF4-FFF2-40B4-BE49-F238E27FC236}">
-                <a16:creationId xmlns:a16="http://schemas.microsoft.com/office/drawing/2014/main" id="{BBDF7482-0334-2B49-A01A-E08BEF0909E3}"/>
-              </a:ext>
-            </a:extLst>
-          </p:cNvPr>
-          <p:cNvPicPr>
-            <a:picLocks noChangeAspect="1"/>
-          </p:cNvPicPr>
+      <p:sp>
+        <p:nvSpPr>
+          <p:cNvPr id="6" name="TextBox 5">
+            <a:extLst>
+              <a:ext uri="{FF2B5EF4-FFF2-40B4-BE49-F238E27FC236}">
+                <a16:creationId xmlns:a16="http://schemas.microsoft.com/office/drawing/2014/main" id="{2A0665B8-3BAF-174B-950B-35F0347D5573}"/>
+              </a:ext>
+            </a:extLst>
+          </p:cNvPr>
+          <p:cNvSpPr txBox="1"/>
           <p:nvPr/>
-        </p:nvPicPr>
-        <p:blipFill>
-          <a:blip r:embed="rId2"/>
-          <a:stretch>
-            <a:fillRect/>
-          </a:stretch>
-        </p:blipFill>
+        </p:nvSpPr>
         <p:spPr>
           <a:xfrm>
-            <a:off x="0" y="1514475"/>
-            <a:ext cx="8149905" cy="3829050"/>
-          </a:xfrm>
-          <a:prstGeom prst="rect">
-            <a:avLst/>
-          </a:prstGeom>
-        </p:spPr>
-      </p:pic>
-      <p:sp>
-        <p:nvSpPr>
-          <p:cNvPr id="6" name="TextBox 5">
-            <a:extLst>
-              <a:ext uri="{FF2B5EF4-FFF2-40B4-BE49-F238E27FC236}">
-                <a16:creationId xmlns:a16="http://schemas.microsoft.com/office/drawing/2014/main" id="{2A0665B8-3BAF-174B-950B-35F0347D5573}"/>
-              </a:ext>
-            </a:extLst>
-          </p:cNvPr>
-          <p:cNvSpPr txBox="1"/>
-          <p:nvPr/>
-        </p:nvSpPr>
-        <p:spPr>
-          <a:xfrm>
-            <a:off x="0" y="6488668"/>
-            <a:ext cx="11674671" cy="369332"/>
+            <a:off x="0" y="6232303"/>
+            <a:ext cx="11812529" cy="646331"/>
           </a:xfrm>
           <a:prstGeom prst="rect">
             <a:avLst/>
@@ -5629,7 +5306,13 @@
           <a:p>
             <a:r>
               <a:rPr lang="en-US" dirty="0"/>
-              <a:t>Note: the graph is divided into four quadrants, sectioned off by Average Conversion Rate (x) and Average Cost Per Visitor (y)</a:t>
+              <a:t>Note: the graph is divided into four quadrants, sectioned off by Average Conversion Rate (x) and Average Cost Per Visitor (y).</a:t>
+            </a:r>
+          </a:p>
+          <a:p>
+            <a:r>
+              <a:rPr lang="en-US" dirty="0"/>
+              <a:t> The size of each colored point corresponds to number of purchases made there.</a:t>
             </a:r>
           </a:p>
         </p:txBody>
@@ -5650,8 +5333,8 @@
         </p:nvSpPr>
         <p:spPr>
           <a:xfrm>
-            <a:off x="8245233" y="920677"/>
-            <a:ext cx="3429438" cy="5016646"/>
+            <a:off x="8861240" y="1217576"/>
+            <a:ext cx="3308720" cy="4422848"/>
           </a:xfrm>
           <a:prstGeom prst="rect">
             <a:avLst/>
@@ -5830,64 +5513,12 @@
               <a:buNone/>
             </a:pPr>
             <a:r>
-              <a:rPr lang="en-US" sz="1400" dirty="0">
+              <a:rPr lang="en-US" sz="1900" dirty="0">
                 <a:solidFill>
                   <a:srgbClr val="FF0000"/>
                 </a:solidFill>
               </a:rPr>
-              <a:t>Low Conversion Rate, High Cost Per Visitor:</a:t>
-            </a:r>
-          </a:p>
-          <a:p>
-            <a:r>
-              <a:rPr lang="en-US" sz="1400" dirty="0">
-                <a:solidFill>
-                  <a:srgbClr val="FF0000"/>
-                </a:solidFill>
-              </a:rPr>
-              <a:t>The Weather Channel</a:t>
-            </a:r>
-          </a:p>
-          <a:p>
-            <a:pPr lvl="1"/>
-            <a:r>
-              <a:rPr lang="en-US" sz="1400" dirty="0">
-                <a:solidFill>
-                  <a:srgbClr val="FF0000"/>
-                </a:solidFill>
-              </a:rPr>
-              <a:t>No Purchases</a:t>
-            </a:r>
-          </a:p>
-          <a:p>
-            <a:r>
-              <a:rPr lang="en-US" sz="1400" dirty="0">
-                <a:solidFill>
-                  <a:srgbClr val="FF0000"/>
-                </a:solidFill>
-              </a:rPr>
-              <a:t>CNBC World</a:t>
-            </a:r>
-          </a:p>
-          <a:p>
-            <a:pPr lvl="1"/>
-            <a:r>
-              <a:rPr lang="en-US" sz="1400" dirty="0">
-                <a:solidFill>
-                  <a:srgbClr val="FF0000"/>
-                </a:solidFill>
-              </a:rPr>
-              <a:t>No Purchases</a:t>
-            </a:r>
-          </a:p>
-          <a:p>
-            <a:r>
-              <a:rPr lang="en-US" sz="1400" dirty="0">
-                <a:solidFill>
-                  <a:srgbClr val="FF0000"/>
-                </a:solidFill>
-              </a:rPr>
-              <a:t>Bloomberg</a:t>
+              <a:t>Low conversion rate, high cost per visitor:</a:t>
             </a:r>
           </a:p>
           <a:p>
@@ -5895,7 +5526,7 @@
               <a:buNone/>
             </a:pPr>
             <a:r>
-              <a:rPr lang="en-US" sz="1400" dirty="0">
+              <a:rPr lang="en-US" sz="1900" dirty="0">
                 <a:solidFill>
                   <a:srgbClr val="FF0000"/>
                 </a:solidFill>
@@ -5907,53 +5538,23 @@
             <a:pPr marL="0" indent="0">
               <a:buNone/>
             </a:pPr>
-            <a:r>
-              <a:rPr lang="en-US" sz="1400" dirty="0">
+            <a:endParaRPr lang="en-US" sz="1900" dirty="0">
+              <a:solidFill>
+                <a:srgbClr val="00B050"/>
+              </a:solidFill>
+            </a:endParaRPr>
+          </a:p>
+          <a:p>
+            <a:pPr marL="0" indent="0">
+              <a:buNone/>
+            </a:pPr>
+            <a:r>
+              <a:rPr lang="en-US" sz="1900" dirty="0">
                 <a:solidFill>
                   <a:srgbClr val="00B050"/>
                 </a:solidFill>
               </a:rPr>
-              <a:t>High Conversion Rate, Low Cost Per Visitor: Good!</a:t>
-            </a:r>
-          </a:p>
-          <a:p>
-            <a:r>
-              <a:rPr lang="en-US" sz="1400" dirty="0">
-                <a:solidFill>
-                  <a:srgbClr val="00B050"/>
-                </a:solidFill>
-              </a:rPr>
-              <a:t>CNBC</a:t>
-            </a:r>
-          </a:p>
-          <a:p>
-            <a:r>
-              <a:rPr lang="en-US" sz="1400" dirty="0">
-                <a:solidFill>
-                  <a:srgbClr val="00B050"/>
-                </a:solidFill>
-              </a:rPr>
-              <a:t>CNN</a:t>
-            </a:r>
-          </a:p>
-          <a:p>
-            <a:r>
-              <a:rPr lang="en-US" sz="1400" dirty="0">
-                <a:solidFill>
-                  <a:srgbClr val="00B050"/>
-                </a:solidFill>
-              </a:rPr>
-              <a:t>The History Channel</a:t>
-            </a:r>
-          </a:p>
-          <a:p>
-            <a:r>
-              <a:rPr lang="en-US" sz="1400" dirty="0">
-                <a:solidFill>
-                  <a:srgbClr val="00B050"/>
-                </a:solidFill>
-              </a:rPr>
-              <a:t>MSNBC</a:t>
+              <a:t>High conversion rate, low cost per visitor:</a:t>
             </a:r>
           </a:p>
           <a:p>
@@ -5961,7 +5562,7 @@
               <a:buNone/>
             </a:pPr>
             <a:r>
-              <a:rPr lang="en-US" sz="1400" dirty="0">
+              <a:rPr lang="en-US" sz="1900" dirty="0">
                 <a:solidFill>
                   <a:srgbClr val="00B050"/>
                 </a:solidFill>
@@ -5971,6 +5572,36 @@
           </a:p>
         </p:txBody>
       </p:sp>
+      <p:pic>
+        <p:nvPicPr>
+          <p:cNvPr id="3" name="Picture 2">
+            <a:extLst>
+              <a:ext uri="{FF2B5EF4-FFF2-40B4-BE49-F238E27FC236}">
+                <a16:creationId xmlns:a16="http://schemas.microsoft.com/office/drawing/2014/main" id="{D6B50822-B5A9-9242-94F5-43A7C2481DBC}"/>
+              </a:ext>
+            </a:extLst>
+          </p:cNvPr>
+          <p:cNvPicPr>
+            <a:picLocks noChangeAspect="1"/>
+          </p:cNvPicPr>
+          <p:nvPr/>
+        </p:nvPicPr>
+        <p:blipFill>
+          <a:blip r:embed="rId2"/>
+          <a:stretch>
+            <a:fillRect/>
+          </a:stretch>
+        </p:blipFill>
+        <p:spPr>
+          <a:xfrm>
+            <a:off x="22040" y="1352550"/>
+            <a:ext cx="8839200" cy="4152900"/>
+          </a:xfrm>
+          <a:prstGeom prst="rect">
+            <a:avLst/>
+          </a:prstGeom>
+        </p:spPr>
+      </p:pic>
     </p:spTree>
     <p:extLst>
       <p:ext uri="{BB962C8B-B14F-4D97-AF65-F5344CB8AC3E}">
@@ -6082,7 +5713,7 @@
         <p:spPr>
           <a:xfrm>
             <a:off x="8873067" y="1414562"/>
-            <a:ext cx="2480733" cy="5078313"/>
+            <a:ext cx="2480733" cy="4801314"/>
           </a:xfrm>
           <a:prstGeom prst="rect">
             <a:avLst/>
@@ -6122,7 +5753,7 @@
             </a:r>
             <a:r>
               <a:rPr lang="en-US" dirty="0"/>
-              <a:t> Colors and HGTV, performed better than average, if we look at all purchases attributed to any channel from the exit survey (30 channels).</a:t>
+              <a:t> Colors and HGTV, performed better than average, if we look average over any channel from the exit survey (30 channels).</a:t>
             </a:r>
           </a:p>
         </p:txBody>
@@ -6214,17 +5845,14 @@
           </a:bodyPr>
           <a:lstStyle/>
           <a:p>
-            <a:pPr marL="0" indent="0">
-              <a:buNone/>
-            </a:pPr>
-            <a:r>
-              <a:rPr lang="en-US" u="sng" dirty="0"/>
+            <a:pPr marL="0" indent="0" algn="ctr">
+              <a:buNone/>
+            </a:pPr>
+            <a:r>
+              <a:rPr lang="en-US" sz="3400" u="sng" dirty="0"/>
               <a:t>The good</a:t>
             </a:r>
-            <a:r>
-              <a:rPr lang="en-US" dirty="0"/>
-              <a:t>:</a:t>
-            </a:r>
+            <a:endParaRPr lang="en-US" sz="3400" dirty="0"/>
           </a:p>
           <a:p>
             <a:r>
@@ -6501,18 +6129,15 @@
             </a:lvl9pPr>
           </a:lstStyle>
           <a:p>
-            <a:pPr marL="0" indent="0">
-              <a:buFont typeface="Arial" panose="020B0604020202020204" pitchFamily="34" charset="0"/>
-              <a:buNone/>
-            </a:pPr>
-            <a:r>
-              <a:rPr lang="en-US" u="sng" dirty="0"/>
+            <a:pPr marL="0" indent="0" algn="ctr">
+              <a:buFont typeface="Arial" panose="020B0604020202020204" pitchFamily="34" charset="0"/>
+              <a:buNone/>
+            </a:pPr>
+            <a:r>
+              <a:rPr lang="en-US" sz="2600" u="sng" dirty="0"/>
               <a:t>The bad</a:t>
             </a:r>
-            <a:r>
-              <a:rPr lang="en-US" dirty="0"/>
-              <a:t>:</a:t>
-            </a:r>
+            <a:endParaRPr lang="en-US" sz="2600" dirty="0"/>
           </a:p>
           <a:p>
             <a:r>
@@ -6656,6 +6281,10 @@
           </a:bodyPr>
           <a:lstStyle/>
           <a:p>
+            <a:pPr marL="514350" indent="-514350">
+              <a:buFont typeface="+mj-lt"/>
+              <a:buAutoNum type="arabicPeriod"/>
+            </a:pPr>
             <a:r>
               <a:rPr lang="en-US" dirty="0"/>
               <a:t>MSNBC</a:t>
@@ -6690,6 +6319,10 @@
             </a:r>
           </a:p>
           <a:p>
+            <a:pPr marL="514350" indent="-514350">
+              <a:buFont typeface="+mj-lt"/>
+              <a:buAutoNum type="arabicPeriod"/>
+            </a:pPr>
             <a:r>
               <a:rPr lang="en-US" dirty="0"/>
               <a:t>CNN</a:t>
@@ -6717,6 +6350,10 @@
             </a:r>
           </a:p>
           <a:p>
+            <a:pPr marL="514350" indent="-514350">
+              <a:buFont typeface="+mj-lt"/>
+              <a:buAutoNum type="arabicPeriod"/>
+            </a:pPr>
             <a:r>
               <a:rPr lang="en-US" dirty="0"/>
               <a:t>CNBC</a:t>
@@ -6781,7 +6418,7 @@
         <p:spPr>
           <a:xfrm>
             <a:off x="6096000" y="1582340"/>
-            <a:ext cx="5257800" cy="4524315"/>
+            <a:ext cx="5257800" cy="4678204"/>
           </a:xfrm>
           <a:prstGeom prst="rect">
             <a:avLst/>
@@ -6794,9 +6431,10 @@
           </a:bodyPr>
           <a:lstStyle/>
           <a:p>
-            <a:r>
-              <a:rPr lang="en-US" dirty="0"/>
-              <a:t>Honorable Mentions – </a:t>
+            <a:pPr algn="ctr"/>
+            <a:r>
+              <a:rPr lang="en-US" sz="2800" dirty="0"/>
+              <a:t>Honorable Mentions</a:t>
             </a:r>
           </a:p>
           <a:p>
@@ -6861,7 +6499,7 @@
             </a:pPr>
             <a:r>
               <a:rPr lang="en-US" dirty="0"/>
-              <a:t>Fox News (5.9)</a:t>
+              <a:t>Fox News (5.9%)</a:t>
             </a:r>
           </a:p>
           <a:p>
@@ -6985,80 +6623,65 @@
           </a:bodyPr>
           <a:lstStyle/>
           <a:p>
-            <a:r>
-              <a:rPr lang="en-US" dirty="0"/>
-              <a:t>Comedy Central</a:t>
+            <a:pPr marL="514350" indent="-514350">
+              <a:buFont typeface="+mj-lt"/>
+              <a:buAutoNum type="arabicPeriod"/>
+            </a:pPr>
+            <a:r>
+              <a:rPr lang="en-US" dirty="0"/>
+              <a:t>CNBC World</a:t>
             </a:r>
           </a:p>
           <a:p>
             <a:pPr lvl="1"/>
             <a:r>
               <a:rPr lang="en-US" dirty="0"/>
-              <a:t>Costliest for generating lift</a:t>
+              <a:t>Zero Purchases</a:t>
             </a:r>
           </a:p>
           <a:p>
             <a:pPr lvl="1"/>
             <a:r>
               <a:rPr lang="en-US" dirty="0"/>
-              <a:t>Second costliest in generating purchases</a:t>
+              <a:t>Ranked in bottom 5 for 2/3 of your metrics</a:t>
+            </a:r>
+          </a:p>
+          <a:p>
+            <a:pPr marL="514350" indent="-514350">
+              <a:buFont typeface="+mj-lt"/>
+              <a:buAutoNum type="arabicPeriod"/>
+            </a:pPr>
+            <a:r>
+              <a:rPr lang="en-US" dirty="0"/>
+              <a:t>The Weather Channel</a:t>
             </a:r>
           </a:p>
           <a:p>
             <a:pPr lvl="1"/>
             <a:r>
               <a:rPr lang="en-US" dirty="0"/>
-              <a:t>Ranked in bottom 5 for 2/3 of your metrics</a:t>
-            </a:r>
-          </a:p>
-          <a:p>
-            <a:r>
-              <a:rPr lang="en-US" dirty="0"/>
-              <a:t>CNBC World</a:t>
+              <a:t>Zero Purchases</a:t>
             </a:r>
           </a:p>
           <a:p>
             <a:pPr lvl="1"/>
             <a:r>
               <a:rPr lang="en-US" dirty="0"/>
-              <a:t>Zero Purchases</a:t>
+              <a:t>Third costliest in generating lift</a:t>
             </a:r>
           </a:p>
           <a:p>
             <a:pPr lvl="1"/>
             <a:r>
               <a:rPr lang="en-US" dirty="0"/>
-              <a:t>Ranked in bottom 5 for 2/3 of your metrics</a:t>
-            </a:r>
-          </a:p>
-          <a:p>
-            <a:r>
-              <a:rPr lang="en-US" dirty="0"/>
-              <a:t>The Weather Channel</a:t>
-            </a:r>
-          </a:p>
-          <a:p>
-            <a:pPr lvl="1"/>
-            <a:r>
-              <a:rPr lang="en-US" dirty="0"/>
-              <a:t>Zero Purchases</a:t>
-            </a:r>
-          </a:p>
-          <a:p>
-            <a:pPr lvl="1"/>
-            <a:r>
-              <a:rPr lang="en-US" dirty="0"/>
-              <a:t>Third costliest in generating lift</a:t>
-            </a:r>
-          </a:p>
-          <a:p>
-            <a:pPr lvl="1"/>
-            <a:r>
-              <a:rPr lang="en-US" dirty="0"/>
               <a:t>Ranked in bottom 5 for 3/3 of your metrics</a:t>
             </a:r>
           </a:p>
           <a:p>
+            <a:pPr marL="514350" indent="-514350">
+              <a:buFont typeface="+mj-lt"/>
+              <a:buAutoNum type="arabicPeriod"/>
+            </a:pPr>
             <a:r>
               <a:rPr lang="en-US" dirty="0" err="1"/>
               <a:t>ZeeTV</a:t>
@@ -7073,6 +6696,10 @@
             </a:r>
           </a:p>
           <a:p>
+            <a:pPr marL="514350" indent="-514350">
+              <a:buFont typeface="+mj-lt"/>
+              <a:buAutoNum type="arabicPeriod"/>
+            </a:pPr>
             <a:r>
               <a:rPr lang="en-US" dirty="0"/>
               <a:t>Star Plus</a:t>
@@ -7084,6 +6711,41 @@
               <a:rPr lang="en-US" dirty="0"/>
               <a:t>Performed poorly in 4/6 of the scatter plots</a:t>
             </a:r>
+          </a:p>
+          <a:p>
+            <a:pPr marL="514350" indent="-514350">
+              <a:buFont typeface="+mj-lt"/>
+              <a:buAutoNum type="arabicPeriod"/>
+            </a:pPr>
+            <a:r>
+              <a:rPr lang="en-US" dirty="0"/>
+              <a:t>Comedy Central</a:t>
+            </a:r>
+          </a:p>
+          <a:p>
+            <a:pPr lvl="1"/>
+            <a:r>
+              <a:rPr lang="en-US" dirty="0"/>
+              <a:t>Costliest for generating lift</a:t>
+            </a:r>
+          </a:p>
+          <a:p>
+            <a:pPr lvl="1"/>
+            <a:r>
+              <a:rPr lang="en-US" dirty="0"/>
+              <a:t>Second costliest in generating purchases</a:t>
+            </a:r>
+          </a:p>
+          <a:p>
+            <a:pPr lvl="1"/>
+            <a:r>
+              <a:rPr lang="en-US" dirty="0"/>
+              <a:t>Ranked in bottom 5 for 2/3 of your metrics</a:t>
+            </a:r>
+          </a:p>
+          <a:p>
+            <a:pPr lvl="1"/>
+            <a:endParaRPr lang="en-US" dirty="0"/>
           </a:p>
         </p:txBody>
       </p:sp>
@@ -7102,7 +6764,7 @@
         <p:spPr>
           <a:xfrm>
             <a:off x="6340953" y="1825625"/>
-            <a:ext cx="5012847" cy="923330"/>
+            <a:ext cx="5012847" cy="1077218"/>
           </a:xfrm>
           <a:prstGeom prst="rect">
             <a:avLst/>
@@ -7115,9 +6777,10 @@
           </a:bodyPr>
           <a:lstStyle/>
           <a:p>
-            <a:r>
-              <a:rPr lang="en-US" dirty="0"/>
-              <a:t>Honorable mentions – </a:t>
+            <a:pPr algn="ctr"/>
+            <a:r>
+              <a:rPr lang="en-US" sz="2800" dirty="0"/>
+              <a:t>Honorable mentions</a:t>
             </a:r>
           </a:p>
           <a:p>
@@ -7236,7 +6899,7 @@
             <a:pPr lvl="1"/>
             <a:r>
               <a:rPr lang="en-US" dirty="0"/>
-              <a:t>On average, it cost $10.81 to bring one visitor to your website</a:t>
+              <a:t>On average, it cost $10.81 to bring one visitor to your website.</a:t>
             </a:r>
           </a:p>
           <a:p>
@@ -7336,40 +6999,200 @@
             <p:ph type="title"/>
           </p:nvPr>
         </p:nvSpPr>
-        <p:spPr/>
-        <p:txBody>
-          <a:bodyPr/>
+        <p:spPr>
+          <a:xfrm>
+            <a:off x="3801143" y="324986"/>
+            <a:ext cx="8390857" cy="815445"/>
+          </a:xfrm>
+        </p:spPr>
+        <p:txBody>
+          <a:bodyPr>
+            <a:normAutofit/>
+          </a:bodyPr>
           <a:lstStyle/>
           <a:p>
             <a:r>
-              <a:rPr lang="en-US" dirty="0"/>
+              <a:rPr lang="en-US" sz="4000" u="sng" dirty="0"/>
               <a:t>How can the exit survey be improved?</a:t>
             </a:r>
           </a:p>
         </p:txBody>
       </p:sp>
-      <p:sp>
-        <p:nvSpPr>
-          <p:cNvPr id="3" name="Content Placeholder 2">
-            <a:extLst>
-              <a:ext uri="{FF2B5EF4-FFF2-40B4-BE49-F238E27FC236}">
-                <a16:creationId xmlns:a16="http://schemas.microsoft.com/office/drawing/2014/main" id="{448AAE7E-E421-C044-9F25-718A2B3FF13A}"/>
-              </a:ext>
-            </a:extLst>
-          </p:cNvPr>
-          <p:cNvSpPr>
-            <a:spLocks noGrp="1"/>
-          </p:cNvSpPr>
+      <p:pic>
+        <p:nvPicPr>
+          <p:cNvPr id="4" name="Content Placeholder 3">
+            <a:extLst>
+              <a:ext uri="{FF2B5EF4-FFF2-40B4-BE49-F238E27FC236}">
+                <a16:creationId xmlns:a16="http://schemas.microsoft.com/office/drawing/2014/main" id="{F723A2AF-352B-984B-96E3-E3AB4F99540E}"/>
+              </a:ext>
+            </a:extLst>
+          </p:cNvPr>
+          <p:cNvPicPr>
+            <a:picLocks noGrp="1" noChangeAspect="1"/>
+          </p:cNvPicPr>
           <p:nvPr>
             <p:ph idx="1"/>
           </p:nvPr>
-        </p:nvSpPr>
-        <p:spPr/>
-        <p:txBody>
-          <a:bodyPr/>
+        </p:nvPicPr>
+        <p:blipFill>
+          <a:blip r:embed="rId2"/>
+          <a:stretch>
+            <a:fillRect/>
+          </a:stretch>
+        </p:blipFill>
+        <p:spPr>
+          <a:xfrm>
+            <a:off x="0" y="27036"/>
+            <a:ext cx="3801143" cy="6803928"/>
+          </a:xfrm>
+          <a:prstGeom prst="rect">
+            <a:avLst/>
+          </a:prstGeom>
+        </p:spPr>
+      </p:pic>
+      <p:sp>
+        <p:nvSpPr>
+          <p:cNvPr id="5" name="TextBox 4">
+            <a:extLst>
+              <a:ext uri="{FF2B5EF4-FFF2-40B4-BE49-F238E27FC236}">
+                <a16:creationId xmlns:a16="http://schemas.microsoft.com/office/drawing/2014/main" id="{57958011-D1B5-6E40-8BAE-CFC5BF12DA6C}"/>
+              </a:ext>
+            </a:extLst>
+          </p:cNvPr>
+          <p:cNvSpPr txBox="1"/>
+          <p:nvPr/>
+        </p:nvSpPr>
+        <p:spPr>
+          <a:xfrm>
+            <a:off x="4025610" y="1443841"/>
+            <a:ext cx="7941923" cy="3970318"/>
+          </a:xfrm>
+          <a:prstGeom prst="rect">
+            <a:avLst/>
+          </a:prstGeom>
+          <a:noFill/>
+        </p:spPr>
+        <p:txBody>
+          <a:bodyPr wrap="square" rtlCol="0">
+            <a:spAutoFit/>
+          </a:bodyPr>
           <a:lstStyle/>
           <a:p>
-            <a:endParaRPr lang="en-US"/>
+            <a:pPr marL="285750" indent="-285750">
+              <a:buFont typeface="Arial" panose="020B0604020202020204" pitchFamily="34" charset="0"/>
+              <a:buChar char="•"/>
+            </a:pPr>
+            <a:r>
+              <a:rPr lang="en-US" dirty="0"/>
+              <a:t>Remove channels that you haven’t spent money on</a:t>
+            </a:r>
+          </a:p>
+          <a:p>
+            <a:pPr marL="742950" lvl="1" indent="-285750">
+              <a:buFont typeface="Arial" panose="020B0604020202020204" pitchFamily="34" charset="0"/>
+              <a:buChar char="•"/>
+            </a:pPr>
+            <a:r>
+              <a:rPr lang="en-US" dirty="0"/>
+              <a:t>CBS Sports</a:t>
+            </a:r>
+          </a:p>
+          <a:p>
+            <a:pPr marL="742950" lvl="1" indent="-285750">
+              <a:buFont typeface="Arial" panose="020B0604020202020204" pitchFamily="34" charset="0"/>
+              <a:buChar char="•"/>
+            </a:pPr>
+            <a:r>
+              <a:rPr lang="en-US" dirty="0"/>
+              <a:t>DIY</a:t>
+            </a:r>
+          </a:p>
+          <a:p>
+            <a:pPr marL="742950" lvl="1" indent="-285750">
+              <a:buFont typeface="Arial" panose="020B0604020202020204" pitchFamily="34" charset="0"/>
+              <a:buChar char="•"/>
+            </a:pPr>
+            <a:r>
+              <a:rPr lang="en-US" dirty="0"/>
+              <a:t>ESPN</a:t>
+            </a:r>
+          </a:p>
+          <a:p>
+            <a:pPr marL="742950" lvl="1" indent="-285750">
+              <a:buFont typeface="Arial" panose="020B0604020202020204" pitchFamily="34" charset="0"/>
+              <a:buChar char="•"/>
+            </a:pPr>
+            <a:r>
+              <a:rPr lang="en-US" dirty="0"/>
+              <a:t>Fox News</a:t>
+            </a:r>
+          </a:p>
+          <a:p>
+            <a:pPr marL="742950" lvl="1" indent="-285750">
+              <a:buFont typeface="Arial" panose="020B0604020202020204" pitchFamily="34" charset="0"/>
+              <a:buChar char="•"/>
+            </a:pPr>
+            <a:r>
+              <a:rPr lang="en-US" dirty="0"/>
+              <a:t>FYI</a:t>
+            </a:r>
+          </a:p>
+          <a:p>
+            <a:pPr marL="742950" lvl="1" indent="-285750">
+              <a:buFont typeface="Arial" panose="020B0604020202020204" pitchFamily="34" charset="0"/>
+              <a:buChar char="•"/>
+            </a:pPr>
+            <a:r>
+              <a:rPr lang="en-US" dirty="0"/>
+              <a:t>HGTV</a:t>
+            </a:r>
+          </a:p>
+          <a:p>
+            <a:pPr marL="742950" lvl="1" indent="-285750">
+              <a:buFont typeface="Arial" panose="020B0604020202020204" pitchFamily="34" charset="0"/>
+              <a:buChar char="•"/>
+            </a:pPr>
+            <a:r>
+              <a:rPr lang="en-US" dirty="0"/>
+              <a:t>Oprah Winfrey Network</a:t>
+            </a:r>
+          </a:p>
+          <a:p>
+            <a:pPr marL="285750" indent="-285750">
+              <a:buFont typeface="Arial" panose="020B0604020202020204" pitchFamily="34" charset="0"/>
+              <a:buChar char="•"/>
+            </a:pPr>
+            <a:r>
+              <a:rPr lang="en-US" dirty="0"/>
+              <a:t>Remove Other:______</a:t>
+            </a:r>
+          </a:p>
+          <a:p>
+            <a:pPr marL="742950" lvl="1" indent="-285750">
+              <a:buFont typeface="Arial" panose="020B0604020202020204" pitchFamily="34" charset="0"/>
+              <a:buChar char="•"/>
+            </a:pPr>
+            <a:r>
+              <a:rPr lang="en-US" dirty="0"/>
+              <a:t>When a customer marks Other, it gives us just as much information as if they had left this question blank.  It’s unnecessary to have two different choices that yield the same information.</a:t>
+            </a:r>
+          </a:p>
+          <a:p>
+            <a:pPr marL="285750" indent="-285750">
+              <a:buFont typeface="Arial" panose="020B0604020202020204" pitchFamily="34" charset="0"/>
+              <a:buChar char="•"/>
+            </a:pPr>
+            <a:r>
+              <a:rPr lang="en-US" dirty="0"/>
+              <a:t>Include a few more questions on demographics, such as age or gender.</a:t>
+            </a:r>
+          </a:p>
+          <a:p>
+            <a:pPr marL="285750" indent="-285750">
+              <a:buFont typeface="Arial" panose="020B0604020202020204" pitchFamily="34" charset="0"/>
+              <a:buChar char="•"/>
+            </a:pPr>
+            <a:endParaRPr lang="en-US" dirty="0"/>
           </a:p>
         </p:txBody>
       </p:sp>
@@ -7947,6 +7770,9 @@
             <a:endParaRPr lang="en-US" dirty="0"/>
           </a:p>
           <a:p>
+            <a:endParaRPr lang="en-US" dirty="0"/>
+          </a:p>
+          <a:p>
             <a:r>
               <a:rPr lang="en-US" b="1" u="sng" dirty="0"/>
               <a:t>Key Benchmark</a:t>
@@ -7961,6 +7787,10 @@
             </a:r>
           </a:p>
           <a:p>
+            <a:pPr marL="285750" indent="-285750">
+              <a:buFont typeface="Arial" panose="020B0604020202020204" pitchFamily="34" charset="0"/>
+              <a:buChar char="•"/>
+            </a:pPr>
             <a:r>
               <a:rPr lang="en-US" dirty="0"/>
               <a:t>Only the top 5 companies (</a:t>
@@ -7973,9 +7803,6 @@
               <a:rPr lang="en-US" dirty="0"/>
               <a:t>) outperformed this metric.</a:t>
             </a:r>
-          </a:p>
-          <a:p>
-            <a:endParaRPr lang="en-US" dirty="0"/>
           </a:p>
           <a:p>
             <a:endParaRPr lang="en-US" dirty="0"/>
@@ -8113,20 +7940,20 @@
         </p:nvSpPr>
         <p:spPr>
           <a:xfrm>
-            <a:off x="192370" y="108278"/>
-            <a:ext cx="11807260" cy="721109"/>
+            <a:off x="0" y="108278"/>
+            <a:ext cx="12192000" cy="721109"/>
           </a:xfrm>
         </p:spPr>
         <p:txBody>
           <a:bodyPr>
-            <a:normAutofit/>
+            <a:normAutofit fontScale="90000"/>
           </a:bodyPr>
           <a:lstStyle/>
           <a:p>
             <a:pPr algn="ctr"/>
             <a:r>
               <a:rPr lang="en-US" sz="3400" b="1" u="sng" dirty="0"/>
-              <a:t>Cost efficiency – Cost Per Acquisition (CPA) (Spend/Purchases)</a:t>
+              <a:t>Cost efficiency – Cost Per Acquisition (CPA) Per Network (Spend/Purchases)</a:t>
             </a:r>
           </a:p>
         </p:txBody>
@@ -8306,6 +8133,10 @@
             </a:r>
           </a:p>
           <a:p>
+            <a:pPr marL="285750" indent="-285750">
+              <a:buFont typeface="Arial" panose="020B0604020202020204" pitchFamily="34" charset="0"/>
+              <a:buChar char="•"/>
+            </a:pPr>
             <a:r>
               <a:rPr lang="en-US" dirty="0"/>
               <a:t>Only the top 5 companies (</a:t>
@@ -8420,7 +8251,7 @@
             <a:pPr algn="ctr"/>
             <a:r>
               <a:rPr lang="en-US" sz="3400" b="1" u="sng" dirty="0"/>
-              <a:t>Conversion Rate (Purchases/Lift)%</a:t>
+              <a:t>Conversion Rate Per Network (Purchases/Lift)%</a:t>
             </a:r>
           </a:p>
         </p:txBody>
@@ -8439,8 +8270,8 @@
         </p:nvSpPr>
         <p:spPr>
           <a:xfrm>
-            <a:off x="6240516" y="6611779"/>
-            <a:ext cx="5951484" cy="246221"/>
+            <a:off x="6380251" y="6611779"/>
+            <a:ext cx="5811749" cy="246221"/>
           </a:xfrm>
           <a:prstGeom prst="rect">
             <a:avLst/>
@@ -8455,7 +8286,7 @@
           <a:p>
             <a:r>
               <a:rPr lang="en-US" sz="1000" dirty="0"/>
-              <a:t>Note: As mentioned earlier, Weather Channel and CNBC World are dead last because both had </a:t>
+              <a:t>Note: Weather Channel and CNBC World are dead last in Conversion Rate because both had </a:t>
             </a:r>
             <a:r>
               <a:rPr lang="en-US" sz="1000" b="1" dirty="0"/>
@@ -8542,7 +8373,7 @@
         </p:nvSpPr>
         <p:spPr>
           <a:xfrm>
-            <a:off x="7439656" y="826265"/>
+            <a:off x="7439656" y="846813"/>
             <a:ext cx="4077796" cy="5632311"/>
           </a:xfrm>
           <a:prstGeom prst="rect">
@@ -8596,6 +8427,10 @@
             </a:r>
           </a:p>
           <a:p>
+            <a:pPr marL="285750" indent="-285750">
+              <a:buFont typeface="Arial" panose="020B0604020202020204" pitchFamily="34" charset="0"/>
+              <a:buChar char="•"/>
+            </a:pPr>
             <a:r>
               <a:rPr lang="en-US" dirty="0"/>
               <a:t>Most companies outperformed this metric.</a:t>
@@ -8746,21 +8581,21 @@
           </a:bodyPr>
           <a:lstStyle/>
           <a:p>
+            <a:pPr marL="0" indent="0" algn="ctr">
+              <a:buNone/>
+            </a:pPr>
+            <a:r>
+              <a:rPr lang="en-US" sz="2600" b="1" u="sng" dirty="0"/>
+              <a:t>The good</a:t>
+            </a:r>
+          </a:p>
+          <a:p>
             <a:pPr marL="0" indent="0">
               <a:buNone/>
             </a:pPr>
             <a:r>
-              <a:rPr lang="en-US" sz="1800" b="1" u="sng" dirty="0"/>
-              <a:t>The good</a:t>
-            </a:r>
-          </a:p>
-          <a:p>
-            <a:pPr marL="0" indent="0">
-              <a:buNone/>
-            </a:pPr>
-            <a:r>
               <a:rPr lang="en-US" sz="1800" dirty="0"/>
-              <a:t>The following channels ranked in top 5 for 2/3 of your metrics:</a:t>
+              <a:t>In the top 5 for 2/3 of your metrics:</a:t>
             </a:r>
           </a:p>
           <a:p>
@@ -8857,7 +8692,7 @@
         <p:spPr>
           <a:xfrm>
             <a:off x="6671732" y="1253331"/>
-            <a:ext cx="4682067" cy="4801314"/>
+            <a:ext cx="4682067" cy="4370427"/>
           </a:xfrm>
           <a:prstGeom prst="rect">
             <a:avLst/>
@@ -8870,92 +8705,104 @@
           </a:bodyPr>
           <a:lstStyle/>
           <a:p>
-            <a:r>
-              <a:rPr lang="en-US" b="1" u="sng" dirty="0"/>
+            <a:pPr algn="ctr"/>
+            <a:r>
+              <a:rPr lang="en-US" sz="2600" b="1" u="sng" dirty="0"/>
               <a:t>The bad</a:t>
             </a:r>
+            <a:endParaRPr lang="en-US" sz="2600" dirty="0"/>
+          </a:p>
+          <a:p>
+            <a:r>
+              <a:rPr lang="en-US" dirty="0"/>
+              <a:t>In the bottom 5 for 2/3 of your metrics:</a:t>
+            </a:r>
+          </a:p>
+          <a:p>
+            <a:pPr marL="285750" indent="-285750">
+              <a:buFont typeface="Arial" panose="020B0604020202020204" pitchFamily="34" charset="0"/>
+              <a:buChar char="•"/>
+            </a:pPr>
+            <a:r>
+              <a:rPr lang="en-US" dirty="0"/>
+              <a:t>Comedy Central (-2/3 metrics)</a:t>
+            </a:r>
+          </a:p>
+          <a:p>
+            <a:pPr marL="742950" lvl="1" indent="-285750">
+              <a:buFont typeface="Arial" panose="020B0604020202020204" pitchFamily="34" charset="0"/>
+              <a:buChar char="•"/>
+            </a:pPr>
+            <a:r>
+              <a:rPr lang="en-US" dirty="0"/>
+              <a:t>Costliest in generating lift</a:t>
+            </a:r>
+          </a:p>
+          <a:p>
+            <a:pPr marL="742950" lvl="1" indent="-285750">
+              <a:buFont typeface="Arial" panose="020B0604020202020204" pitchFamily="34" charset="0"/>
+              <a:buChar char="•"/>
+            </a:pPr>
+            <a:r>
+              <a:rPr lang="en-US" dirty="0"/>
+              <a:t>Second costliest in generating purchases</a:t>
+            </a:r>
+          </a:p>
+          <a:p>
+            <a:pPr marL="742950" lvl="1" indent="-285750">
+              <a:buFont typeface="Arial" panose="020B0604020202020204" pitchFamily="34" charset="0"/>
+              <a:buChar char="•"/>
+            </a:pPr>
+            <a:r>
+              <a:rPr lang="en-US" dirty="0"/>
+              <a:t>Low purchases, but high conversion rate</a:t>
+            </a:r>
+          </a:p>
+          <a:p>
+            <a:pPr marL="285750" indent="-285750">
+              <a:buFont typeface="Arial" panose="020B0604020202020204" pitchFamily="34" charset="0"/>
+              <a:buChar char="•"/>
+            </a:pPr>
+            <a:r>
+              <a:rPr lang="en-US" dirty="0"/>
+              <a:t>CNBC World (-2/3 metrics)</a:t>
+            </a:r>
+          </a:p>
+          <a:p>
+            <a:pPr marL="742950" lvl="1" indent="-285750">
+              <a:buFont typeface="Arial" panose="020B0604020202020204" pitchFamily="34" charset="0"/>
+              <a:buChar char="•"/>
+            </a:pPr>
+            <a:r>
+              <a:rPr lang="en-US" dirty="0"/>
+              <a:t>Zero Purchases</a:t>
+            </a:r>
+          </a:p>
+          <a:p>
+            <a:pPr marL="1200150" lvl="2" indent="-285750">
+              <a:buFont typeface="Arial" panose="020B0604020202020204" pitchFamily="34" charset="0"/>
+              <a:buChar char="•"/>
+            </a:pPr>
+            <a:r>
+              <a:rPr lang="en-US" dirty="0"/>
+              <a:t>CPA can’t be calculated</a:t>
+            </a:r>
+          </a:p>
+          <a:p>
             <a:endParaRPr lang="en-US" dirty="0"/>
           </a:p>
           <a:p>
             <a:r>
               <a:rPr lang="en-US" dirty="0"/>
-              <a:t>The following channels ranked in the bottom 5 for 2/3 of your metrics:</a:t>
-            </a:r>
-          </a:p>
-          <a:p>
-            <a:pPr marL="285750" indent="-285750">
-              <a:buFont typeface="Arial" panose="020B0604020202020204" pitchFamily="34" charset="0"/>
-              <a:buChar char="•"/>
-            </a:pPr>
-            <a:r>
-              <a:rPr lang="en-US" dirty="0"/>
-              <a:t>Comedy Central (-2/3 metrics)</a:t>
-            </a:r>
-          </a:p>
-          <a:p>
-            <a:pPr marL="742950" lvl="1" indent="-285750">
-              <a:buFont typeface="Arial" panose="020B0604020202020204" pitchFamily="34" charset="0"/>
-              <a:buChar char="•"/>
-            </a:pPr>
-            <a:r>
-              <a:rPr lang="en-US" dirty="0"/>
-              <a:t>Costliest in generating lift</a:t>
-            </a:r>
-          </a:p>
-          <a:p>
-            <a:pPr marL="742950" lvl="1" indent="-285750">
-              <a:buFont typeface="Arial" panose="020B0604020202020204" pitchFamily="34" charset="0"/>
-              <a:buChar char="•"/>
-            </a:pPr>
-            <a:r>
-              <a:rPr lang="en-US" dirty="0"/>
-              <a:t>Second costliest in generating purchases</a:t>
-            </a:r>
-          </a:p>
-          <a:p>
-            <a:pPr marL="742950" lvl="1" indent="-285750">
-              <a:buFont typeface="Arial" panose="020B0604020202020204" pitchFamily="34" charset="0"/>
-              <a:buChar char="•"/>
-            </a:pPr>
-            <a:r>
-              <a:rPr lang="en-US" dirty="0"/>
-              <a:t>Despite low purchases, has high conversion rate</a:t>
-            </a:r>
-          </a:p>
-          <a:p>
-            <a:pPr marL="285750" indent="-285750">
-              <a:buFont typeface="Arial" panose="020B0604020202020204" pitchFamily="34" charset="0"/>
-              <a:buChar char="•"/>
-            </a:pPr>
-            <a:r>
-              <a:rPr lang="en-US" dirty="0"/>
-              <a:t>CNBC World (-2/3 metrics)</a:t>
-            </a:r>
-          </a:p>
-          <a:p>
-            <a:pPr marL="742950" lvl="1" indent="-285750">
-              <a:buFont typeface="Arial" panose="020B0604020202020204" pitchFamily="34" charset="0"/>
-              <a:buChar char="•"/>
-            </a:pPr>
-            <a:r>
-              <a:rPr lang="en-US" dirty="0"/>
-              <a:t>Zero Purchases</a:t>
-            </a:r>
-          </a:p>
-          <a:p>
-            <a:pPr marL="1200150" lvl="2" indent="-285750">
-              <a:buFont typeface="Arial" panose="020B0604020202020204" pitchFamily="34" charset="0"/>
-              <a:buChar char="•"/>
-            </a:pPr>
-            <a:r>
-              <a:rPr lang="en-US" dirty="0"/>
-              <a:t>CPA can’t be calculated</a:t>
-            </a:r>
-          </a:p>
-          <a:p>
-            <a:r>
-              <a:rPr lang="en-US" dirty="0"/>
-              <a:t>The following channels ranked in the bottom 5 for all three of your metrics:</a:t>
+              <a:t>In the bottom 5 for </a:t>
+            </a:r>
+            <a:r>
+              <a:rPr lang="en-US" i="1" dirty="0"/>
+              <a:t>all three </a:t>
+            </a:r>
+            <a:r>
+              <a:rPr lang="en-US" dirty="0"/>
+              <a:t>of your metrics:</a:t>
             </a:r>
           </a:p>
           <a:p>

</xml_diff>

<commit_message>
Finished splitting report creating and visuals creation into separate notebooks
</commit_message>
<xml_diff>
--- a/companyxyz_presentation.pptx
+++ b/companyxyz_presentation.pptx
@@ -216,7 +216,7 @@
           <a:p>
             <a:fld id="{C7DB03AE-EEF3-CB44-8035-56DBB7AED45D}" type="datetimeFigureOut">
               <a:rPr lang="en-US" smtClean="0"/>
-              <a:t>4/1/22</a:t>
+              <a:t>4/16/22</a:t>
             </a:fld>
             <a:endParaRPr lang="en-US"/>
           </a:p>
@@ -4266,7 +4266,7 @@
           <a:p>
             <a:fld id="{81A2D996-68CB-CC46-8422-8E5E59C29E9C}" type="datetimeFigureOut">
               <a:rPr lang="en-US" smtClean="0"/>
-              <a:t>4/1/22</a:t>
+              <a:t>4/16/22</a:t>
             </a:fld>
             <a:endParaRPr lang="en-US"/>
           </a:p>
@@ -4464,7 +4464,7 @@
           <a:p>
             <a:fld id="{81A2D996-68CB-CC46-8422-8E5E59C29E9C}" type="datetimeFigureOut">
               <a:rPr lang="en-US" smtClean="0"/>
-              <a:t>4/1/22</a:t>
+              <a:t>4/16/22</a:t>
             </a:fld>
             <a:endParaRPr lang="en-US"/>
           </a:p>
@@ -4672,7 +4672,7 @@
           <a:p>
             <a:fld id="{81A2D996-68CB-CC46-8422-8E5E59C29E9C}" type="datetimeFigureOut">
               <a:rPr lang="en-US" smtClean="0"/>
-              <a:t>4/1/22</a:t>
+              <a:t>4/16/22</a:t>
             </a:fld>
             <a:endParaRPr lang="en-US"/>
           </a:p>
@@ -4870,7 +4870,7 @@
           <a:p>
             <a:fld id="{81A2D996-68CB-CC46-8422-8E5E59C29E9C}" type="datetimeFigureOut">
               <a:rPr lang="en-US" smtClean="0"/>
-              <a:t>4/1/22</a:t>
+              <a:t>4/16/22</a:t>
             </a:fld>
             <a:endParaRPr lang="en-US"/>
           </a:p>
@@ -5145,7 +5145,7 @@
           <a:p>
             <a:fld id="{81A2D996-68CB-CC46-8422-8E5E59C29E9C}" type="datetimeFigureOut">
               <a:rPr lang="en-US" smtClean="0"/>
-              <a:t>4/1/22</a:t>
+              <a:t>4/16/22</a:t>
             </a:fld>
             <a:endParaRPr lang="en-US"/>
           </a:p>
@@ -5410,7 +5410,7 @@
           <a:p>
             <a:fld id="{81A2D996-68CB-CC46-8422-8E5E59C29E9C}" type="datetimeFigureOut">
               <a:rPr lang="en-US" smtClean="0"/>
-              <a:t>4/1/22</a:t>
+              <a:t>4/16/22</a:t>
             </a:fld>
             <a:endParaRPr lang="en-US"/>
           </a:p>
@@ -5822,7 +5822,7 @@
           <a:p>
             <a:fld id="{81A2D996-68CB-CC46-8422-8E5E59C29E9C}" type="datetimeFigureOut">
               <a:rPr lang="en-US" smtClean="0"/>
-              <a:t>4/1/22</a:t>
+              <a:t>4/16/22</a:t>
             </a:fld>
             <a:endParaRPr lang="en-US"/>
           </a:p>
@@ -5963,7 +5963,7 @@
           <a:p>
             <a:fld id="{81A2D996-68CB-CC46-8422-8E5E59C29E9C}" type="datetimeFigureOut">
               <a:rPr lang="en-US" smtClean="0"/>
-              <a:t>4/1/22</a:t>
+              <a:t>4/16/22</a:t>
             </a:fld>
             <a:endParaRPr lang="en-US"/>
           </a:p>
@@ -6076,7 +6076,7 @@
           <a:p>
             <a:fld id="{81A2D996-68CB-CC46-8422-8E5E59C29E9C}" type="datetimeFigureOut">
               <a:rPr lang="en-US" smtClean="0"/>
-              <a:t>4/1/22</a:t>
+              <a:t>4/16/22</a:t>
             </a:fld>
             <a:endParaRPr lang="en-US"/>
           </a:p>
@@ -6387,7 +6387,7 @@
           <a:p>
             <a:fld id="{81A2D996-68CB-CC46-8422-8E5E59C29E9C}" type="datetimeFigureOut">
               <a:rPr lang="en-US" smtClean="0"/>
-              <a:t>4/1/22</a:t>
+              <a:t>4/16/22</a:t>
             </a:fld>
             <a:endParaRPr lang="en-US"/>
           </a:p>
@@ -6675,7 +6675,7 @@
           <a:p>
             <a:fld id="{81A2D996-68CB-CC46-8422-8E5E59C29E9C}" type="datetimeFigureOut">
               <a:rPr lang="en-US" smtClean="0"/>
-              <a:t>4/1/22</a:t>
+              <a:t>4/16/22</a:t>
             </a:fld>
             <a:endParaRPr lang="en-US"/>
           </a:p>
@@ -6916,7 +6916,7 @@
           <a:p>
             <a:fld id="{81A2D996-68CB-CC46-8422-8E5E59C29E9C}" type="datetimeFigureOut">
               <a:rPr lang="en-US" smtClean="0"/>
-              <a:t>4/1/22</a:t>
+              <a:t>4/16/22</a:t>
             </a:fld>
             <a:endParaRPr lang="en-US"/>
           </a:p>
@@ -9554,10 +9554,10 @@
       </p:sp>
       <p:pic>
         <p:nvPicPr>
-          <p:cNvPr id="6" name="Picture 5">
-            <a:extLst>
-              <a:ext uri="{FF2B5EF4-FFF2-40B4-BE49-F238E27FC236}">
-                <a16:creationId xmlns:a16="http://schemas.microsoft.com/office/drawing/2014/main" id="{36025D4C-8316-CA44-8EBE-C20E8A0CEF65}"/>
+          <p:cNvPr id="8" name="Picture 7">
+            <a:extLst>
+              <a:ext uri="{FF2B5EF4-FFF2-40B4-BE49-F238E27FC236}">
+                <a16:creationId xmlns:a16="http://schemas.microsoft.com/office/drawing/2014/main" id="{93793EB2-53BE-5040-BFD2-43F12BFD9F54}"/>
               </a:ext>
             </a:extLst>
           </p:cNvPr>
@@ -9574,8 +9574,8 @@
         </p:blipFill>
         <p:spPr>
           <a:xfrm>
-            <a:off x="-1" y="1162995"/>
-            <a:ext cx="8167255" cy="5695005"/>
+            <a:off x="0" y="1162995"/>
+            <a:ext cx="8274156" cy="5695005"/>
           </a:xfrm>
           <a:prstGeom prst="rect">
             <a:avLst/>

</xml_diff>